<commit_message>
[doc] update EaseGateway to Easegress
</commit_message>
<xml_diff>
--- a/docs/architecture.pptx
+++ b/docs/architecture.pptx
@@ -243,7 +243,7 @@
           <a:p>
             <a:fld id="{80386BBC-71F7-C440-ACC3-F0F595527C6C}" type="datetimeFigureOut">
               <a:rPr kumimoji="1" lang="zh-CN" altLang="en-US" smtClean="0"/>
-              <a:t>2021/4/27</a:t>
+              <a:t>2021/5/26</a:t>
             </a:fld>
             <a:endParaRPr kumimoji="1" lang="zh-CN" altLang="en-US"/>
           </a:p>
@@ -420,7 +420,7 @@
           <a:p>
             <a:fld id="{044E383A-B265-4935-8168-671F3DE2F894}" type="datetimeFigureOut">
               <a:rPr lang="zh-CN" altLang="en-US" smtClean="0"/>
-              <a:t>2021/4/27</a:t>
+              <a:t>2021/5/26</a:t>
             </a:fld>
             <a:endParaRPr lang="zh-CN" altLang="en-US"/>
           </a:p>
@@ -1552,7 +1552,7 @@
           <a:p>
             <a:fld id="{BBAAF37F-568A-4C76-B0A5-177AFDC2BD4C}" type="datetimeFigureOut">
               <a:rPr lang="zh-CN" altLang="en-US" smtClean="0"/>
-              <a:t>2021/4/27</a:t>
+              <a:t>2021/5/26</a:t>
             </a:fld>
             <a:endParaRPr lang="zh-CN" altLang="en-US"/>
           </a:p>
@@ -10368,7 +10368,7 @@
                   </a:solidFill>
                   <a:latin typeface="+mj-lt"/>
                 </a:rPr>
-                <a:t>EaseGateway</a:t>
+                <a:t>Easegress</a:t>
               </a:r>
               <a:r>
                 <a:rPr lang="zh-CN" altLang="en-US" sz="2000" b="1" dirty="0">
@@ -10406,7 +10406,7 @@
                 </a:rPr>
                 <a:t>Master</a:t>
               </a:r>
-              <a:endParaRPr lang="en-CN" altLang="zh-CN" sz="2000" b="1">
+              <a:endParaRPr lang="en-CN" altLang="zh-CN" sz="2000" b="1" dirty="0">
                 <a:solidFill>
                   <a:schemeClr val="bg1"/>
                 </a:solidFill>
@@ -11158,15 +11158,7 @@
             <a:pPr algn="ctr"/>
             <a:r>
               <a:rPr kumimoji="1" lang="en-US" altLang="zh-CN" sz="1200" b="1" dirty="0"/>
-              <a:t>(Ease</a:t>
-            </a:r>
-            <a:r>
-              <a:rPr kumimoji="1" lang="zh-CN" altLang="en-US" sz="1200" b="1" dirty="0"/>
-              <a:t> </a:t>
-            </a:r>
-            <a:r>
-              <a:rPr kumimoji="1" lang="en-US" altLang="zh-CN" sz="1200" b="1" dirty="0"/>
-              <a:t>Gateway)</a:t>
+              <a:t>(Easegress)</a:t>
             </a:r>
           </a:p>
         </p:txBody>
@@ -12022,7 +12014,7 @@
         <p:spPr>
           <a:xfrm>
             <a:off x="803250" y="247026"/>
-            <a:ext cx="5254772" cy="461665"/>
+            <a:ext cx="4810741" cy="461665"/>
           </a:xfrm>
           <a:prstGeom prst="rect">
             <a:avLst/>
@@ -12045,7 +12037,7 @@
                 </a:solidFill>
                 <a:latin typeface="+mj-lt"/>
               </a:rPr>
-              <a:t>EaseGateway</a:t>
+              <a:t>Easegress</a:t>
             </a:r>
             <a:r>
               <a:rPr kumimoji="1" lang="zh-CN" altLang="en-US" sz="2400" b="1" dirty="0">
@@ -17833,7 +17825,7 @@
         <p:spPr>
           <a:xfrm>
             <a:off x="2044171" y="877042"/>
-            <a:ext cx="3344057" cy="338554"/>
+            <a:ext cx="3036280" cy="338554"/>
           </a:xfrm>
           <a:prstGeom prst="rect">
             <a:avLst/>
@@ -17848,7 +17840,7 @@
           <a:p>
             <a:r>
               <a:rPr kumimoji="1" lang="en-US" altLang="zh-CN" sz="1600" dirty="0"/>
-              <a:t>EaseGateway</a:t>
+              <a:t>Easegress</a:t>
             </a:r>
             <a:r>
               <a:rPr kumimoji="1" lang="zh-CN" altLang="en-US" sz="1600" dirty="0"/>

</xml_diff>

<commit_message>
[doc] update EaseGateway to Easegress (#20)
</commit_message>
<xml_diff>
--- a/docs/architecture.pptx
+++ b/docs/architecture.pptx
@@ -243,7 +243,7 @@
           <a:p>
             <a:fld id="{80386BBC-71F7-C440-ACC3-F0F595527C6C}" type="datetimeFigureOut">
               <a:rPr kumimoji="1" lang="zh-CN" altLang="en-US" smtClean="0"/>
-              <a:t>2021/4/27</a:t>
+              <a:t>2021/5/26</a:t>
             </a:fld>
             <a:endParaRPr kumimoji="1" lang="zh-CN" altLang="en-US"/>
           </a:p>
@@ -420,7 +420,7 @@
           <a:p>
             <a:fld id="{044E383A-B265-4935-8168-671F3DE2F894}" type="datetimeFigureOut">
               <a:rPr lang="zh-CN" altLang="en-US" smtClean="0"/>
-              <a:t>2021/4/27</a:t>
+              <a:t>2021/5/26</a:t>
             </a:fld>
             <a:endParaRPr lang="zh-CN" altLang="en-US"/>
           </a:p>
@@ -1552,7 +1552,7 @@
           <a:p>
             <a:fld id="{BBAAF37F-568A-4C76-B0A5-177AFDC2BD4C}" type="datetimeFigureOut">
               <a:rPr lang="zh-CN" altLang="en-US" smtClean="0"/>
-              <a:t>2021/4/27</a:t>
+              <a:t>2021/5/26</a:t>
             </a:fld>
             <a:endParaRPr lang="zh-CN" altLang="en-US"/>
           </a:p>
@@ -10368,7 +10368,7 @@
                   </a:solidFill>
                   <a:latin typeface="+mj-lt"/>
                 </a:rPr>
-                <a:t>EaseGateway</a:t>
+                <a:t>Easegress</a:t>
               </a:r>
               <a:r>
                 <a:rPr lang="zh-CN" altLang="en-US" sz="2000" b="1" dirty="0">
@@ -10406,7 +10406,7 @@
                 </a:rPr>
                 <a:t>Master</a:t>
               </a:r>
-              <a:endParaRPr lang="en-CN" altLang="zh-CN" sz="2000" b="1">
+              <a:endParaRPr lang="en-CN" altLang="zh-CN" sz="2000" b="1" dirty="0">
                 <a:solidFill>
                   <a:schemeClr val="bg1"/>
                 </a:solidFill>
@@ -11158,15 +11158,7 @@
             <a:pPr algn="ctr"/>
             <a:r>
               <a:rPr kumimoji="1" lang="en-US" altLang="zh-CN" sz="1200" b="1" dirty="0"/>
-              <a:t>(Ease</a:t>
-            </a:r>
-            <a:r>
-              <a:rPr kumimoji="1" lang="zh-CN" altLang="en-US" sz="1200" b="1" dirty="0"/>
-              <a:t> </a:t>
-            </a:r>
-            <a:r>
-              <a:rPr kumimoji="1" lang="en-US" altLang="zh-CN" sz="1200" b="1" dirty="0"/>
-              <a:t>Gateway)</a:t>
+              <a:t>(Easegress)</a:t>
             </a:r>
           </a:p>
         </p:txBody>
@@ -12022,7 +12014,7 @@
         <p:spPr>
           <a:xfrm>
             <a:off x="803250" y="247026"/>
-            <a:ext cx="5254772" cy="461665"/>
+            <a:ext cx="4810741" cy="461665"/>
           </a:xfrm>
           <a:prstGeom prst="rect">
             <a:avLst/>
@@ -12045,7 +12037,7 @@
                 </a:solidFill>
                 <a:latin typeface="+mj-lt"/>
               </a:rPr>
-              <a:t>EaseGateway</a:t>
+              <a:t>Easegress</a:t>
             </a:r>
             <a:r>
               <a:rPr kumimoji="1" lang="zh-CN" altLang="en-US" sz="2400" b="1" dirty="0">
@@ -17833,7 +17825,7 @@
         <p:spPr>
           <a:xfrm>
             <a:off x="2044171" y="877042"/>
-            <a:ext cx="3344057" cy="338554"/>
+            <a:ext cx="3036280" cy="338554"/>
           </a:xfrm>
           <a:prstGeom prst="rect">
             <a:avLst/>
@@ -17848,7 +17840,7 @@
           <a:p>
             <a:r>
               <a:rPr kumimoji="1" lang="en-US" altLang="zh-CN" sz="1600" dirty="0"/>
-              <a:t>EaseGateway</a:t>
+              <a:t>Easegress</a:t>
             </a:r>
             <a:r>
               <a:rPr kumimoji="1" lang="zh-CN" altLang="en-US" sz="1600" dirty="0"/>

</xml_diff>

<commit_message>
update the architecture diagram
</commit_message>
<xml_diff>
--- a/docs/architecture.pptx
+++ b/docs/architecture.pptx
@@ -5,18 +5,19 @@
     <p:sldMasterId id="2147483648" r:id="rId1"/>
   </p:sldMasterIdLst>
   <p:notesMasterIdLst>
-    <p:notesMasterId r:id="rId8"/>
+    <p:notesMasterId r:id="rId9"/>
   </p:notesMasterIdLst>
   <p:handoutMasterIdLst>
-    <p:handoutMasterId r:id="rId9"/>
+    <p:handoutMasterId r:id="rId10"/>
   </p:handoutMasterIdLst>
   <p:sldIdLst>
     <p:sldId id="256" r:id="rId2"/>
-    <p:sldId id="257" r:id="rId3"/>
-    <p:sldId id="258" r:id="rId4"/>
-    <p:sldId id="260" r:id="rId5"/>
-    <p:sldId id="259" r:id="rId6"/>
-    <p:sldId id="261" r:id="rId7"/>
+    <p:sldId id="2441" r:id="rId3"/>
+    <p:sldId id="257" r:id="rId4"/>
+    <p:sldId id="258" r:id="rId5"/>
+    <p:sldId id="260" r:id="rId6"/>
+    <p:sldId id="259" r:id="rId7"/>
+    <p:sldId id="261" r:id="rId8"/>
   </p:sldIdLst>
   <p:sldSz cx="12192000" cy="6858000"/>
   <p:notesSz cx="6858000" cy="9144000"/>
@@ -243,7 +244,7 @@
           <a:p>
             <a:fld id="{80386BBC-71F7-C440-ACC3-F0F595527C6C}" type="datetimeFigureOut">
               <a:rPr kumimoji="1" lang="zh-CN" altLang="en-US" smtClean="0"/>
-              <a:t>2021/5/26</a:t>
+              <a:t>2021/6/7</a:t>
             </a:fld>
             <a:endParaRPr kumimoji="1" lang="zh-CN" altLang="en-US"/>
           </a:p>
@@ -420,7 +421,7 @@
           <a:p>
             <a:fld id="{044E383A-B265-4935-8168-671F3DE2F894}" type="datetimeFigureOut">
               <a:rPr lang="zh-CN" altLang="en-US" smtClean="0"/>
-              <a:t>2021/5/26</a:t>
+              <a:t>2021/6/7</a:t>
             </a:fld>
             <a:endParaRPr lang="zh-CN" altLang="en-US"/>
           </a:p>
@@ -752,7 +753,7 @@
           <a:p>
             <a:fld id="{6A28E5CD-C188-4EE7-A618-C84A2D3EB466}" type="slidenum">
               <a:rPr lang="zh-CN" altLang="en-US" smtClean="0"/>
-              <a:t>2</a:t>
+              <a:t>3</a:t>
             </a:fld>
             <a:endParaRPr lang="zh-CN" altLang="en-US"/>
           </a:p>
@@ -836,7 +837,7 @@
           <a:p>
             <a:fld id="{6A28E5CD-C188-4EE7-A618-C84A2D3EB466}" type="slidenum">
               <a:rPr lang="zh-CN" altLang="en-US" smtClean="0"/>
-              <a:t>4</a:t>
+              <a:t>5</a:t>
             </a:fld>
             <a:endParaRPr lang="zh-CN" altLang="en-US"/>
           </a:p>
@@ -920,7 +921,7 @@
           <a:p>
             <a:fld id="{6A28E5CD-C188-4EE7-A618-C84A2D3EB466}" type="slidenum">
               <a:rPr lang="zh-CN" altLang="en-US" smtClean="0"/>
-              <a:t>5</a:t>
+              <a:t>6</a:t>
             </a:fld>
             <a:endParaRPr lang="zh-CN" altLang="en-US"/>
           </a:p>
@@ -1552,7 +1553,7 @@
           <a:p>
             <a:fld id="{BBAAF37F-568A-4C76-B0A5-177AFDC2BD4C}" type="datetimeFigureOut">
               <a:rPr lang="zh-CN" altLang="en-US" smtClean="0"/>
-              <a:t>2021/5/26</a:t>
+              <a:t>2021/6/7</a:t>
             </a:fld>
             <a:endParaRPr lang="zh-CN" altLang="en-US"/>
           </a:p>
@@ -8671,6 +8672,3129 @@
       </p:grpSpPr>
       <p:sp>
         <p:nvSpPr>
+          <p:cNvPr id="2" name="内容占位符 2">
+            <a:extLst>
+              <a:ext uri="{FF2B5EF4-FFF2-40B4-BE49-F238E27FC236}">
+                <a16:creationId xmlns:a16="http://schemas.microsoft.com/office/drawing/2014/main" id="{113E68F0-2396-D04C-A5CD-53A6DC527C7D}"/>
+              </a:ext>
+            </a:extLst>
+          </p:cNvPr>
+          <p:cNvSpPr txBox="1">
+            <a:spLocks/>
+          </p:cNvSpPr>
+          <p:nvPr/>
+        </p:nvSpPr>
+        <p:spPr>
+          <a:xfrm>
+            <a:off x="1739152" y="4636503"/>
+            <a:ext cx="9152965" cy="1754771"/>
+          </a:xfrm>
+          <a:prstGeom prst="rect">
+            <a:avLst/>
+          </a:prstGeom>
+        </p:spPr>
+        <p:txBody>
+          <a:bodyPr/>
+          <a:lstStyle>
+            <a:lvl1pPr marL="228600" indent="-228600" algn="l" defTabSz="914400" rtl="0" eaLnBrk="1" latinLnBrk="0" hangingPunct="1">
+              <a:lnSpc>
+                <a:spcPct val="90000"/>
+              </a:lnSpc>
+              <a:spcBef>
+                <a:spcPts val="1000"/>
+              </a:spcBef>
+              <a:buFont typeface="Arial" panose="020B0604020202020204" pitchFamily="34" charset="0"/>
+              <a:buChar char="•"/>
+              <a:defRPr sz="2800" kern="1200">
+                <a:solidFill>
+                  <a:schemeClr val="tx1"/>
+                </a:solidFill>
+                <a:latin typeface="+mn-lt"/>
+                <a:ea typeface="+mn-ea"/>
+                <a:cs typeface="+mn-cs"/>
+              </a:defRPr>
+            </a:lvl1pPr>
+            <a:lvl2pPr marL="685800" marR="0" indent="-228600" algn="l" defTabSz="914400" rtl="0" eaLnBrk="1" fontAlgn="auto" latinLnBrk="0" hangingPunct="1">
+              <a:lnSpc>
+                <a:spcPct val="90000"/>
+              </a:lnSpc>
+              <a:spcBef>
+                <a:spcPts val="500"/>
+              </a:spcBef>
+              <a:spcAft>
+                <a:spcPts val="0"/>
+              </a:spcAft>
+              <a:buClrTx/>
+              <a:buSzTx/>
+              <a:buFont typeface="Arial" panose="020B0604020202020204" pitchFamily="34" charset="0"/>
+              <a:buChar char="•"/>
+              <a:tabLst/>
+              <a:defRPr sz="2400" kern="1200">
+                <a:solidFill>
+                  <a:schemeClr val="tx1"/>
+                </a:solidFill>
+                <a:latin typeface="+mn-lt"/>
+                <a:ea typeface="+mn-ea"/>
+                <a:cs typeface="+mn-cs"/>
+              </a:defRPr>
+            </a:lvl2pPr>
+            <a:lvl3pPr marL="1143000" indent="-228600" algn="l" defTabSz="914400" rtl="0" eaLnBrk="1" latinLnBrk="0" hangingPunct="1">
+              <a:lnSpc>
+                <a:spcPct val="90000"/>
+              </a:lnSpc>
+              <a:spcBef>
+                <a:spcPts val="500"/>
+              </a:spcBef>
+              <a:buFont typeface="Arial" panose="020B0604020202020204" pitchFamily="34" charset="0"/>
+              <a:buChar char="•"/>
+              <a:defRPr sz="2000" kern="1200">
+                <a:solidFill>
+                  <a:schemeClr val="tx1"/>
+                </a:solidFill>
+                <a:latin typeface="+mn-lt"/>
+                <a:ea typeface="+mn-ea"/>
+                <a:cs typeface="+mn-cs"/>
+              </a:defRPr>
+            </a:lvl3pPr>
+            <a:lvl4pPr marL="1600200" indent="-228600" algn="l" defTabSz="914400" rtl="0" eaLnBrk="1" latinLnBrk="0" hangingPunct="1">
+              <a:lnSpc>
+                <a:spcPct val="90000"/>
+              </a:lnSpc>
+              <a:spcBef>
+                <a:spcPts val="500"/>
+              </a:spcBef>
+              <a:buFont typeface="Arial" panose="020B0604020202020204" pitchFamily="34" charset="0"/>
+              <a:buChar char="•"/>
+              <a:defRPr sz="1800" kern="1200">
+                <a:solidFill>
+                  <a:schemeClr val="tx1"/>
+                </a:solidFill>
+                <a:latin typeface="+mn-lt"/>
+                <a:ea typeface="+mn-ea"/>
+                <a:cs typeface="+mn-cs"/>
+              </a:defRPr>
+            </a:lvl4pPr>
+            <a:lvl5pPr marL="2057400" indent="-228600" algn="l" defTabSz="914400" rtl="0" eaLnBrk="1" latinLnBrk="0" hangingPunct="1">
+              <a:lnSpc>
+                <a:spcPct val="90000"/>
+              </a:lnSpc>
+              <a:spcBef>
+                <a:spcPts val="500"/>
+              </a:spcBef>
+              <a:buFont typeface="Arial" panose="020B0604020202020204" pitchFamily="34" charset="0"/>
+              <a:buChar char="•"/>
+              <a:defRPr sz="1800" kern="1200">
+                <a:solidFill>
+                  <a:schemeClr val="tx1"/>
+                </a:solidFill>
+                <a:latin typeface="+mn-lt"/>
+                <a:ea typeface="+mn-ea"/>
+                <a:cs typeface="+mn-cs"/>
+              </a:defRPr>
+            </a:lvl5pPr>
+            <a:lvl6pPr marL="2514600" indent="-228600" algn="l" defTabSz="914400" rtl="0" eaLnBrk="1" latinLnBrk="0" hangingPunct="1">
+              <a:lnSpc>
+                <a:spcPct val="90000"/>
+              </a:lnSpc>
+              <a:spcBef>
+                <a:spcPts val="500"/>
+              </a:spcBef>
+              <a:buFont typeface="Arial" panose="020B0604020202020204" pitchFamily="34" charset="0"/>
+              <a:buChar char="•"/>
+              <a:defRPr sz="1800" kern="1200">
+                <a:solidFill>
+                  <a:schemeClr val="tx1"/>
+                </a:solidFill>
+                <a:latin typeface="+mn-lt"/>
+                <a:ea typeface="+mn-ea"/>
+                <a:cs typeface="+mn-cs"/>
+              </a:defRPr>
+            </a:lvl6pPr>
+            <a:lvl7pPr marL="2971800" indent="-228600" algn="l" defTabSz="914400" rtl="0" eaLnBrk="1" latinLnBrk="0" hangingPunct="1">
+              <a:lnSpc>
+                <a:spcPct val="90000"/>
+              </a:lnSpc>
+              <a:spcBef>
+                <a:spcPts val="500"/>
+              </a:spcBef>
+              <a:buFont typeface="Arial" panose="020B0604020202020204" pitchFamily="34" charset="0"/>
+              <a:buChar char="•"/>
+              <a:defRPr sz="1800" kern="1200">
+                <a:solidFill>
+                  <a:schemeClr val="tx1"/>
+                </a:solidFill>
+                <a:latin typeface="+mn-lt"/>
+                <a:ea typeface="+mn-ea"/>
+                <a:cs typeface="+mn-cs"/>
+              </a:defRPr>
+            </a:lvl7pPr>
+            <a:lvl8pPr marL="3429000" indent="-228600" algn="l" defTabSz="914400" rtl="0" eaLnBrk="1" latinLnBrk="0" hangingPunct="1">
+              <a:lnSpc>
+                <a:spcPct val="90000"/>
+              </a:lnSpc>
+              <a:spcBef>
+                <a:spcPts val="500"/>
+              </a:spcBef>
+              <a:buFont typeface="Arial" panose="020B0604020202020204" pitchFamily="34" charset="0"/>
+              <a:buChar char="•"/>
+              <a:defRPr sz="1800" kern="1200">
+                <a:solidFill>
+                  <a:schemeClr val="tx1"/>
+                </a:solidFill>
+                <a:latin typeface="+mn-lt"/>
+                <a:ea typeface="+mn-ea"/>
+                <a:cs typeface="+mn-cs"/>
+              </a:defRPr>
+            </a:lvl8pPr>
+            <a:lvl9pPr marL="3886200" indent="-228600" algn="l" defTabSz="914400" rtl="0" eaLnBrk="1" latinLnBrk="0" hangingPunct="1">
+              <a:lnSpc>
+                <a:spcPct val="90000"/>
+              </a:lnSpc>
+              <a:spcBef>
+                <a:spcPts val="500"/>
+              </a:spcBef>
+              <a:buFont typeface="Arial" panose="020B0604020202020204" pitchFamily="34" charset="0"/>
+              <a:buChar char="•"/>
+              <a:defRPr sz="1800" kern="1200">
+                <a:solidFill>
+                  <a:schemeClr val="tx1"/>
+                </a:solidFill>
+                <a:latin typeface="+mn-lt"/>
+                <a:ea typeface="+mn-ea"/>
+                <a:cs typeface="+mn-cs"/>
+              </a:defRPr>
+            </a:lvl9pPr>
+          </a:lstStyle>
+          <a:p>
+            <a:r>
+              <a:rPr kumimoji="1" lang="zh-CN" altLang="en-US" sz="1600" dirty="0"/>
+              <a:t>通过在老服务机器上安装一个</a:t>
+            </a:r>
+            <a:r>
+              <a:rPr kumimoji="1" lang="en-US" altLang="zh-CN" sz="1600" dirty="0"/>
+              <a:t>Side</a:t>
+            </a:r>
+            <a:r>
+              <a:rPr kumimoji="1" lang="zh-CN" altLang="en-US" sz="1600" dirty="0"/>
+              <a:t> </a:t>
+            </a:r>
+            <a:r>
+              <a:rPr kumimoji="1" lang="en-US" altLang="zh-CN" sz="1600" dirty="0"/>
+              <a:t>Car</a:t>
+            </a:r>
+            <a:r>
+              <a:rPr kumimoji="1" lang="zh-CN" altLang="en-US" sz="1600" dirty="0"/>
+              <a:t>边车服务。把</a:t>
+            </a:r>
+            <a:r>
+              <a:rPr kumimoji="1" lang="en-US" altLang="zh-CN" sz="1600" dirty="0"/>
+              <a:t>【</a:t>
+            </a:r>
+            <a:r>
+              <a:rPr kumimoji="1" lang="zh-CN" altLang="en-US" sz="1600" dirty="0"/>
+              <a:t>服务</a:t>
+            </a:r>
+            <a:r>
+              <a:rPr kumimoji="1" lang="en-US" altLang="zh-CN" sz="1600" dirty="0"/>
+              <a:t>A】</a:t>
+            </a:r>
+            <a:r>
+              <a:rPr kumimoji="1" lang="zh-CN" altLang="en-US" sz="1600" dirty="0"/>
+              <a:t>对外的流量全部劫持到</a:t>
+            </a:r>
+            <a:r>
+              <a:rPr kumimoji="1" lang="en-US" altLang="zh-CN" sz="1600" dirty="0"/>
+              <a:t>Side</a:t>
+            </a:r>
+            <a:r>
+              <a:rPr kumimoji="1" lang="zh-CN" altLang="en-US" sz="1600" dirty="0"/>
+              <a:t> </a:t>
+            </a:r>
+            <a:r>
+              <a:rPr kumimoji="1" lang="en-US" altLang="zh-CN" sz="1600" dirty="0"/>
+              <a:t>Car</a:t>
+            </a:r>
+            <a:r>
+              <a:rPr kumimoji="1" lang="zh-CN" altLang="en-US" sz="1600" dirty="0"/>
+              <a:t>上。</a:t>
+            </a:r>
+            <a:endParaRPr kumimoji="1" lang="en-US" altLang="zh-CN" sz="1600" dirty="0"/>
+          </a:p>
+          <a:p>
+            <a:r>
+              <a:rPr kumimoji="1" lang="zh-CN" altLang="en-US" sz="1600" dirty="0"/>
+              <a:t>并通过</a:t>
+            </a:r>
+            <a:r>
+              <a:rPr kumimoji="1" lang="en-US" altLang="zh-CN" sz="1600" dirty="0"/>
+              <a:t>Java</a:t>
+            </a:r>
+            <a:r>
+              <a:rPr kumimoji="1" lang="zh-CN" altLang="en-US" sz="1600" dirty="0"/>
+              <a:t> </a:t>
+            </a:r>
+            <a:r>
+              <a:rPr kumimoji="1" lang="en-US" altLang="zh-CN" sz="1600" dirty="0"/>
+              <a:t>Agent</a:t>
+            </a:r>
+            <a:r>
+              <a:rPr kumimoji="1" lang="zh-CN" altLang="en-US" sz="1600" dirty="0"/>
+              <a:t>的字节码注入技术，采集</a:t>
+            </a:r>
+            <a:r>
+              <a:rPr kumimoji="1" lang="en-US" altLang="zh-CN" sz="1600" dirty="0"/>
+              <a:t>【</a:t>
+            </a:r>
+            <a:r>
+              <a:rPr kumimoji="1" lang="zh-CN" altLang="en-US" sz="1600" dirty="0"/>
+              <a:t>服务</a:t>
+            </a:r>
+            <a:r>
+              <a:rPr kumimoji="1" lang="en-US" altLang="zh-CN" sz="1600" dirty="0"/>
+              <a:t>A】</a:t>
+            </a:r>
+            <a:r>
+              <a:rPr kumimoji="1" lang="zh-CN" altLang="en-US" sz="1600" dirty="0"/>
+              <a:t>的调用链和指标数据。</a:t>
+            </a:r>
+            <a:endParaRPr kumimoji="1" lang="en-US" altLang="zh-CN" sz="1600" dirty="0"/>
+          </a:p>
+          <a:p>
+            <a:r>
+              <a:rPr kumimoji="1" lang="zh-CN" altLang="en-US" sz="1600" dirty="0"/>
+              <a:t>这样就可以把一个老旧的服务改造成新的服务，并接纳入新型的服务框架中。</a:t>
+            </a:r>
+            <a:endParaRPr kumimoji="1" lang="en-US" altLang="zh-CN" sz="1600" dirty="0"/>
+          </a:p>
+          <a:p>
+            <a:r>
+              <a:rPr kumimoji="1" lang="zh-CN" altLang="en-US" sz="1600" dirty="0"/>
+              <a:t>这个方法对老架构和新架构都完全透明。</a:t>
+            </a:r>
+            <a:endParaRPr kumimoji="1" lang="en-US" altLang="zh-CN" sz="1600" dirty="0"/>
+          </a:p>
+          <a:p>
+            <a:endParaRPr kumimoji="1" lang="en-US" altLang="zh-CN" sz="1600" dirty="0"/>
+          </a:p>
+          <a:p>
+            <a:endParaRPr kumimoji="1" lang="en-US" altLang="zh-CN" sz="1600" dirty="0"/>
+          </a:p>
+          <a:p>
+            <a:endParaRPr kumimoji="1" lang="en-US" altLang="zh-CN" sz="1600" dirty="0"/>
+          </a:p>
+        </p:txBody>
+      </p:sp>
+      <p:grpSp>
+        <p:nvGrpSpPr>
+          <p:cNvPr id="3" name="组合 2">
+            <a:extLst>
+              <a:ext uri="{FF2B5EF4-FFF2-40B4-BE49-F238E27FC236}">
+                <a16:creationId xmlns:a16="http://schemas.microsoft.com/office/drawing/2014/main" id="{5F8C2E39-4890-E946-A1CD-9810D3AA7876}"/>
+              </a:ext>
+            </a:extLst>
+          </p:cNvPr>
+          <p:cNvGrpSpPr/>
+          <p:nvPr/>
+        </p:nvGrpSpPr>
+        <p:grpSpPr>
+          <a:xfrm>
+            <a:off x="2900259" y="2922327"/>
+            <a:ext cx="2268754" cy="735291"/>
+            <a:chOff x="5191811" y="3378497"/>
+            <a:chExt cx="2142243" cy="735291"/>
+          </a:xfrm>
+        </p:grpSpPr>
+        <p:sp>
+          <p:nvSpPr>
+            <p:cNvPr id="4" name="圆角矩形 3">
+              <a:extLst>
+                <a:ext uri="{FF2B5EF4-FFF2-40B4-BE49-F238E27FC236}">
+                  <a16:creationId xmlns:a16="http://schemas.microsoft.com/office/drawing/2014/main" id="{F0F5D29E-CB1F-BE42-9F58-C8A446A1CE04}"/>
+                </a:ext>
+              </a:extLst>
+            </p:cNvPr>
+            <p:cNvSpPr/>
+            <p:nvPr/>
+          </p:nvSpPr>
+          <p:spPr>
+            <a:xfrm>
+              <a:off x="5191811" y="3378497"/>
+              <a:ext cx="2142243" cy="735291"/>
+            </a:xfrm>
+            <a:prstGeom prst="roundRect">
+              <a:avLst/>
+            </a:prstGeom>
+            <a:solidFill>
+              <a:schemeClr val="bg1"/>
+            </a:solidFill>
+            <a:ln/>
+          </p:spPr>
+          <p:style>
+            <a:lnRef idx="2">
+              <a:schemeClr val="dk1">
+                <a:shade val="50000"/>
+              </a:schemeClr>
+            </a:lnRef>
+            <a:fillRef idx="1">
+              <a:schemeClr val="dk1"/>
+            </a:fillRef>
+            <a:effectRef idx="0">
+              <a:schemeClr val="dk1"/>
+            </a:effectRef>
+            <a:fontRef idx="minor">
+              <a:schemeClr val="lt1"/>
+            </a:fontRef>
+          </p:style>
+          <p:txBody>
+            <a:bodyPr rot="0" spcFirstLastPara="0" vertOverflow="overflow" horzOverflow="overflow" vert="horz" wrap="square" lIns="91440" tIns="45720" rIns="91440" bIns="45720" numCol="1" spcCol="0" rtlCol="0" fromWordArt="0" anchor="ctr" anchorCtr="0" forceAA="0" compatLnSpc="1">
+              <a:prstTxWarp prst="textNoShape">
+                <a:avLst/>
+              </a:prstTxWarp>
+              <a:noAutofit/>
+            </a:bodyPr>
+            <a:lstStyle/>
+            <a:p>
+              <a:r>
+                <a:rPr kumimoji="1" lang="zh-CN" altLang="en-US" sz="1400" b="1" dirty="0">
+                  <a:solidFill>
+                    <a:schemeClr val="accent6"/>
+                  </a:solidFill>
+                  <a:latin typeface="+mj-ea"/>
+                  <a:ea typeface="+mj-ea"/>
+                </a:rPr>
+                <a:t>服务</a:t>
+              </a:r>
+              <a:r>
+                <a:rPr kumimoji="1" lang="en-US" altLang="zh-CN" sz="1400" b="1" dirty="0">
+                  <a:solidFill>
+                    <a:schemeClr val="accent6"/>
+                  </a:solidFill>
+                  <a:latin typeface="+mj-ea"/>
+                  <a:ea typeface="+mj-ea"/>
+                </a:rPr>
+                <a:t>B</a:t>
+              </a:r>
+            </a:p>
+          </p:txBody>
+        </p:sp>
+        <p:sp>
+          <p:nvSpPr>
+            <p:cNvPr id="5" name="圆角矩形 4">
+              <a:extLst>
+                <a:ext uri="{FF2B5EF4-FFF2-40B4-BE49-F238E27FC236}">
+                  <a16:creationId xmlns:a16="http://schemas.microsoft.com/office/drawing/2014/main" id="{D9FFA7CF-5652-A041-A00D-02A2498585EF}"/>
+                </a:ext>
+              </a:extLst>
+            </p:cNvPr>
+            <p:cNvSpPr/>
+            <p:nvPr/>
+          </p:nvSpPr>
+          <p:spPr>
+            <a:xfrm>
+              <a:off x="5885740" y="3498968"/>
+              <a:ext cx="1325766" cy="494348"/>
+            </a:xfrm>
+            <a:prstGeom prst="roundRect">
+              <a:avLst/>
+            </a:prstGeom>
+            <a:ln/>
+          </p:spPr>
+          <p:style>
+            <a:lnRef idx="2">
+              <a:schemeClr val="accent4">
+                <a:shade val="50000"/>
+              </a:schemeClr>
+            </a:lnRef>
+            <a:fillRef idx="1">
+              <a:schemeClr val="accent4"/>
+            </a:fillRef>
+            <a:effectRef idx="0">
+              <a:schemeClr val="accent4"/>
+            </a:effectRef>
+            <a:fontRef idx="minor">
+              <a:schemeClr val="lt1"/>
+            </a:fontRef>
+          </p:style>
+          <p:txBody>
+            <a:bodyPr rot="0" spcFirstLastPara="0" vertOverflow="overflow" horzOverflow="overflow" vert="horz" wrap="square" lIns="91440" tIns="45720" rIns="91440" bIns="45720" numCol="1" spcCol="0" rtlCol="0" fromWordArt="0" anchor="ctr" anchorCtr="0" forceAA="0" compatLnSpc="1">
+              <a:prstTxWarp prst="textNoShape">
+                <a:avLst/>
+              </a:prstTxWarp>
+              <a:noAutofit/>
+            </a:bodyPr>
+            <a:lstStyle/>
+            <a:p>
+              <a:pPr algn="ctr"/>
+              <a:r>
+                <a:rPr kumimoji="1" lang="en-US" altLang="zh-CN" sz="1000" dirty="0">
+                  <a:solidFill>
+                    <a:schemeClr val="bg1"/>
+                  </a:solidFill>
+                  <a:latin typeface="+mj-ea"/>
+                  <a:ea typeface="+mj-ea"/>
+                </a:rPr>
+                <a:t>Service</a:t>
+              </a:r>
+              <a:r>
+                <a:rPr kumimoji="1" lang="zh-CN" altLang="en-US" sz="1000" dirty="0">
+                  <a:solidFill>
+                    <a:schemeClr val="bg1"/>
+                  </a:solidFill>
+                  <a:latin typeface="+mj-ea"/>
+                  <a:ea typeface="+mj-ea"/>
+                </a:rPr>
+                <a:t> </a:t>
+              </a:r>
+              <a:r>
+                <a:rPr kumimoji="1" lang="en-US" altLang="zh-CN" sz="1000" dirty="0">
+                  <a:solidFill>
+                    <a:schemeClr val="bg1"/>
+                  </a:solidFill>
+                  <a:latin typeface="+mj-ea"/>
+                  <a:ea typeface="+mj-ea"/>
+                </a:rPr>
+                <a:t>Framework</a:t>
+              </a:r>
+            </a:p>
+            <a:p>
+              <a:pPr algn="ctr"/>
+              <a:r>
+                <a:rPr kumimoji="1" lang="en-US" altLang="zh-CN" sz="1000" dirty="0">
+                  <a:solidFill>
+                    <a:schemeClr val="bg1"/>
+                  </a:solidFill>
+                  <a:latin typeface="+mj-ea"/>
+                  <a:ea typeface="+mj-ea"/>
+                </a:rPr>
+                <a:t>(SDK</a:t>
+              </a:r>
+              <a:r>
+                <a:rPr kumimoji="1" lang="zh-CN" altLang="en-US" sz="1000" dirty="0">
+                  <a:solidFill>
+                    <a:schemeClr val="bg1"/>
+                  </a:solidFill>
+                  <a:latin typeface="+mj-ea"/>
+                  <a:ea typeface="+mj-ea"/>
+                </a:rPr>
+                <a:t>内嵌</a:t>
+              </a:r>
+              <a:r>
+                <a:rPr kumimoji="1" lang="en-US" altLang="zh-CN" sz="1000" dirty="0">
+                  <a:solidFill>
+                    <a:schemeClr val="bg1"/>
+                  </a:solidFill>
+                  <a:latin typeface="+mj-ea"/>
+                  <a:ea typeface="+mj-ea"/>
+                </a:rPr>
+                <a:t>)</a:t>
+              </a:r>
+              <a:endParaRPr kumimoji="1" lang="zh-CN" altLang="en-US" sz="1000" dirty="0">
+                <a:solidFill>
+                  <a:schemeClr val="bg1"/>
+                </a:solidFill>
+                <a:latin typeface="+mj-ea"/>
+                <a:ea typeface="+mj-ea"/>
+              </a:endParaRPr>
+            </a:p>
+          </p:txBody>
+        </p:sp>
+      </p:grpSp>
+      <p:grpSp>
+        <p:nvGrpSpPr>
+          <p:cNvPr id="6" name="组合 5">
+            <a:extLst>
+              <a:ext uri="{FF2B5EF4-FFF2-40B4-BE49-F238E27FC236}">
+                <a16:creationId xmlns:a16="http://schemas.microsoft.com/office/drawing/2014/main" id="{B2B03D98-B0C4-814B-9241-B0EEC8C648B2}"/>
+              </a:ext>
+            </a:extLst>
+          </p:cNvPr>
+          <p:cNvGrpSpPr/>
+          <p:nvPr/>
+        </p:nvGrpSpPr>
+        <p:grpSpPr>
+          <a:xfrm>
+            <a:off x="2830818" y="1565106"/>
+            <a:ext cx="2407637" cy="830153"/>
+            <a:chOff x="1109595" y="1574071"/>
+            <a:chExt cx="2407637" cy="830153"/>
+          </a:xfrm>
+        </p:grpSpPr>
+        <p:sp>
+          <p:nvSpPr>
+            <p:cNvPr id="7" name="圆角矩形 6">
+              <a:extLst>
+                <a:ext uri="{FF2B5EF4-FFF2-40B4-BE49-F238E27FC236}">
+                  <a16:creationId xmlns:a16="http://schemas.microsoft.com/office/drawing/2014/main" id="{347CFD2D-770D-704B-AA37-F8DFB8997E8F}"/>
+                </a:ext>
+              </a:extLst>
+            </p:cNvPr>
+            <p:cNvSpPr/>
+            <p:nvPr/>
+          </p:nvSpPr>
+          <p:spPr>
+            <a:xfrm>
+              <a:off x="1109595" y="1574071"/>
+              <a:ext cx="2407637" cy="830153"/>
+            </a:xfrm>
+            <a:prstGeom prst="roundRect">
+              <a:avLst/>
+            </a:prstGeom>
+            <a:noFill/>
+            <a:ln w="19050">
+              <a:solidFill>
+                <a:schemeClr val="tx1">
+                  <a:lumMod val="50000"/>
+                  <a:lumOff val="50000"/>
+                </a:schemeClr>
+              </a:solidFill>
+              <a:prstDash val="dash"/>
+            </a:ln>
+          </p:spPr>
+          <p:style>
+            <a:lnRef idx="2">
+              <a:schemeClr val="accent1">
+                <a:shade val="50000"/>
+              </a:schemeClr>
+            </a:lnRef>
+            <a:fillRef idx="1">
+              <a:schemeClr val="accent1"/>
+            </a:fillRef>
+            <a:effectRef idx="0">
+              <a:schemeClr val="accent1"/>
+            </a:effectRef>
+            <a:fontRef idx="minor">
+              <a:schemeClr val="lt1"/>
+            </a:fontRef>
+          </p:style>
+          <p:txBody>
+            <a:bodyPr rot="0" spcFirstLastPara="0" vertOverflow="overflow" horzOverflow="overflow" vert="horz" wrap="square" lIns="91440" tIns="45720" rIns="91440" bIns="45720" numCol="1" spcCol="0" rtlCol="0" fromWordArt="0" anchor="ctr" anchorCtr="0" forceAA="0" compatLnSpc="1">
+              <a:prstTxWarp prst="textNoShape">
+                <a:avLst/>
+              </a:prstTxWarp>
+              <a:noAutofit/>
+            </a:bodyPr>
+            <a:lstStyle/>
+            <a:p>
+              <a:pPr algn="ctr"/>
+              <a:endParaRPr kumimoji="1" lang="zh-CN" altLang="en-US" sz="1400" b="1" dirty="0">
+                <a:solidFill>
+                  <a:schemeClr val="tx1"/>
+                </a:solidFill>
+                <a:latin typeface="微软雅黑" panose="020B0503020204020204" pitchFamily="34" charset="-122"/>
+                <a:ea typeface="微软雅黑" panose="020B0503020204020204" pitchFamily="34" charset="-122"/>
+              </a:endParaRPr>
+            </a:p>
+          </p:txBody>
+        </p:sp>
+        <p:grpSp>
+          <p:nvGrpSpPr>
+            <p:cNvPr id="8" name="组合 7">
+              <a:extLst>
+                <a:ext uri="{FF2B5EF4-FFF2-40B4-BE49-F238E27FC236}">
+                  <a16:creationId xmlns:a16="http://schemas.microsoft.com/office/drawing/2014/main" id="{7D2A3489-1B0B-ED48-AF4B-758BD59A2A3B}"/>
+                </a:ext>
+              </a:extLst>
+            </p:cNvPr>
+            <p:cNvGrpSpPr/>
+            <p:nvPr/>
+          </p:nvGrpSpPr>
+          <p:grpSpPr>
+            <a:xfrm>
+              <a:off x="1179036" y="1621501"/>
+              <a:ext cx="2268753" cy="735291"/>
+              <a:chOff x="5225555" y="3258024"/>
+              <a:chExt cx="2268753" cy="735291"/>
+            </a:xfrm>
+          </p:grpSpPr>
+          <p:sp>
+            <p:nvSpPr>
+              <p:cNvPr id="9" name="圆角矩形 8">
+                <a:extLst>
+                  <a:ext uri="{FF2B5EF4-FFF2-40B4-BE49-F238E27FC236}">
+                    <a16:creationId xmlns:a16="http://schemas.microsoft.com/office/drawing/2014/main" id="{F217B325-6309-0742-9D17-765CD1DE9873}"/>
+                  </a:ext>
+                </a:extLst>
+              </p:cNvPr>
+              <p:cNvSpPr/>
+              <p:nvPr/>
+            </p:nvSpPr>
+            <p:spPr>
+              <a:xfrm>
+                <a:off x="5225555" y="3258024"/>
+                <a:ext cx="800344" cy="735291"/>
+              </a:xfrm>
+              <a:prstGeom prst="roundRect">
+                <a:avLst/>
+              </a:prstGeom>
+              <a:solidFill>
+                <a:schemeClr val="bg1"/>
+              </a:solidFill>
+              <a:ln/>
+            </p:spPr>
+            <p:style>
+              <a:lnRef idx="2">
+                <a:schemeClr val="dk1">
+                  <a:shade val="50000"/>
+                </a:schemeClr>
+              </a:lnRef>
+              <a:fillRef idx="1">
+                <a:schemeClr val="dk1"/>
+              </a:fillRef>
+              <a:effectRef idx="0">
+                <a:schemeClr val="dk1"/>
+              </a:effectRef>
+              <a:fontRef idx="minor">
+                <a:schemeClr val="lt1"/>
+              </a:fontRef>
+            </p:style>
+            <p:txBody>
+              <a:bodyPr rot="0" spcFirstLastPara="0" vertOverflow="overflow" horzOverflow="overflow" vert="horz" wrap="square" lIns="91440" tIns="45720" rIns="91440" bIns="45720" numCol="1" spcCol="0" rtlCol="0" fromWordArt="0" anchor="t" anchorCtr="0" forceAA="0" compatLnSpc="1">
+                <a:prstTxWarp prst="textNoShape">
+                  <a:avLst/>
+                </a:prstTxWarp>
+                <a:noAutofit/>
+              </a:bodyPr>
+              <a:lstStyle/>
+              <a:p>
+                <a:pPr algn="ctr"/>
+                <a:r>
+                  <a:rPr kumimoji="1" lang="zh-CN" altLang="en-US" sz="1400" b="1" dirty="0">
+                    <a:solidFill>
+                      <a:schemeClr val="accent6"/>
+                    </a:solidFill>
+                    <a:latin typeface="+mj-ea"/>
+                    <a:ea typeface="+mj-ea"/>
+                  </a:rPr>
+                  <a:t>服务</a:t>
+                </a:r>
+                <a:r>
+                  <a:rPr kumimoji="1" lang="en-US" altLang="zh-CN" sz="1400" b="1" dirty="0">
+                    <a:solidFill>
+                      <a:schemeClr val="accent6"/>
+                    </a:solidFill>
+                    <a:latin typeface="+mj-ea"/>
+                    <a:ea typeface="+mj-ea"/>
+                  </a:rPr>
+                  <a:t>A</a:t>
+                </a:r>
+              </a:p>
+            </p:txBody>
+          </p:sp>
+          <p:sp>
+            <p:nvSpPr>
+              <p:cNvPr id="10" name="圆角矩形 9">
+                <a:extLst>
+                  <a:ext uri="{FF2B5EF4-FFF2-40B4-BE49-F238E27FC236}">
+                    <a16:creationId xmlns:a16="http://schemas.microsoft.com/office/drawing/2014/main" id="{37943D5C-D9C4-7249-A652-0C7AD71B9DE5}"/>
+                  </a:ext>
+                </a:extLst>
+              </p:cNvPr>
+              <p:cNvSpPr/>
+              <p:nvPr/>
+            </p:nvSpPr>
+            <p:spPr>
+              <a:xfrm>
+                <a:off x="6212263" y="3258024"/>
+                <a:ext cx="1282045" cy="735291"/>
+              </a:xfrm>
+              <a:prstGeom prst="roundRect">
+                <a:avLst/>
+              </a:prstGeom>
+              <a:ln/>
+            </p:spPr>
+            <p:style>
+              <a:lnRef idx="2">
+                <a:schemeClr val="accent4">
+                  <a:shade val="50000"/>
+                </a:schemeClr>
+              </a:lnRef>
+              <a:fillRef idx="1">
+                <a:schemeClr val="accent4"/>
+              </a:fillRef>
+              <a:effectRef idx="0">
+                <a:schemeClr val="accent4"/>
+              </a:effectRef>
+              <a:fontRef idx="minor">
+                <a:schemeClr val="lt1"/>
+              </a:fontRef>
+            </p:style>
+            <p:txBody>
+              <a:bodyPr rot="0" spcFirstLastPara="0" vertOverflow="overflow" horzOverflow="overflow" vert="horz" wrap="square" lIns="91440" tIns="45720" rIns="91440" bIns="45720" numCol="1" spcCol="0" rtlCol="0" fromWordArt="0" anchor="ctr" anchorCtr="0" forceAA="0" compatLnSpc="1">
+                <a:prstTxWarp prst="textNoShape">
+                  <a:avLst/>
+                </a:prstTxWarp>
+                <a:noAutofit/>
+              </a:bodyPr>
+              <a:lstStyle/>
+              <a:p>
+                <a:pPr algn="ctr"/>
+                <a:r>
+                  <a:rPr kumimoji="1" lang="en-US" altLang="zh-CN" sz="1600" dirty="0">
+                    <a:solidFill>
+                      <a:schemeClr val="bg1"/>
+                    </a:solidFill>
+                    <a:latin typeface="+mj-ea"/>
+                    <a:ea typeface="+mj-ea"/>
+                  </a:rPr>
+                  <a:t>Side</a:t>
+                </a:r>
+                <a:r>
+                  <a:rPr kumimoji="1" lang="zh-CN" altLang="en-US" sz="1600" dirty="0">
+                    <a:solidFill>
+                      <a:schemeClr val="bg1"/>
+                    </a:solidFill>
+                    <a:latin typeface="+mj-ea"/>
+                    <a:ea typeface="+mj-ea"/>
+                  </a:rPr>
+                  <a:t> </a:t>
+                </a:r>
+                <a:r>
+                  <a:rPr kumimoji="1" lang="en-US" altLang="zh-CN" sz="1600" dirty="0">
+                    <a:solidFill>
+                      <a:schemeClr val="bg1"/>
+                    </a:solidFill>
+                    <a:latin typeface="+mj-ea"/>
+                    <a:ea typeface="+mj-ea"/>
+                  </a:rPr>
+                  <a:t>Car</a:t>
+                </a:r>
+              </a:p>
+              <a:p>
+                <a:pPr algn="ctr"/>
+                <a:r>
+                  <a:rPr kumimoji="1" lang="en-US" altLang="zh-CN" sz="1200" dirty="0">
+                    <a:solidFill>
+                      <a:schemeClr val="bg1"/>
+                    </a:solidFill>
+                    <a:latin typeface="+mj-ea"/>
+                    <a:ea typeface="+mj-ea"/>
+                  </a:rPr>
+                  <a:t>(</a:t>
+                </a:r>
+                <a:r>
+                  <a:rPr kumimoji="1" lang="zh-CN" altLang="en-US" sz="1200" dirty="0">
+                    <a:solidFill>
+                      <a:schemeClr val="bg1"/>
+                    </a:solidFill>
+                    <a:latin typeface="+mj-ea"/>
+                    <a:ea typeface="+mj-ea"/>
+                  </a:rPr>
+                  <a:t>本机部署</a:t>
+                </a:r>
+                <a:r>
+                  <a:rPr kumimoji="1" lang="en-US" altLang="zh-CN" sz="1200" dirty="0">
+                    <a:solidFill>
+                      <a:schemeClr val="bg1"/>
+                    </a:solidFill>
+                    <a:latin typeface="+mj-ea"/>
+                    <a:ea typeface="+mj-ea"/>
+                  </a:rPr>
+                  <a:t>)</a:t>
+                </a:r>
+                <a:endParaRPr kumimoji="1" lang="zh-CN" altLang="en-US" sz="1200" dirty="0">
+                  <a:solidFill>
+                    <a:schemeClr val="bg1"/>
+                  </a:solidFill>
+                  <a:latin typeface="+mj-ea"/>
+                  <a:ea typeface="+mj-ea"/>
+                </a:endParaRPr>
+              </a:p>
+            </p:txBody>
+          </p:sp>
+          <p:cxnSp>
+            <p:nvCxnSpPr>
+              <p:cNvPr id="11" name="直线箭头连接符 10">
+                <a:extLst>
+                  <a:ext uri="{FF2B5EF4-FFF2-40B4-BE49-F238E27FC236}">
+                    <a16:creationId xmlns:a16="http://schemas.microsoft.com/office/drawing/2014/main" id="{061ED091-2C98-0D43-B860-B12618205E18}"/>
+                  </a:ext>
+                </a:extLst>
+              </p:cNvPr>
+              <p:cNvCxnSpPr>
+                <a:cxnSpLocks/>
+                <a:stCxn id="9" idx="3"/>
+                <a:endCxn id="10" idx="1"/>
+              </p:cNvCxnSpPr>
+              <p:nvPr/>
+            </p:nvCxnSpPr>
+            <p:spPr>
+              <a:xfrm>
+                <a:off x="6025899" y="3625670"/>
+                <a:ext cx="186364" cy="0"/>
+              </a:xfrm>
+              <a:prstGeom prst="straightConnector1">
+                <a:avLst/>
+              </a:prstGeom>
+              <a:ln w="28575">
+                <a:solidFill>
+                  <a:schemeClr val="tx1"/>
+                </a:solidFill>
+                <a:prstDash val="solid"/>
+                <a:tailEnd type="triangle"/>
+              </a:ln>
+            </p:spPr>
+            <p:style>
+              <a:lnRef idx="1">
+                <a:schemeClr val="accent1"/>
+              </a:lnRef>
+              <a:fillRef idx="0">
+                <a:schemeClr val="accent1"/>
+              </a:fillRef>
+              <a:effectRef idx="0">
+                <a:schemeClr val="accent1"/>
+              </a:effectRef>
+              <a:fontRef idx="minor">
+                <a:schemeClr val="tx1"/>
+              </a:fontRef>
+            </p:style>
+          </p:cxnSp>
+        </p:grpSp>
+      </p:grpSp>
+      <p:sp>
+        <p:nvSpPr>
+          <p:cNvPr id="12" name="圆角矩形 11">
+            <a:extLst>
+              <a:ext uri="{FF2B5EF4-FFF2-40B4-BE49-F238E27FC236}">
+                <a16:creationId xmlns:a16="http://schemas.microsoft.com/office/drawing/2014/main" id="{0B25671E-642C-4B47-9F26-61A34D98B00F}"/>
+              </a:ext>
+            </a:extLst>
+          </p:cNvPr>
+          <p:cNvSpPr/>
+          <p:nvPr/>
+        </p:nvSpPr>
+        <p:spPr>
+          <a:xfrm>
+            <a:off x="9192289" y="1525237"/>
+            <a:ext cx="935754" cy="589178"/>
+          </a:xfrm>
+          <a:prstGeom prst="roundRect">
+            <a:avLst/>
+          </a:prstGeom>
+          <a:ln/>
+        </p:spPr>
+        <p:style>
+          <a:lnRef idx="2">
+            <a:schemeClr val="accent4"/>
+          </a:lnRef>
+          <a:fillRef idx="1">
+            <a:schemeClr val="lt1"/>
+          </a:fillRef>
+          <a:effectRef idx="0">
+            <a:schemeClr val="accent4"/>
+          </a:effectRef>
+          <a:fontRef idx="minor">
+            <a:schemeClr val="dk1"/>
+          </a:fontRef>
+        </p:style>
+        <p:txBody>
+          <a:bodyPr rot="0" spcFirstLastPara="0" vertOverflow="overflow" horzOverflow="overflow" vert="horz" wrap="square" lIns="91440" tIns="45720" rIns="91440" bIns="45720" numCol="1" spcCol="0" rtlCol="0" fromWordArt="0" anchor="ctr" anchorCtr="0" forceAA="0" compatLnSpc="1">
+            <a:prstTxWarp prst="textNoShape">
+              <a:avLst/>
+            </a:prstTxWarp>
+            <a:noAutofit/>
+          </a:bodyPr>
+          <a:lstStyle/>
+          <a:p>
+            <a:pPr algn="ctr"/>
+            <a:r>
+              <a:rPr kumimoji="1" lang="zh-CN" altLang="en-US" sz="1400" b="1" dirty="0">
+                <a:solidFill>
+                  <a:schemeClr val="accent6"/>
+                </a:solidFill>
+                <a:latin typeface="微软雅黑" panose="020B0503020204020204" pitchFamily="34" charset="-122"/>
+                <a:ea typeface="微软雅黑" panose="020B0503020204020204" pitchFamily="34" charset="-122"/>
+              </a:rPr>
+              <a:t>微服务</a:t>
+            </a:r>
+            <a:r>
+              <a:rPr kumimoji="1" lang="en-US" altLang="zh-CN" sz="1400" b="1" dirty="0">
+                <a:solidFill>
+                  <a:schemeClr val="accent6"/>
+                </a:solidFill>
+                <a:latin typeface="微软雅黑" panose="020B0503020204020204" pitchFamily="34" charset="-122"/>
+                <a:ea typeface="微软雅黑" panose="020B0503020204020204" pitchFamily="34" charset="-122"/>
+              </a:rPr>
+              <a:t>A</a:t>
+            </a:r>
+            <a:endParaRPr kumimoji="1" lang="zh-CN" altLang="en-US" sz="1400" b="1" dirty="0">
+              <a:solidFill>
+                <a:schemeClr val="accent6"/>
+              </a:solidFill>
+              <a:latin typeface="微软雅黑" panose="020B0503020204020204" pitchFamily="34" charset="-122"/>
+              <a:ea typeface="微软雅黑" panose="020B0503020204020204" pitchFamily="34" charset="-122"/>
+            </a:endParaRPr>
+          </a:p>
+        </p:txBody>
+      </p:sp>
+      <p:sp>
+        <p:nvSpPr>
+          <p:cNvPr id="13" name="圆角矩形 12">
+            <a:extLst>
+              <a:ext uri="{FF2B5EF4-FFF2-40B4-BE49-F238E27FC236}">
+                <a16:creationId xmlns:a16="http://schemas.microsoft.com/office/drawing/2014/main" id="{A0D401D9-BB1E-A446-A746-D887ED6ADB9B}"/>
+              </a:ext>
+            </a:extLst>
+          </p:cNvPr>
+          <p:cNvSpPr/>
+          <p:nvPr/>
+        </p:nvSpPr>
+        <p:spPr>
+          <a:xfrm>
+            <a:off x="9192289" y="2296839"/>
+            <a:ext cx="935754" cy="589178"/>
+          </a:xfrm>
+          <a:prstGeom prst="roundRect">
+            <a:avLst/>
+          </a:prstGeom>
+          <a:ln/>
+        </p:spPr>
+        <p:style>
+          <a:lnRef idx="2">
+            <a:schemeClr val="accent4"/>
+          </a:lnRef>
+          <a:fillRef idx="1">
+            <a:schemeClr val="lt1"/>
+          </a:fillRef>
+          <a:effectRef idx="0">
+            <a:schemeClr val="accent4"/>
+          </a:effectRef>
+          <a:fontRef idx="minor">
+            <a:schemeClr val="dk1"/>
+          </a:fontRef>
+        </p:style>
+        <p:txBody>
+          <a:bodyPr rot="0" spcFirstLastPara="0" vertOverflow="overflow" horzOverflow="overflow" vert="horz" wrap="square" lIns="91440" tIns="45720" rIns="91440" bIns="45720" numCol="1" spcCol="0" rtlCol="0" fromWordArt="0" anchor="ctr" anchorCtr="0" forceAA="0" compatLnSpc="1">
+            <a:prstTxWarp prst="textNoShape">
+              <a:avLst/>
+            </a:prstTxWarp>
+            <a:noAutofit/>
+          </a:bodyPr>
+          <a:lstStyle/>
+          <a:p>
+            <a:pPr algn="ctr"/>
+            <a:r>
+              <a:rPr kumimoji="1" lang="zh-CN" altLang="en-US" sz="1400" b="1" dirty="0">
+                <a:solidFill>
+                  <a:schemeClr val="accent6"/>
+                </a:solidFill>
+                <a:latin typeface="微软雅黑" panose="020B0503020204020204" pitchFamily="34" charset="-122"/>
+                <a:ea typeface="微软雅黑" panose="020B0503020204020204" pitchFamily="34" charset="-122"/>
+              </a:rPr>
+              <a:t>微服务</a:t>
+            </a:r>
+            <a:r>
+              <a:rPr kumimoji="1" lang="en-US" altLang="zh-CN" sz="1400" b="1" dirty="0">
+                <a:solidFill>
+                  <a:schemeClr val="accent6"/>
+                </a:solidFill>
+                <a:latin typeface="微软雅黑" panose="020B0503020204020204" pitchFamily="34" charset="-122"/>
+                <a:ea typeface="微软雅黑" panose="020B0503020204020204" pitchFamily="34" charset="-122"/>
+              </a:rPr>
+              <a:t>B</a:t>
+            </a:r>
+            <a:endParaRPr kumimoji="1" lang="zh-CN" altLang="en-US" sz="1400" b="1" dirty="0">
+              <a:solidFill>
+                <a:schemeClr val="accent6"/>
+              </a:solidFill>
+              <a:latin typeface="微软雅黑" panose="020B0503020204020204" pitchFamily="34" charset="-122"/>
+              <a:ea typeface="微软雅黑" panose="020B0503020204020204" pitchFamily="34" charset="-122"/>
+            </a:endParaRPr>
+          </a:p>
+        </p:txBody>
+      </p:sp>
+      <p:sp>
+        <p:nvSpPr>
+          <p:cNvPr id="14" name="圆角矩形 13">
+            <a:extLst>
+              <a:ext uri="{FF2B5EF4-FFF2-40B4-BE49-F238E27FC236}">
+                <a16:creationId xmlns:a16="http://schemas.microsoft.com/office/drawing/2014/main" id="{A61B9FBF-7063-3045-8D56-EBFBE95462F2}"/>
+              </a:ext>
+            </a:extLst>
+          </p:cNvPr>
+          <p:cNvSpPr/>
+          <p:nvPr/>
+        </p:nvSpPr>
+        <p:spPr>
+          <a:xfrm>
+            <a:off x="9192289" y="3068440"/>
+            <a:ext cx="935754" cy="589178"/>
+          </a:xfrm>
+          <a:prstGeom prst="roundRect">
+            <a:avLst/>
+          </a:prstGeom>
+          <a:ln/>
+        </p:spPr>
+        <p:style>
+          <a:lnRef idx="2">
+            <a:schemeClr val="accent4"/>
+          </a:lnRef>
+          <a:fillRef idx="1">
+            <a:schemeClr val="lt1"/>
+          </a:fillRef>
+          <a:effectRef idx="0">
+            <a:schemeClr val="accent4"/>
+          </a:effectRef>
+          <a:fontRef idx="minor">
+            <a:schemeClr val="dk1"/>
+          </a:fontRef>
+        </p:style>
+        <p:txBody>
+          <a:bodyPr rot="0" spcFirstLastPara="0" vertOverflow="overflow" horzOverflow="overflow" vert="horz" wrap="square" lIns="91440" tIns="45720" rIns="91440" bIns="45720" numCol="1" spcCol="0" rtlCol="0" fromWordArt="0" anchor="ctr" anchorCtr="0" forceAA="0" compatLnSpc="1">
+            <a:prstTxWarp prst="textNoShape">
+              <a:avLst/>
+            </a:prstTxWarp>
+            <a:noAutofit/>
+          </a:bodyPr>
+          <a:lstStyle/>
+          <a:p>
+            <a:pPr algn="ctr"/>
+            <a:r>
+              <a:rPr kumimoji="1" lang="zh-CN" altLang="en-US" sz="1400" b="1" dirty="0">
+                <a:solidFill>
+                  <a:schemeClr val="accent6"/>
+                </a:solidFill>
+                <a:latin typeface="微软雅黑" panose="020B0503020204020204" pitchFamily="34" charset="-122"/>
+                <a:ea typeface="微软雅黑" panose="020B0503020204020204" pitchFamily="34" charset="-122"/>
+              </a:rPr>
+              <a:t>微服务</a:t>
+            </a:r>
+            <a:r>
+              <a:rPr kumimoji="1" lang="en-US" altLang="zh-CN" sz="1400" b="1" dirty="0">
+                <a:solidFill>
+                  <a:schemeClr val="accent6"/>
+                </a:solidFill>
+                <a:latin typeface="微软雅黑" panose="020B0503020204020204" pitchFamily="34" charset="-122"/>
+                <a:ea typeface="微软雅黑" panose="020B0503020204020204" pitchFamily="34" charset="-122"/>
+              </a:rPr>
+              <a:t>C</a:t>
+            </a:r>
+            <a:endParaRPr kumimoji="1" lang="zh-CN" altLang="en-US" sz="1400" b="1" dirty="0">
+              <a:solidFill>
+                <a:schemeClr val="accent6"/>
+              </a:solidFill>
+              <a:latin typeface="微软雅黑" panose="020B0503020204020204" pitchFamily="34" charset="-122"/>
+              <a:ea typeface="微软雅黑" panose="020B0503020204020204" pitchFamily="34" charset="-122"/>
+            </a:endParaRPr>
+          </a:p>
+        </p:txBody>
+      </p:sp>
+      <p:sp>
+        <p:nvSpPr>
+          <p:cNvPr id="15" name="圆角矩形 14">
+            <a:extLst>
+              <a:ext uri="{FF2B5EF4-FFF2-40B4-BE49-F238E27FC236}">
+                <a16:creationId xmlns:a16="http://schemas.microsoft.com/office/drawing/2014/main" id="{7DD5F001-C382-BD4F-B972-6FCD365CFAE7}"/>
+              </a:ext>
+            </a:extLst>
+          </p:cNvPr>
+          <p:cNvSpPr/>
+          <p:nvPr/>
+        </p:nvSpPr>
+        <p:spPr>
+          <a:xfrm>
+            <a:off x="6191298" y="1035748"/>
+            <a:ext cx="1344860" cy="471340"/>
+          </a:xfrm>
+          <a:prstGeom prst="roundRect">
+            <a:avLst/>
+          </a:prstGeom>
+          <a:ln/>
+        </p:spPr>
+        <p:style>
+          <a:lnRef idx="2">
+            <a:schemeClr val="accent6">
+              <a:shade val="50000"/>
+            </a:schemeClr>
+          </a:lnRef>
+          <a:fillRef idx="1">
+            <a:schemeClr val="accent6"/>
+          </a:fillRef>
+          <a:effectRef idx="0">
+            <a:schemeClr val="accent6"/>
+          </a:effectRef>
+          <a:fontRef idx="minor">
+            <a:schemeClr val="lt1"/>
+          </a:fontRef>
+        </p:style>
+        <p:txBody>
+          <a:bodyPr rot="0" spcFirstLastPara="0" vertOverflow="overflow" horzOverflow="overflow" vert="horz" wrap="square" lIns="91440" tIns="45720" rIns="91440" bIns="45720" numCol="1" spcCol="0" rtlCol="0" fromWordArt="0" anchor="ctr" anchorCtr="0" forceAA="0" compatLnSpc="1">
+            <a:prstTxWarp prst="textNoShape">
+              <a:avLst/>
+            </a:prstTxWarp>
+            <a:noAutofit/>
+          </a:bodyPr>
+          <a:lstStyle/>
+          <a:p>
+            <a:pPr algn="ctr"/>
+            <a:r>
+              <a:rPr kumimoji="1" lang="zh-CN" altLang="en-US" sz="1400" b="1" dirty="0">
+                <a:solidFill>
+                  <a:schemeClr val="bg1"/>
+                </a:solidFill>
+                <a:latin typeface="微软雅黑" panose="020B0503020204020204" pitchFamily="34" charset="-122"/>
+                <a:ea typeface="微软雅黑" panose="020B0503020204020204" pitchFamily="34" charset="-122"/>
+              </a:rPr>
+              <a:t>服务发现</a:t>
+            </a:r>
+          </a:p>
+        </p:txBody>
+      </p:sp>
+      <p:cxnSp>
+        <p:nvCxnSpPr>
+          <p:cNvPr id="16" name="肘形连接符 15">
+            <a:extLst>
+              <a:ext uri="{FF2B5EF4-FFF2-40B4-BE49-F238E27FC236}">
+                <a16:creationId xmlns:a16="http://schemas.microsoft.com/office/drawing/2014/main" id="{EAA5C80C-C87A-F844-88FE-D165E2D2B00C}"/>
+              </a:ext>
+            </a:extLst>
+          </p:cNvPr>
+          <p:cNvCxnSpPr>
+            <a:cxnSpLocks/>
+            <a:stCxn id="12" idx="1"/>
+            <a:endCxn id="15" idx="3"/>
+          </p:cNvCxnSpPr>
+          <p:nvPr/>
+        </p:nvCxnSpPr>
+        <p:spPr>
+          <a:xfrm rot="10800000">
+            <a:off x="7536159" y="1271418"/>
+            <a:ext cx="1656131" cy="548408"/>
+          </a:xfrm>
+          <a:prstGeom prst="bentConnector3">
+            <a:avLst>
+              <a:gd name="adj1" fmla="val 50000"/>
+            </a:avLst>
+          </a:prstGeom>
+          <a:ln w="9525">
+            <a:solidFill>
+              <a:schemeClr val="tx1">
+                <a:lumMod val="50000"/>
+                <a:lumOff val="50000"/>
+              </a:schemeClr>
+            </a:solidFill>
+            <a:prstDash val="dash"/>
+            <a:tailEnd type="triangle"/>
+          </a:ln>
+        </p:spPr>
+        <p:style>
+          <a:lnRef idx="1">
+            <a:schemeClr val="accent1"/>
+          </a:lnRef>
+          <a:fillRef idx="0">
+            <a:schemeClr val="accent1"/>
+          </a:fillRef>
+          <a:effectRef idx="0">
+            <a:schemeClr val="accent1"/>
+          </a:effectRef>
+          <a:fontRef idx="minor">
+            <a:schemeClr val="tx1"/>
+          </a:fontRef>
+        </p:style>
+      </p:cxnSp>
+      <p:cxnSp>
+        <p:nvCxnSpPr>
+          <p:cNvPr id="17" name="肘形连接符 16">
+            <a:extLst>
+              <a:ext uri="{FF2B5EF4-FFF2-40B4-BE49-F238E27FC236}">
+                <a16:creationId xmlns:a16="http://schemas.microsoft.com/office/drawing/2014/main" id="{506525EF-6BE2-C14C-80CE-899DB6C8482E}"/>
+              </a:ext>
+            </a:extLst>
+          </p:cNvPr>
+          <p:cNvCxnSpPr>
+            <a:cxnSpLocks/>
+            <a:stCxn id="13" idx="1"/>
+            <a:endCxn id="15" idx="3"/>
+          </p:cNvCxnSpPr>
+          <p:nvPr/>
+        </p:nvCxnSpPr>
+        <p:spPr>
+          <a:xfrm rot="10800000">
+            <a:off x="7536159" y="1271418"/>
+            <a:ext cx="1656131" cy="1320010"/>
+          </a:xfrm>
+          <a:prstGeom prst="bentConnector3">
+            <a:avLst>
+              <a:gd name="adj1" fmla="val 50000"/>
+            </a:avLst>
+          </a:prstGeom>
+          <a:ln w="9525">
+            <a:solidFill>
+              <a:schemeClr val="tx1">
+                <a:lumMod val="50000"/>
+                <a:lumOff val="50000"/>
+              </a:schemeClr>
+            </a:solidFill>
+            <a:prstDash val="dash"/>
+            <a:tailEnd type="triangle"/>
+          </a:ln>
+        </p:spPr>
+        <p:style>
+          <a:lnRef idx="1">
+            <a:schemeClr val="accent1"/>
+          </a:lnRef>
+          <a:fillRef idx="0">
+            <a:schemeClr val="accent1"/>
+          </a:fillRef>
+          <a:effectRef idx="0">
+            <a:schemeClr val="accent1"/>
+          </a:effectRef>
+          <a:fontRef idx="minor">
+            <a:schemeClr val="tx1"/>
+          </a:fontRef>
+        </p:style>
+      </p:cxnSp>
+      <p:cxnSp>
+        <p:nvCxnSpPr>
+          <p:cNvPr id="18" name="肘形连接符 17">
+            <a:extLst>
+              <a:ext uri="{FF2B5EF4-FFF2-40B4-BE49-F238E27FC236}">
+                <a16:creationId xmlns:a16="http://schemas.microsoft.com/office/drawing/2014/main" id="{9950AF1F-D809-F241-9A8B-0F7B71058CB8}"/>
+              </a:ext>
+            </a:extLst>
+          </p:cNvPr>
+          <p:cNvCxnSpPr>
+            <a:cxnSpLocks/>
+            <a:stCxn id="14" idx="1"/>
+            <a:endCxn id="15" idx="3"/>
+          </p:cNvCxnSpPr>
+          <p:nvPr/>
+        </p:nvCxnSpPr>
+        <p:spPr>
+          <a:xfrm rot="10800000">
+            <a:off x="7536159" y="1271419"/>
+            <a:ext cx="1656131" cy="2091611"/>
+          </a:xfrm>
+          <a:prstGeom prst="bentConnector3">
+            <a:avLst>
+              <a:gd name="adj1" fmla="val 50000"/>
+            </a:avLst>
+          </a:prstGeom>
+          <a:ln w="9525">
+            <a:solidFill>
+              <a:schemeClr val="tx1">
+                <a:lumMod val="50000"/>
+                <a:lumOff val="50000"/>
+              </a:schemeClr>
+            </a:solidFill>
+            <a:prstDash val="dash"/>
+            <a:tailEnd type="triangle"/>
+          </a:ln>
+        </p:spPr>
+        <p:style>
+          <a:lnRef idx="1">
+            <a:schemeClr val="accent1"/>
+          </a:lnRef>
+          <a:fillRef idx="0">
+            <a:schemeClr val="accent1"/>
+          </a:fillRef>
+          <a:effectRef idx="0">
+            <a:schemeClr val="accent1"/>
+          </a:effectRef>
+          <a:fontRef idx="minor">
+            <a:schemeClr val="tx1"/>
+          </a:fontRef>
+        </p:style>
+      </p:cxnSp>
+      <p:cxnSp>
+        <p:nvCxnSpPr>
+          <p:cNvPr id="19" name="肘形连接符 18">
+            <a:extLst>
+              <a:ext uri="{FF2B5EF4-FFF2-40B4-BE49-F238E27FC236}">
+                <a16:creationId xmlns:a16="http://schemas.microsoft.com/office/drawing/2014/main" id="{87AA8803-20AC-504C-91CD-3D0B16489C79}"/>
+              </a:ext>
+            </a:extLst>
+          </p:cNvPr>
+          <p:cNvCxnSpPr>
+            <a:cxnSpLocks/>
+            <a:stCxn id="10" idx="3"/>
+            <a:endCxn id="15" idx="1"/>
+          </p:cNvCxnSpPr>
+          <p:nvPr/>
+        </p:nvCxnSpPr>
+        <p:spPr>
+          <a:xfrm flipV="1">
+            <a:off x="5169012" y="1271418"/>
+            <a:ext cx="1022286" cy="708764"/>
+          </a:xfrm>
+          <a:prstGeom prst="bentConnector3">
+            <a:avLst>
+              <a:gd name="adj1" fmla="val 50000"/>
+            </a:avLst>
+          </a:prstGeom>
+          <a:ln w="9525">
+            <a:solidFill>
+              <a:schemeClr val="tx1">
+                <a:lumMod val="50000"/>
+                <a:lumOff val="50000"/>
+              </a:schemeClr>
+            </a:solidFill>
+            <a:prstDash val="dash"/>
+            <a:tailEnd type="triangle"/>
+          </a:ln>
+        </p:spPr>
+        <p:style>
+          <a:lnRef idx="1">
+            <a:schemeClr val="accent1"/>
+          </a:lnRef>
+          <a:fillRef idx="0">
+            <a:schemeClr val="accent1"/>
+          </a:fillRef>
+          <a:effectRef idx="0">
+            <a:schemeClr val="accent1"/>
+          </a:effectRef>
+          <a:fontRef idx="minor">
+            <a:schemeClr val="tx1"/>
+          </a:fontRef>
+        </p:style>
+      </p:cxnSp>
+      <p:cxnSp>
+        <p:nvCxnSpPr>
+          <p:cNvPr id="20" name="肘形连接符 19">
+            <a:extLst>
+              <a:ext uri="{FF2B5EF4-FFF2-40B4-BE49-F238E27FC236}">
+                <a16:creationId xmlns:a16="http://schemas.microsoft.com/office/drawing/2014/main" id="{A2AB19DF-F7D0-C24C-AEAE-32FB7B9659B9}"/>
+              </a:ext>
+            </a:extLst>
+          </p:cNvPr>
+          <p:cNvCxnSpPr>
+            <a:cxnSpLocks/>
+            <a:stCxn id="4" idx="3"/>
+            <a:endCxn id="15" idx="1"/>
+          </p:cNvCxnSpPr>
+          <p:nvPr/>
+        </p:nvCxnSpPr>
+        <p:spPr>
+          <a:xfrm flipV="1">
+            <a:off x="5169013" y="1271418"/>
+            <a:ext cx="1022285" cy="2018555"/>
+          </a:xfrm>
+          <a:prstGeom prst="bentConnector3">
+            <a:avLst>
+              <a:gd name="adj1" fmla="val 50000"/>
+            </a:avLst>
+          </a:prstGeom>
+          <a:ln w="9525">
+            <a:solidFill>
+              <a:schemeClr val="tx1">
+                <a:lumMod val="50000"/>
+                <a:lumOff val="50000"/>
+              </a:schemeClr>
+            </a:solidFill>
+            <a:prstDash val="dash"/>
+            <a:tailEnd type="triangle"/>
+          </a:ln>
+        </p:spPr>
+        <p:style>
+          <a:lnRef idx="1">
+            <a:schemeClr val="accent1"/>
+          </a:lnRef>
+          <a:fillRef idx="0">
+            <a:schemeClr val="accent1"/>
+          </a:fillRef>
+          <a:effectRef idx="0">
+            <a:schemeClr val="accent1"/>
+          </a:effectRef>
+          <a:fontRef idx="minor">
+            <a:schemeClr val="tx1"/>
+          </a:fontRef>
+        </p:style>
+      </p:cxnSp>
+      <p:sp>
+        <p:nvSpPr>
+          <p:cNvPr id="21" name="文本框 20">
+            <a:extLst>
+              <a:ext uri="{FF2B5EF4-FFF2-40B4-BE49-F238E27FC236}">
+                <a16:creationId xmlns:a16="http://schemas.microsoft.com/office/drawing/2014/main" id="{82678B32-3B2F-0046-B2AB-8257CC940D96}"/>
+              </a:ext>
+            </a:extLst>
+          </p:cNvPr>
+          <p:cNvSpPr txBox="1"/>
+          <p:nvPr/>
+        </p:nvSpPr>
+        <p:spPr>
+          <a:xfrm>
+            <a:off x="7745357" y="1040915"/>
+            <a:ext cx="615553" cy="427809"/>
+          </a:xfrm>
+          <a:prstGeom prst="rect">
+            <a:avLst/>
+          </a:prstGeom>
+          <a:noFill/>
+        </p:spPr>
+        <p:txBody>
+          <a:bodyPr wrap="none" lIns="0" tIns="36576" rIns="0" bIns="0" rtlCol="0">
+            <a:spAutoFit/>
+          </a:bodyPr>
+          <a:lstStyle/>
+          <a:p>
+            <a:pPr>
+              <a:lnSpc>
+                <a:spcPct val="85000"/>
+              </a:lnSpc>
+              <a:spcAft>
+                <a:spcPts val="600"/>
+              </a:spcAft>
+              <a:buClr>
+                <a:schemeClr val="accent2"/>
+              </a:buClr>
+              <a:buSzPct val="70000"/>
+            </a:pPr>
+            <a:r>
+              <a:rPr kumimoji="1" lang="zh-CN" altLang="en-US" sz="1200" dirty="0">
+                <a:latin typeface="+mj-ea"/>
+                <a:ea typeface="+mj-ea"/>
+              </a:rPr>
+              <a:t>服务注册</a:t>
+            </a:r>
+            <a:endParaRPr kumimoji="1" lang="en-US" altLang="zh-CN" sz="1200" dirty="0">
+              <a:latin typeface="+mj-ea"/>
+              <a:ea typeface="+mj-ea"/>
+            </a:endParaRPr>
+          </a:p>
+          <a:p>
+            <a:pPr>
+              <a:lnSpc>
+                <a:spcPct val="85000"/>
+              </a:lnSpc>
+              <a:spcAft>
+                <a:spcPts val="600"/>
+              </a:spcAft>
+              <a:buClr>
+                <a:schemeClr val="accent2"/>
+              </a:buClr>
+              <a:buSzPct val="70000"/>
+            </a:pPr>
+            <a:r>
+              <a:rPr kumimoji="1" lang="zh-CN" altLang="en-US" sz="1200" dirty="0">
+                <a:latin typeface="+mj-ea"/>
+                <a:ea typeface="+mj-ea"/>
+              </a:rPr>
+              <a:t>服务寻址</a:t>
+            </a:r>
+          </a:p>
+        </p:txBody>
+      </p:sp>
+      <p:sp>
+        <p:nvSpPr>
+          <p:cNvPr id="22" name="文本框 21">
+            <a:extLst>
+              <a:ext uri="{FF2B5EF4-FFF2-40B4-BE49-F238E27FC236}">
+                <a16:creationId xmlns:a16="http://schemas.microsoft.com/office/drawing/2014/main" id="{8B1B4E8B-BC6B-2044-8FBE-2C7779F86130}"/>
+              </a:ext>
+            </a:extLst>
+          </p:cNvPr>
+          <p:cNvSpPr txBox="1"/>
+          <p:nvPr/>
+        </p:nvSpPr>
+        <p:spPr>
+          <a:xfrm>
+            <a:off x="5392008" y="1063010"/>
+            <a:ext cx="615553" cy="427809"/>
+          </a:xfrm>
+          <a:prstGeom prst="rect">
+            <a:avLst/>
+          </a:prstGeom>
+          <a:noFill/>
+        </p:spPr>
+        <p:txBody>
+          <a:bodyPr wrap="none" lIns="0" tIns="36576" rIns="0" bIns="0" rtlCol="0">
+            <a:spAutoFit/>
+          </a:bodyPr>
+          <a:lstStyle/>
+          <a:p>
+            <a:pPr>
+              <a:lnSpc>
+                <a:spcPct val="85000"/>
+              </a:lnSpc>
+              <a:spcAft>
+                <a:spcPts val="600"/>
+              </a:spcAft>
+              <a:buClr>
+                <a:schemeClr val="accent2"/>
+              </a:buClr>
+              <a:buSzPct val="70000"/>
+            </a:pPr>
+            <a:r>
+              <a:rPr kumimoji="1" lang="zh-CN" altLang="en-US" sz="1200" dirty="0">
+                <a:latin typeface="+mj-ea"/>
+                <a:ea typeface="+mj-ea"/>
+              </a:rPr>
+              <a:t>服务注册</a:t>
+            </a:r>
+            <a:endParaRPr kumimoji="1" lang="en-US" altLang="zh-CN" sz="1200" dirty="0">
+              <a:latin typeface="+mj-ea"/>
+              <a:ea typeface="+mj-ea"/>
+            </a:endParaRPr>
+          </a:p>
+          <a:p>
+            <a:pPr>
+              <a:lnSpc>
+                <a:spcPct val="85000"/>
+              </a:lnSpc>
+              <a:spcAft>
+                <a:spcPts val="600"/>
+              </a:spcAft>
+              <a:buClr>
+                <a:schemeClr val="accent2"/>
+              </a:buClr>
+              <a:buSzPct val="70000"/>
+            </a:pPr>
+            <a:r>
+              <a:rPr kumimoji="1" lang="zh-CN" altLang="en-US" sz="1200" dirty="0">
+                <a:latin typeface="+mj-ea"/>
+                <a:ea typeface="+mj-ea"/>
+              </a:rPr>
+              <a:t>服务寻址</a:t>
+            </a:r>
+          </a:p>
+        </p:txBody>
+      </p:sp>
+      <p:cxnSp>
+        <p:nvCxnSpPr>
+          <p:cNvPr id="23" name="直线箭头连接符 22">
+            <a:extLst>
+              <a:ext uri="{FF2B5EF4-FFF2-40B4-BE49-F238E27FC236}">
+                <a16:creationId xmlns:a16="http://schemas.microsoft.com/office/drawing/2014/main" id="{F721DAD6-E2B4-754F-B5D8-4C18821300B0}"/>
+              </a:ext>
+            </a:extLst>
+          </p:cNvPr>
+          <p:cNvCxnSpPr>
+            <a:cxnSpLocks/>
+            <a:endCxn id="14" idx="1"/>
+          </p:cNvCxnSpPr>
+          <p:nvPr/>
+        </p:nvCxnSpPr>
+        <p:spPr>
+          <a:xfrm>
+            <a:off x="5197303" y="2105637"/>
+            <a:ext cx="3994986" cy="1257392"/>
+          </a:xfrm>
+          <a:prstGeom prst="straightConnector1">
+            <a:avLst/>
+          </a:prstGeom>
+          <a:ln w="28575">
+            <a:solidFill>
+              <a:schemeClr val="tx1"/>
+            </a:solidFill>
+            <a:prstDash val="solid"/>
+            <a:tailEnd type="triangle"/>
+          </a:ln>
+        </p:spPr>
+        <p:style>
+          <a:lnRef idx="1">
+            <a:schemeClr val="accent1"/>
+          </a:lnRef>
+          <a:fillRef idx="0">
+            <a:schemeClr val="accent1"/>
+          </a:fillRef>
+          <a:effectRef idx="0">
+            <a:schemeClr val="accent1"/>
+          </a:effectRef>
+          <a:fontRef idx="minor">
+            <a:schemeClr val="tx1"/>
+          </a:fontRef>
+        </p:style>
+      </p:cxnSp>
+      <p:cxnSp>
+        <p:nvCxnSpPr>
+          <p:cNvPr id="24" name="直线箭头连接符 23">
+            <a:extLst>
+              <a:ext uri="{FF2B5EF4-FFF2-40B4-BE49-F238E27FC236}">
+                <a16:creationId xmlns:a16="http://schemas.microsoft.com/office/drawing/2014/main" id="{D57D951A-F697-5042-87B2-68AB4F770430}"/>
+              </a:ext>
+            </a:extLst>
+          </p:cNvPr>
+          <p:cNvCxnSpPr>
+            <a:cxnSpLocks/>
+            <a:stCxn id="13" idx="1"/>
+          </p:cNvCxnSpPr>
+          <p:nvPr/>
+        </p:nvCxnSpPr>
+        <p:spPr>
+          <a:xfrm flipH="1">
+            <a:off x="5039228" y="2591428"/>
+            <a:ext cx="4153061" cy="838718"/>
+          </a:xfrm>
+          <a:prstGeom prst="straightConnector1">
+            <a:avLst/>
+          </a:prstGeom>
+          <a:ln w="28575">
+            <a:solidFill>
+              <a:schemeClr val="tx1"/>
+            </a:solidFill>
+            <a:prstDash val="solid"/>
+            <a:tailEnd type="triangle"/>
+          </a:ln>
+        </p:spPr>
+        <p:style>
+          <a:lnRef idx="1">
+            <a:schemeClr val="accent1"/>
+          </a:lnRef>
+          <a:fillRef idx="0">
+            <a:schemeClr val="accent1"/>
+          </a:fillRef>
+          <a:effectRef idx="0">
+            <a:schemeClr val="accent1"/>
+          </a:effectRef>
+          <a:fontRef idx="minor">
+            <a:schemeClr val="tx1"/>
+          </a:fontRef>
+        </p:style>
+      </p:cxnSp>
+      <p:sp>
+        <p:nvSpPr>
+          <p:cNvPr id="25" name="文本框 24">
+            <a:extLst>
+              <a:ext uri="{FF2B5EF4-FFF2-40B4-BE49-F238E27FC236}">
+                <a16:creationId xmlns:a16="http://schemas.microsoft.com/office/drawing/2014/main" id="{15125AAE-85EC-174A-8806-F4F66A905B00}"/>
+              </a:ext>
+            </a:extLst>
+          </p:cNvPr>
+          <p:cNvSpPr txBox="1"/>
+          <p:nvPr/>
+        </p:nvSpPr>
+        <p:spPr>
+          <a:xfrm rot="20999357">
+            <a:off x="6822214" y="2988518"/>
+            <a:ext cx="615553" cy="193899"/>
+          </a:xfrm>
+          <a:prstGeom prst="rect">
+            <a:avLst/>
+          </a:prstGeom>
+          <a:noFill/>
+        </p:spPr>
+        <p:txBody>
+          <a:bodyPr wrap="none" lIns="0" tIns="36576" rIns="0" bIns="0" rtlCol="0">
+            <a:spAutoFit/>
+          </a:bodyPr>
+          <a:lstStyle/>
+          <a:p>
+            <a:pPr>
+              <a:lnSpc>
+                <a:spcPct val="85000"/>
+              </a:lnSpc>
+              <a:spcAft>
+                <a:spcPts val="600"/>
+              </a:spcAft>
+              <a:buClr>
+                <a:schemeClr val="accent2"/>
+              </a:buClr>
+              <a:buSzPct val="70000"/>
+            </a:pPr>
+            <a:r>
+              <a:rPr kumimoji="1" lang="zh-CN" altLang="en-US" sz="1200" dirty="0">
+                <a:latin typeface="+mj-ea"/>
+                <a:ea typeface="+mj-ea"/>
+              </a:rPr>
+              <a:t>服务调用</a:t>
+            </a:r>
+            <a:endParaRPr kumimoji="1" lang="en-US" altLang="zh-CN" sz="1200" dirty="0">
+              <a:latin typeface="+mj-ea"/>
+              <a:ea typeface="+mj-ea"/>
+            </a:endParaRPr>
+          </a:p>
+        </p:txBody>
+      </p:sp>
+      <p:sp>
+        <p:nvSpPr>
+          <p:cNvPr id="26" name="文本框 25">
+            <a:extLst>
+              <a:ext uri="{FF2B5EF4-FFF2-40B4-BE49-F238E27FC236}">
+                <a16:creationId xmlns:a16="http://schemas.microsoft.com/office/drawing/2014/main" id="{BD72C0CB-1152-4D4D-85EA-F18087F4C1B2}"/>
+              </a:ext>
+            </a:extLst>
+          </p:cNvPr>
+          <p:cNvSpPr txBox="1"/>
+          <p:nvPr/>
+        </p:nvSpPr>
+        <p:spPr>
+          <a:xfrm rot="1257880">
+            <a:off x="6820069" y="2412465"/>
+            <a:ext cx="615553" cy="193899"/>
+          </a:xfrm>
+          <a:prstGeom prst="rect">
+            <a:avLst/>
+          </a:prstGeom>
+          <a:noFill/>
+        </p:spPr>
+        <p:txBody>
+          <a:bodyPr wrap="none" lIns="0" tIns="36576" rIns="0" bIns="0" rtlCol="0">
+            <a:spAutoFit/>
+          </a:bodyPr>
+          <a:lstStyle/>
+          <a:p>
+            <a:pPr>
+              <a:lnSpc>
+                <a:spcPct val="85000"/>
+              </a:lnSpc>
+              <a:spcAft>
+                <a:spcPts val="600"/>
+              </a:spcAft>
+              <a:buClr>
+                <a:schemeClr val="accent2"/>
+              </a:buClr>
+              <a:buSzPct val="70000"/>
+            </a:pPr>
+            <a:r>
+              <a:rPr kumimoji="1" lang="zh-CN" altLang="en-US" sz="1200" dirty="0">
+                <a:latin typeface="+mj-ea"/>
+                <a:ea typeface="+mj-ea"/>
+              </a:rPr>
+              <a:t>服务调用</a:t>
+            </a:r>
+            <a:endParaRPr kumimoji="1" lang="en-US" altLang="zh-CN" sz="1200" dirty="0">
+              <a:latin typeface="+mj-ea"/>
+              <a:ea typeface="+mj-ea"/>
+            </a:endParaRPr>
+          </a:p>
+        </p:txBody>
+      </p:sp>
+      <p:sp>
+        <p:nvSpPr>
+          <p:cNvPr id="27" name="圆角矩形 26">
+            <a:extLst>
+              <a:ext uri="{FF2B5EF4-FFF2-40B4-BE49-F238E27FC236}">
+                <a16:creationId xmlns:a16="http://schemas.microsoft.com/office/drawing/2014/main" id="{873D4007-9CFC-654E-8872-29953D890F4B}"/>
+              </a:ext>
+            </a:extLst>
+          </p:cNvPr>
+          <p:cNvSpPr/>
+          <p:nvPr/>
+        </p:nvSpPr>
+        <p:spPr>
+          <a:xfrm>
+            <a:off x="6220975" y="1609151"/>
+            <a:ext cx="1344860" cy="471340"/>
+          </a:xfrm>
+          <a:prstGeom prst="roundRect">
+            <a:avLst/>
+          </a:prstGeom>
+          <a:ln/>
+        </p:spPr>
+        <p:style>
+          <a:lnRef idx="2">
+            <a:schemeClr val="accent6">
+              <a:shade val="50000"/>
+            </a:schemeClr>
+          </a:lnRef>
+          <a:fillRef idx="1">
+            <a:schemeClr val="accent6"/>
+          </a:fillRef>
+          <a:effectRef idx="0">
+            <a:schemeClr val="accent6"/>
+          </a:effectRef>
+          <a:fontRef idx="minor">
+            <a:schemeClr val="lt1"/>
+          </a:fontRef>
+        </p:style>
+        <p:txBody>
+          <a:bodyPr rot="0" spcFirstLastPara="0" vertOverflow="overflow" horzOverflow="overflow" vert="horz" wrap="square" lIns="91440" tIns="45720" rIns="91440" bIns="45720" numCol="1" spcCol="0" rtlCol="0" fromWordArt="0" anchor="ctr" anchorCtr="0" forceAA="0" compatLnSpc="1">
+            <a:prstTxWarp prst="textNoShape">
+              <a:avLst/>
+            </a:prstTxWarp>
+            <a:noAutofit/>
+          </a:bodyPr>
+          <a:lstStyle/>
+          <a:p>
+            <a:pPr algn="ctr"/>
+            <a:r>
+              <a:rPr kumimoji="1" lang="zh-CN" altLang="en-US" sz="1400" b="1" dirty="0">
+                <a:solidFill>
+                  <a:schemeClr val="bg1"/>
+                </a:solidFill>
+                <a:latin typeface="微软雅黑" panose="020B0503020204020204" pitchFamily="34" charset="-122"/>
+                <a:ea typeface="微软雅黑" panose="020B0503020204020204" pitchFamily="34" charset="-122"/>
+              </a:rPr>
+              <a:t>服务治理</a:t>
+            </a:r>
+          </a:p>
+        </p:txBody>
+      </p:sp>
+      <p:sp>
+        <p:nvSpPr>
+          <p:cNvPr id="28" name="圆角矩形 27">
+            <a:extLst>
+              <a:ext uri="{FF2B5EF4-FFF2-40B4-BE49-F238E27FC236}">
+                <a16:creationId xmlns:a16="http://schemas.microsoft.com/office/drawing/2014/main" id="{C3813BCB-2216-8747-AB9A-35AB90C84D11}"/>
+              </a:ext>
+            </a:extLst>
+          </p:cNvPr>
+          <p:cNvSpPr/>
+          <p:nvPr/>
+        </p:nvSpPr>
+        <p:spPr>
+          <a:xfrm>
+            <a:off x="6220975" y="3623695"/>
+            <a:ext cx="1583696" cy="555046"/>
+          </a:xfrm>
+          <a:prstGeom prst="roundRect">
+            <a:avLst/>
+          </a:prstGeom>
+          <a:solidFill>
+            <a:schemeClr val="accent5">
+              <a:lumMod val="75000"/>
+            </a:schemeClr>
+          </a:solidFill>
+          <a:ln/>
+        </p:spPr>
+        <p:style>
+          <a:lnRef idx="2">
+            <a:schemeClr val="accent5">
+              <a:shade val="50000"/>
+            </a:schemeClr>
+          </a:lnRef>
+          <a:fillRef idx="1">
+            <a:schemeClr val="accent5"/>
+          </a:fillRef>
+          <a:effectRef idx="0">
+            <a:schemeClr val="accent5"/>
+          </a:effectRef>
+          <a:fontRef idx="minor">
+            <a:schemeClr val="lt1"/>
+          </a:fontRef>
+        </p:style>
+        <p:txBody>
+          <a:bodyPr rot="0" spcFirstLastPara="0" vertOverflow="overflow" horzOverflow="overflow" vert="horz" wrap="square" lIns="91440" tIns="45720" rIns="91440" bIns="45720" numCol="1" spcCol="0" rtlCol="0" fromWordArt="0" anchor="ctr" anchorCtr="0" forceAA="0" compatLnSpc="1">
+            <a:prstTxWarp prst="textNoShape">
+              <a:avLst/>
+            </a:prstTxWarp>
+            <a:noAutofit/>
+          </a:bodyPr>
+          <a:lstStyle/>
+          <a:p>
+            <a:pPr algn="ctr"/>
+            <a:r>
+              <a:rPr kumimoji="1" lang="zh-CN" altLang="en-US" sz="1400" b="1" dirty="0">
+                <a:solidFill>
+                  <a:schemeClr val="bg1"/>
+                </a:solidFill>
+                <a:latin typeface="微软雅黑" panose="020B0503020204020204" pitchFamily="34" charset="-122"/>
+                <a:ea typeface="微软雅黑" panose="020B0503020204020204" pitchFamily="34" charset="-122"/>
+              </a:rPr>
+              <a:t>服务监控</a:t>
+            </a:r>
+          </a:p>
+        </p:txBody>
+      </p:sp>
+      <p:cxnSp>
+        <p:nvCxnSpPr>
+          <p:cNvPr id="29" name="肘形连接符 28">
+            <a:extLst>
+              <a:ext uri="{FF2B5EF4-FFF2-40B4-BE49-F238E27FC236}">
+                <a16:creationId xmlns:a16="http://schemas.microsoft.com/office/drawing/2014/main" id="{B26C30FB-CFDF-D04D-9CD1-CCF91B2FD47C}"/>
+              </a:ext>
+            </a:extLst>
+          </p:cNvPr>
+          <p:cNvCxnSpPr>
+            <a:cxnSpLocks/>
+            <a:stCxn id="10" idx="2"/>
+            <a:endCxn id="28" idx="1"/>
+          </p:cNvCxnSpPr>
+          <p:nvPr/>
+        </p:nvCxnSpPr>
+        <p:spPr>
+          <a:xfrm rot="16200000" flipH="1">
+            <a:off x="4597787" y="2278029"/>
+            <a:ext cx="1553391" cy="1692985"/>
+          </a:xfrm>
+          <a:prstGeom prst="bentConnector2">
+            <a:avLst/>
+          </a:prstGeom>
+          <a:ln w="9525">
+            <a:solidFill>
+              <a:schemeClr val="tx1">
+                <a:lumMod val="50000"/>
+                <a:lumOff val="50000"/>
+              </a:schemeClr>
+            </a:solidFill>
+            <a:prstDash val="dash"/>
+            <a:tailEnd type="triangle"/>
+          </a:ln>
+        </p:spPr>
+        <p:style>
+          <a:lnRef idx="1">
+            <a:schemeClr val="accent1"/>
+          </a:lnRef>
+          <a:fillRef idx="0">
+            <a:schemeClr val="accent1"/>
+          </a:fillRef>
+          <a:effectRef idx="0">
+            <a:schemeClr val="accent1"/>
+          </a:effectRef>
+          <a:fontRef idx="minor">
+            <a:schemeClr val="tx1"/>
+          </a:fontRef>
+        </p:style>
+      </p:cxnSp>
+      <p:cxnSp>
+        <p:nvCxnSpPr>
+          <p:cNvPr id="30" name="肘形连接符 29">
+            <a:extLst>
+              <a:ext uri="{FF2B5EF4-FFF2-40B4-BE49-F238E27FC236}">
+                <a16:creationId xmlns:a16="http://schemas.microsoft.com/office/drawing/2014/main" id="{F7516275-92E9-124F-B1A1-0B77449CD66A}"/>
+              </a:ext>
+            </a:extLst>
+          </p:cNvPr>
+          <p:cNvCxnSpPr>
+            <a:cxnSpLocks/>
+            <a:stCxn id="5" idx="2"/>
+            <a:endCxn id="28" idx="1"/>
+          </p:cNvCxnSpPr>
+          <p:nvPr/>
+        </p:nvCxnSpPr>
+        <p:spPr>
+          <a:xfrm rot="16200000" flipH="1">
+            <a:off x="5097050" y="2777293"/>
+            <a:ext cx="364072" cy="1883777"/>
+          </a:xfrm>
+          <a:prstGeom prst="bentConnector2">
+            <a:avLst/>
+          </a:prstGeom>
+          <a:ln w="9525">
+            <a:solidFill>
+              <a:schemeClr val="tx1">
+                <a:lumMod val="50000"/>
+                <a:lumOff val="50000"/>
+              </a:schemeClr>
+            </a:solidFill>
+            <a:prstDash val="dash"/>
+            <a:tailEnd type="triangle"/>
+          </a:ln>
+        </p:spPr>
+        <p:style>
+          <a:lnRef idx="1">
+            <a:schemeClr val="accent1"/>
+          </a:lnRef>
+          <a:fillRef idx="0">
+            <a:schemeClr val="accent1"/>
+          </a:fillRef>
+          <a:effectRef idx="0">
+            <a:schemeClr val="accent1"/>
+          </a:effectRef>
+          <a:fontRef idx="minor">
+            <a:schemeClr val="tx1"/>
+          </a:fontRef>
+        </p:style>
+      </p:cxnSp>
+      <p:cxnSp>
+        <p:nvCxnSpPr>
+          <p:cNvPr id="31" name="肘形连接符 30">
+            <a:extLst>
+              <a:ext uri="{FF2B5EF4-FFF2-40B4-BE49-F238E27FC236}">
+                <a16:creationId xmlns:a16="http://schemas.microsoft.com/office/drawing/2014/main" id="{A5471857-6283-4A4C-8CA8-06B3761035D0}"/>
+              </a:ext>
+            </a:extLst>
+          </p:cNvPr>
+          <p:cNvCxnSpPr>
+            <a:cxnSpLocks/>
+            <a:stCxn id="12" idx="3"/>
+            <a:endCxn id="28" idx="3"/>
+          </p:cNvCxnSpPr>
+          <p:nvPr/>
+        </p:nvCxnSpPr>
+        <p:spPr>
+          <a:xfrm flipH="1">
+            <a:off x="7804671" y="1819826"/>
+            <a:ext cx="2323372" cy="2081392"/>
+          </a:xfrm>
+          <a:prstGeom prst="bentConnector3">
+            <a:avLst>
+              <a:gd name="adj1" fmla="val -9839"/>
+            </a:avLst>
+          </a:prstGeom>
+          <a:ln w="9525">
+            <a:solidFill>
+              <a:schemeClr val="tx1">
+                <a:lumMod val="50000"/>
+                <a:lumOff val="50000"/>
+              </a:schemeClr>
+            </a:solidFill>
+            <a:prstDash val="dash"/>
+            <a:tailEnd type="triangle"/>
+          </a:ln>
+        </p:spPr>
+        <p:style>
+          <a:lnRef idx="1">
+            <a:schemeClr val="accent1"/>
+          </a:lnRef>
+          <a:fillRef idx="0">
+            <a:schemeClr val="accent1"/>
+          </a:fillRef>
+          <a:effectRef idx="0">
+            <a:schemeClr val="accent1"/>
+          </a:effectRef>
+          <a:fontRef idx="minor">
+            <a:schemeClr val="tx1"/>
+          </a:fontRef>
+        </p:style>
+      </p:cxnSp>
+      <p:cxnSp>
+        <p:nvCxnSpPr>
+          <p:cNvPr id="32" name="肘形连接符 31">
+            <a:extLst>
+              <a:ext uri="{FF2B5EF4-FFF2-40B4-BE49-F238E27FC236}">
+                <a16:creationId xmlns:a16="http://schemas.microsoft.com/office/drawing/2014/main" id="{51C56299-4177-9342-9846-25B06D99820C}"/>
+              </a:ext>
+            </a:extLst>
+          </p:cNvPr>
+          <p:cNvCxnSpPr>
+            <a:cxnSpLocks/>
+            <a:stCxn id="13" idx="3"/>
+            <a:endCxn id="28" idx="3"/>
+          </p:cNvCxnSpPr>
+          <p:nvPr/>
+        </p:nvCxnSpPr>
+        <p:spPr>
+          <a:xfrm flipH="1">
+            <a:off x="7804671" y="2591428"/>
+            <a:ext cx="2323372" cy="1309790"/>
+          </a:xfrm>
+          <a:prstGeom prst="bentConnector3">
+            <a:avLst>
+              <a:gd name="adj1" fmla="val -9839"/>
+            </a:avLst>
+          </a:prstGeom>
+          <a:ln w="9525">
+            <a:solidFill>
+              <a:schemeClr val="tx1">
+                <a:lumMod val="50000"/>
+                <a:lumOff val="50000"/>
+              </a:schemeClr>
+            </a:solidFill>
+            <a:prstDash val="dash"/>
+            <a:tailEnd type="triangle"/>
+          </a:ln>
+        </p:spPr>
+        <p:style>
+          <a:lnRef idx="1">
+            <a:schemeClr val="accent1"/>
+          </a:lnRef>
+          <a:fillRef idx="0">
+            <a:schemeClr val="accent1"/>
+          </a:fillRef>
+          <a:effectRef idx="0">
+            <a:schemeClr val="accent1"/>
+          </a:effectRef>
+          <a:fontRef idx="minor">
+            <a:schemeClr val="tx1"/>
+          </a:fontRef>
+        </p:style>
+      </p:cxnSp>
+      <p:cxnSp>
+        <p:nvCxnSpPr>
+          <p:cNvPr id="33" name="肘形连接符 32">
+            <a:extLst>
+              <a:ext uri="{FF2B5EF4-FFF2-40B4-BE49-F238E27FC236}">
+                <a16:creationId xmlns:a16="http://schemas.microsoft.com/office/drawing/2014/main" id="{C40A8C9A-CC25-384D-A780-A00CD42FCCFF}"/>
+              </a:ext>
+            </a:extLst>
+          </p:cNvPr>
+          <p:cNvCxnSpPr>
+            <a:cxnSpLocks/>
+            <a:stCxn id="14" idx="3"/>
+            <a:endCxn id="28" idx="3"/>
+          </p:cNvCxnSpPr>
+          <p:nvPr/>
+        </p:nvCxnSpPr>
+        <p:spPr>
+          <a:xfrm flipH="1">
+            <a:off x="7804671" y="3363029"/>
+            <a:ext cx="2323372" cy="538189"/>
+          </a:xfrm>
+          <a:prstGeom prst="bentConnector3">
+            <a:avLst>
+              <a:gd name="adj1" fmla="val -9839"/>
+            </a:avLst>
+          </a:prstGeom>
+          <a:ln w="9525">
+            <a:solidFill>
+              <a:schemeClr val="tx1">
+                <a:lumMod val="50000"/>
+                <a:lumOff val="50000"/>
+              </a:schemeClr>
+            </a:solidFill>
+            <a:prstDash val="dash"/>
+            <a:tailEnd type="triangle"/>
+          </a:ln>
+        </p:spPr>
+        <p:style>
+          <a:lnRef idx="1">
+            <a:schemeClr val="accent1"/>
+          </a:lnRef>
+          <a:fillRef idx="0">
+            <a:schemeClr val="accent1"/>
+          </a:fillRef>
+          <a:effectRef idx="0">
+            <a:schemeClr val="accent1"/>
+          </a:effectRef>
+          <a:fontRef idx="minor">
+            <a:schemeClr val="tx1"/>
+          </a:fontRef>
+        </p:style>
+      </p:cxnSp>
+      <p:sp>
+        <p:nvSpPr>
+          <p:cNvPr id="34" name="圆角矩形 33">
+            <a:extLst>
+              <a:ext uri="{FF2B5EF4-FFF2-40B4-BE49-F238E27FC236}">
+                <a16:creationId xmlns:a16="http://schemas.microsoft.com/office/drawing/2014/main" id="{DE59215D-7B05-BC4A-A3E8-554F6AF9B026}"/>
+              </a:ext>
+            </a:extLst>
+          </p:cNvPr>
+          <p:cNvSpPr/>
+          <p:nvPr/>
+        </p:nvSpPr>
+        <p:spPr>
+          <a:xfrm>
+            <a:off x="2900258" y="2032227"/>
+            <a:ext cx="800345" cy="315595"/>
+          </a:xfrm>
+          <a:prstGeom prst="roundRect">
+            <a:avLst>
+              <a:gd name="adj" fmla="val 25652"/>
+            </a:avLst>
+          </a:prstGeom>
+          <a:ln/>
+        </p:spPr>
+        <p:style>
+          <a:lnRef idx="2">
+            <a:schemeClr val="accent4">
+              <a:shade val="50000"/>
+            </a:schemeClr>
+          </a:lnRef>
+          <a:fillRef idx="1">
+            <a:schemeClr val="accent4"/>
+          </a:fillRef>
+          <a:effectRef idx="0">
+            <a:schemeClr val="accent4"/>
+          </a:effectRef>
+          <a:fontRef idx="minor">
+            <a:schemeClr val="lt1"/>
+          </a:fontRef>
+        </p:style>
+        <p:txBody>
+          <a:bodyPr rot="0" spcFirstLastPara="0" vertOverflow="overflow" horzOverflow="overflow" vert="horz" wrap="square" lIns="91440" tIns="45720" rIns="91440" bIns="45720" numCol="1" spcCol="0" rtlCol="0" fromWordArt="0" anchor="ctr" anchorCtr="0" forceAA="0" compatLnSpc="1">
+            <a:prstTxWarp prst="textNoShape">
+              <a:avLst/>
+            </a:prstTxWarp>
+            <a:noAutofit/>
+          </a:bodyPr>
+          <a:lstStyle/>
+          <a:p>
+            <a:pPr algn="ctr"/>
+            <a:r>
+              <a:rPr kumimoji="1" lang="en-US" altLang="zh-CN" sz="800" dirty="0">
+                <a:solidFill>
+                  <a:schemeClr val="bg1"/>
+                </a:solidFill>
+                <a:latin typeface="+mj-ea"/>
+                <a:ea typeface="+mj-ea"/>
+              </a:rPr>
+              <a:t>JavaAgent</a:t>
+            </a:r>
+          </a:p>
+          <a:p>
+            <a:pPr algn="ctr"/>
+            <a:r>
+              <a:rPr kumimoji="1" lang="en-US" altLang="zh-CN" sz="800" dirty="0">
+                <a:solidFill>
+                  <a:schemeClr val="bg1"/>
+                </a:solidFill>
+                <a:latin typeface="+mj-ea"/>
+                <a:ea typeface="+mj-ea"/>
+              </a:rPr>
+              <a:t>(</a:t>
+            </a:r>
+            <a:r>
+              <a:rPr kumimoji="1" lang="zh-CN" altLang="en-US" sz="800" dirty="0">
+                <a:solidFill>
+                  <a:schemeClr val="bg1"/>
+                </a:solidFill>
+                <a:latin typeface="+mj-ea"/>
+                <a:ea typeface="+mj-ea"/>
+              </a:rPr>
+              <a:t>本机部署</a:t>
+            </a:r>
+            <a:r>
+              <a:rPr kumimoji="1" lang="en-US" altLang="zh-CN" sz="800" dirty="0">
+                <a:solidFill>
+                  <a:schemeClr val="bg1"/>
+                </a:solidFill>
+                <a:latin typeface="+mj-ea"/>
+                <a:ea typeface="+mj-ea"/>
+              </a:rPr>
+              <a:t>)</a:t>
+            </a:r>
+            <a:endParaRPr kumimoji="1" lang="zh-CN" altLang="en-US" sz="800" dirty="0">
+              <a:solidFill>
+                <a:schemeClr val="bg1"/>
+              </a:solidFill>
+              <a:latin typeface="+mj-ea"/>
+              <a:ea typeface="+mj-ea"/>
+            </a:endParaRPr>
+          </a:p>
+        </p:txBody>
+      </p:sp>
+      <p:cxnSp>
+        <p:nvCxnSpPr>
+          <p:cNvPr id="35" name="肘形连接符 34">
+            <a:extLst>
+              <a:ext uri="{FF2B5EF4-FFF2-40B4-BE49-F238E27FC236}">
+                <a16:creationId xmlns:a16="http://schemas.microsoft.com/office/drawing/2014/main" id="{79B8C5BE-865B-1841-99F8-F915DCF408C3}"/>
+              </a:ext>
+            </a:extLst>
+          </p:cNvPr>
+          <p:cNvCxnSpPr>
+            <a:cxnSpLocks/>
+            <a:stCxn id="34" idx="2"/>
+            <a:endCxn id="28" idx="1"/>
+          </p:cNvCxnSpPr>
+          <p:nvPr/>
+        </p:nvCxnSpPr>
+        <p:spPr>
+          <a:xfrm rot="16200000" flipH="1">
+            <a:off x="3984005" y="1664248"/>
+            <a:ext cx="1553396" cy="2920544"/>
+          </a:xfrm>
+          <a:prstGeom prst="bentConnector2">
+            <a:avLst/>
+          </a:prstGeom>
+          <a:ln w="9525">
+            <a:solidFill>
+              <a:schemeClr val="tx1">
+                <a:lumMod val="50000"/>
+                <a:lumOff val="50000"/>
+              </a:schemeClr>
+            </a:solidFill>
+            <a:prstDash val="dash"/>
+            <a:tailEnd type="triangle"/>
+          </a:ln>
+        </p:spPr>
+        <p:style>
+          <a:lnRef idx="1">
+            <a:schemeClr val="accent1"/>
+          </a:lnRef>
+          <a:fillRef idx="0">
+            <a:schemeClr val="accent1"/>
+          </a:fillRef>
+          <a:effectRef idx="0">
+            <a:schemeClr val="accent1"/>
+          </a:effectRef>
+          <a:fontRef idx="minor">
+            <a:schemeClr val="tx1"/>
+          </a:fontRef>
+        </p:style>
+      </p:cxnSp>
+      <p:sp>
+        <p:nvSpPr>
+          <p:cNvPr id="40" name="文本框 39">
+            <a:extLst>
+              <a:ext uri="{FF2B5EF4-FFF2-40B4-BE49-F238E27FC236}">
+                <a16:creationId xmlns:a16="http://schemas.microsoft.com/office/drawing/2014/main" id="{E7930F28-01E5-3E4E-9944-B6536290B874}"/>
+              </a:ext>
+            </a:extLst>
+          </p:cNvPr>
+          <p:cNvSpPr txBox="1"/>
+          <p:nvPr/>
+        </p:nvSpPr>
+        <p:spPr>
+          <a:xfrm>
+            <a:off x="3115153" y="1208704"/>
+            <a:ext cx="1838965" cy="369332"/>
+          </a:xfrm>
+          <a:prstGeom prst="rect">
+            <a:avLst/>
+          </a:prstGeom>
+          <a:noFill/>
+        </p:spPr>
+        <p:txBody>
+          <a:bodyPr wrap="none" rtlCol="0">
+            <a:spAutoFit/>
+          </a:bodyPr>
+          <a:lstStyle/>
+          <a:p>
+            <a:r>
+              <a:rPr kumimoji="1" lang="en-US" altLang="zh-CN" dirty="0"/>
+              <a:t>Kubernetes</a:t>
+            </a:r>
+            <a:r>
+              <a:rPr kumimoji="1" lang="zh-CN" altLang="en-US" dirty="0"/>
+              <a:t> </a:t>
+            </a:r>
+            <a:r>
+              <a:rPr kumimoji="1" lang="en-US" altLang="zh-CN" dirty="0"/>
+              <a:t>Pod</a:t>
+            </a:r>
+            <a:endParaRPr kumimoji="1" lang="zh-CN" altLang="en-US" dirty="0"/>
+          </a:p>
+        </p:txBody>
+      </p:sp>
+      <p:cxnSp>
+        <p:nvCxnSpPr>
+          <p:cNvPr id="42" name="直线箭头连接符 41">
+            <a:extLst>
+              <a:ext uri="{FF2B5EF4-FFF2-40B4-BE49-F238E27FC236}">
+                <a16:creationId xmlns:a16="http://schemas.microsoft.com/office/drawing/2014/main" id="{286CF62C-8324-CC4D-9BDC-38723EC7CC8B}"/>
+              </a:ext>
+            </a:extLst>
+          </p:cNvPr>
+          <p:cNvCxnSpPr>
+            <a:cxnSpLocks/>
+            <a:stCxn id="27" idx="1"/>
+          </p:cNvCxnSpPr>
+          <p:nvPr/>
+        </p:nvCxnSpPr>
+        <p:spPr>
+          <a:xfrm rot="10800000" flipV="1">
+            <a:off x="5175639" y="1844820"/>
+            <a:ext cx="1045336" cy="51953"/>
+          </a:xfrm>
+          <a:prstGeom prst="curvedConnector3">
+            <a:avLst>
+              <a:gd name="adj1" fmla="val 50000"/>
+            </a:avLst>
+          </a:prstGeom>
+          <a:ln w="28575">
+            <a:solidFill>
+              <a:schemeClr val="accent4"/>
+            </a:solidFill>
+            <a:prstDash val="sysDash"/>
+            <a:tailEnd type="triangle"/>
+          </a:ln>
+        </p:spPr>
+        <p:style>
+          <a:lnRef idx="1">
+            <a:schemeClr val="accent1"/>
+          </a:lnRef>
+          <a:fillRef idx="0">
+            <a:schemeClr val="accent1"/>
+          </a:fillRef>
+          <a:effectRef idx="0">
+            <a:schemeClr val="accent1"/>
+          </a:effectRef>
+          <a:fontRef idx="minor">
+            <a:schemeClr val="tx1"/>
+          </a:fontRef>
+        </p:style>
+      </p:cxnSp>
+      <p:cxnSp>
+        <p:nvCxnSpPr>
+          <p:cNvPr id="43" name="直线箭头连接符 42">
+            <a:extLst>
+              <a:ext uri="{FF2B5EF4-FFF2-40B4-BE49-F238E27FC236}">
+                <a16:creationId xmlns:a16="http://schemas.microsoft.com/office/drawing/2014/main" id="{10894CE8-5C4D-FA4C-9603-A66DF7CB1DE1}"/>
+              </a:ext>
+            </a:extLst>
+          </p:cNvPr>
+          <p:cNvCxnSpPr>
+            <a:cxnSpLocks/>
+            <a:stCxn id="27" idx="1"/>
+            <a:endCxn id="5" idx="3"/>
+          </p:cNvCxnSpPr>
+          <p:nvPr/>
+        </p:nvCxnSpPr>
+        <p:spPr>
+          <a:xfrm rot="10800000" flipV="1">
+            <a:off x="5039229" y="1844820"/>
+            <a:ext cx="1181747" cy="1445151"/>
+          </a:xfrm>
+          <a:prstGeom prst="curvedConnector3">
+            <a:avLst/>
+          </a:prstGeom>
+          <a:ln w="28575">
+            <a:solidFill>
+              <a:schemeClr val="accent4"/>
+            </a:solidFill>
+            <a:prstDash val="sysDash"/>
+            <a:tailEnd type="triangle"/>
+          </a:ln>
+        </p:spPr>
+        <p:style>
+          <a:lnRef idx="1">
+            <a:schemeClr val="accent1"/>
+          </a:lnRef>
+          <a:fillRef idx="0">
+            <a:schemeClr val="accent1"/>
+          </a:fillRef>
+          <a:effectRef idx="0">
+            <a:schemeClr val="accent1"/>
+          </a:effectRef>
+          <a:fontRef idx="minor">
+            <a:schemeClr val="tx1"/>
+          </a:fontRef>
+        </p:style>
+      </p:cxnSp>
+      <p:cxnSp>
+        <p:nvCxnSpPr>
+          <p:cNvPr id="48" name="直线箭头连接符 41">
+            <a:extLst>
+              <a:ext uri="{FF2B5EF4-FFF2-40B4-BE49-F238E27FC236}">
+                <a16:creationId xmlns:a16="http://schemas.microsoft.com/office/drawing/2014/main" id="{349CE30F-2F3D-CE4F-A630-43AC2003F63C}"/>
+              </a:ext>
+            </a:extLst>
+          </p:cNvPr>
+          <p:cNvCxnSpPr>
+            <a:cxnSpLocks/>
+            <a:stCxn id="27" idx="3"/>
+          </p:cNvCxnSpPr>
+          <p:nvPr/>
+        </p:nvCxnSpPr>
+        <p:spPr>
+          <a:xfrm flipV="1">
+            <a:off x="7565835" y="1785523"/>
+            <a:ext cx="1626454" cy="59298"/>
+          </a:xfrm>
+          <a:prstGeom prst="curvedConnector3">
+            <a:avLst>
+              <a:gd name="adj1" fmla="val 50000"/>
+            </a:avLst>
+          </a:prstGeom>
+          <a:ln w="28575">
+            <a:solidFill>
+              <a:schemeClr val="accent4"/>
+            </a:solidFill>
+            <a:prstDash val="sysDash"/>
+            <a:tailEnd type="triangle"/>
+          </a:ln>
+        </p:spPr>
+        <p:style>
+          <a:lnRef idx="1">
+            <a:schemeClr val="accent1"/>
+          </a:lnRef>
+          <a:fillRef idx="0">
+            <a:schemeClr val="accent1"/>
+          </a:fillRef>
+          <a:effectRef idx="0">
+            <a:schemeClr val="accent1"/>
+          </a:effectRef>
+          <a:fontRef idx="minor">
+            <a:schemeClr val="tx1"/>
+          </a:fontRef>
+        </p:style>
+      </p:cxnSp>
+      <p:cxnSp>
+        <p:nvCxnSpPr>
+          <p:cNvPr id="51" name="直线箭头连接符 41">
+            <a:extLst>
+              <a:ext uri="{FF2B5EF4-FFF2-40B4-BE49-F238E27FC236}">
+                <a16:creationId xmlns:a16="http://schemas.microsoft.com/office/drawing/2014/main" id="{AC32EEBD-2290-B04C-8F0F-84C993B11BC5}"/>
+              </a:ext>
+            </a:extLst>
+          </p:cNvPr>
+          <p:cNvCxnSpPr>
+            <a:cxnSpLocks/>
+            <a:stCxn id="27" idx="3"/>
+          </p:cNvCxnSpPr>
+          <p:nvPr/>
+        </p:nvCxnSpPr>
+        <p:spPr>
+          <a:xfrm>
+            <a:off x="7565835" y="1844821"/>
+            <a:ext cx="1662758" cy="667390"/>
+          </a:xfrm>
+          <a:prstGeom prst="curvedConnector3">
+            <a:avLst>
+              <a:gd name="adj1" fmla="val 50000"/>
+            </a:avLst>
+          </a:prstGeom>
+          <a:ln w="28575">
+            <a:solidFill>
+              <a:schemeClr val="accent4"/>
+            </a:solidFill>
+            <a:prstDash val="sysDash"/>
+            <a:tailEnd type="triangle"/>
+          </a:ln>
+        </p:spPr>
+        <p:style>
+          <a:lnRef idx="1">
+            <a:schemeClr val="accent1"/>
+          </a:lnRef>
+          <a:fillRef idx="0">
+            <a:schemeClr val="accent1"/>
+          </a:fillRef>
+          <a:effectRef idx="0">
+            <a:schemeClr val="accent1"/>
+          </a:effectRef>
+          <a:fontRef idx="minor">
+            <a:schemeClr val="tx1"/>
+          </a:fontRef>
+        </p:style>
+      </p:cxnSp>
+      <p:cxnSp>
+        <p:nvCxnSpPr>
+          <p:cNvPr id="55" name="直线箭头连接符 41">
+            <a:extLst>
+              <a:ext uri="{FF2B5EF4-FFF2-40B4-BE49-F238E27FC236}">
+                <a16:creationId xmlns:a16="http://schemas.microsoft.com/office/drawing/2014/main" id="{FD1AC9BE-CE2D-6946-9846-B1A0ACD6223D}"/>
+              </a:ext>
+            </a:extLst>
+          </p:cNvPr>
+          <p:cNvCxnSpPr>
+            <a:cxnSpLocks/>
+            <a:stCxn id="27" idx="3"/>
+          </p:cNvCxnSpPr>
+          <p:nvPr/>
+        </p:nvCxnSpPr>
+        <p:spPr>
+          <a:xfrm>
+            <a:off x="7565835" y="1844821"/>
+            <a:ext cx="1669386" cy="1421926"/>
+          </a:xfrm>
+          <a:prstGeom prst="curvedConnector3">
+            <a:avLst>
+              <a:gd name="adj1" fmla="val 50000"/>
+            </a:avLst>
+          </a:prstGeom>
+          <a:ln w="28575">
+            <a:solidFill>
+              <a:schemeClr val="accent4"/>
+            </a:solidFill>
+            <a:prstDash val="sysDash"/>
+            <a:tailEnd type="triangle"/>
+          </a:ln>
+        </p:spPr>
+        <p:style>
+          <a:lnRef idx="1">
+            <a:schemeClr val="accent1"/>
+          </a:lnRef>
+          <a:fillRef idx="0">
+            <a:schemeClr val="accent1"/>
+          </a:fillRef>
+          <a:effectRef idx="0">
+            <a:schemeClr val="accent1"/>
+          </a:effectRef>
+          <a:fontRef idx="minor">
+            <a:schemeClr val="tx1"/>
+          </a:fontRef>
+        </p:style>
+      </p:cxnSp>
+      <p:sp>
+        <p:nvSpPr>
+          <p:cNvPr id="63" name="文本框 62">
+            <a:extLst>
+              <a:ext uri="{FF2B5EF4-FFF2-40B4-BE49-F238E27FC236}">
+                <a16:creationId xmlns:a16="http://schemas.microsoft.com/office/drawing/2014/main" id="{40BEE96B-4F50-8B43-961A-23D6D3086101}"/>
+              </a:ext>
+            </a:extLst>
+          </p:cNvPr>
+          <p:cNvSpPr txBox="1"/>
+          <p:nvPr/>
+        </p:nvSpPr>
+        <p:spPr>
+          <a:xfrm>
+            <a:off x="1590541" y="3149524"/>
+            <a:ext cx="1120820" cy="369332"/>
+          </a:xfrm>
+          <a:prstGeom prst="rect">
+            <a:avLst/>
+          </a:prstGeom>
+          <a:noFill/>
+        </p:spPr>
+        <p:txBody>
+          <a:bodyPr wrap="none" rtlCol="0">
+            <a:spAutoFit/>
+          </a:bodyPr>
+          <a:lstStyle/>
+          <a:p>
+            <a:r>
+              <a:rPr kumimoji="1" lang="en-US" altLang="zh-CN" dirty="0"/>
+              <a:t>SDK</a:t>
+            </a:r>
+            <a:r>
+              <a:rPr kumimoji="1" lang="zh-CN" altLang="en-US" dirty="0"/>
+              <a:t>方式</a:t>
+            </a:r>
+          </a:p>
+        </p:txBody>
+      </p:sp>
+      <p:sp>
+        <p:nvSpPr>
+          <p:cNvPr id="64" name="文本框 63">
+            <a:extLst>
+              <a:ext uri="{FF2B5EF4-FFF2-40B4-BE49-F238E27FC236}">
+                <a16:creationId xmlns:a16="http://schemas.microsoft.com/office/drawing/2014/main" id="{7E8275BF-0320-494F-B60C-D7335D7961F7}"/>
+              </a:ext>
+            </a:extLst>
+          </p:cNvPr>
+          <p:cNvSpPr txBox="1"/>
+          <p:nvPr/>
+        </p:nvSpPr>
+        <p:spPr>
+          <a:xfrm>
+            <a:off x="1488398" y="1825912"/>
+            <a:ext cx="1210588" cy="369332"/>
+          </a:xfrm>
+          <a:prstGeom prst="rect">
+            <a:avLst/>
+          </a:prstGeom>
+          <a:noFill/>
+        </p:spPr>
+        <p:txBody>
+          <a:bodyPr wrap="none" rtlCol="0">
+            <a:spAutoFit/>
+          </a:bodyPr>
+          <a:lstStyle/>
+          <a:p>
+            <a:r>
+              <a:rPr kumimoji="1" lang="en-US" altLang="zh-CN" dirty="0"/>
+              <a:t>Mesh</a:t>
+            </a:r>
+            <a:r>
+              <a:rPr kumimoji="1" lang="zh-CN" altLang="en-US" dirty="0"/>
+              <a:t>方式</a:t>
+            </a:r>
+          </a:p>
+        </p:txBody>
+      </p:sp>
+      <p:sp>
+        <p:nvSpPr>
+          <p:cNvPr id="65" name="文本框 64">
+            <a:extLst>
+              <a:ext uri="{FF2B5EF4-FFF2-40B4-BE49-F238E27FC236}">
+                <a16:creationId xmlns:a16="http://schemas.microsoft.com/office/drawing/2014/main" id="{309572DE-57AD-5047-88E7-96380B3F59CE}"/>
+              </a:ext>
+            </a:extLst>
+          </p:cNvPr>
+          <p:cNvSpPr txBox="1"/>
+          <p:nvPr/>
+        </p:nvSpPr>
+        <p:spPr>
+          <a:xfrm>
+            <a:off x="4833357" y="3944412"/>
+            <a:ext cx="1202252" cy="193899"/>
+          </a:xfrm>
+          <a:prstGeom prst="rect">
+            <a:avLst/>
+          </a:prstGeom>
+          <a:noFill/>
+        </p:spPr>
+        <p:txBody>
+          <a:bodyPr wrap="none" lIns="0" tIns="36576" rIns="0" bIns="0" rtlCol="0">
+            <a:spAutoFit/>
+          </a:bodyPr>
+          <a:lstStyle/>
+          <a:p>
+            <a:pPr>
+              <a:lnSpc>
+                <a:spcPct val="85000"/>
+              </a:lnSpc>
+              <a:spcAft>
+                <a:spcPts val="600"/>
+              </a:spcAft>
+              <a:buClr>
+                <a:schemeClr val="accent2"/>
+              </a:buClr>
+              <a:buSzPct val="70000"/>
+            </a:pPr>
+            <a:r>
+              <a:rPr kumimoji="1" lang="zh-CN" altLang="en-US" sz="1200" dirty="0">
+                <a:latin typeface="+mj-ea"/>
+                <a:ea typeface="+mj-ea"/>
+              </a:rPr>
+              <a:t>调用链</a:t>
+            </a:r>
+            <a:r>
+              <a:rPr kumimoji="1" lang="en-US" altLang="zh-CN" sz="1200" dirty="0">
+                <a:latin typeface="+mj-ea"/>
+                <a:ea typeface="+mj-ea"/>
+              </a:rPr>
+              <a:t>/</a:t>
+            </a:r>
+            <a:r>
+              <a:rPr kumimoji="1" lang="zh-CN" altLang="en-US" sz="1200" dirty="0">
+                <a:latin typeface="+mj-ea"/>
+                <a:ea typeface="+mj-ea"/>
+              </a:rPr>
+              <a:t>指标</a:t>
+            </a:r>
+            <a:r>
+              <a:rPr kumimoji="1" lang="en-US" altLang="zh-CN" sz="1200" dirty="0">
+                <a:latin typeface="+mj-ea"/>
+                <a:ea typeface="+mj-ea"/>
+              </a:rPr>
+              <a:t>/</a:t>
+            </a:r>
+            <a:r>
+              <a:rPr kumimoji="1" lang="zh-CN" altLang="en-US" sz="1200" dirty="0">
+                <a:latin typeface="+mj-ea"/>
+                <a:ea typeface="+mj-ea"/>
+              </a:rPr>
+              <a:t>日志</a:t>
+            </a:r>
+            <a:endParaRPr kumimoji="1" lang="en-US" altLang="zh-CN" sz="1200" dirty="0">
+              <a:latin typeface="+mj-ea"/>
+              <a:ea typeface="+mj-ea"/>
+            </a:endParaRPr>
+          </a:p>
+        </p:txBody>
+      </p:sp>
+      <p:sp>
+        <p:nvSpPr>
+          <p:cNvPr id="66" name="文本框 65">
+            <a:extLst>
+              <a:ext uri="{FF2B5EF4-FFF2-40B4-BE49-F238E27FC236}">
+                <a16:creationId xmlns:a16="http://schemas.microsoft.com/office/drawing/2014/main" id="{5F7D3F13-3265-464D-97A7-7735CA2D0B4F}"/>
+              </a:ext>
+            </a:extLst>
+          </p:cNvPr>
+          <p:cNvSpPr txBox="1"/>
+          <p:nvPr/>
+        </p:nvSpPr>
+        <p:spPr>
+          <a:xfrm>
+            <a:off x="7897354" y="3942854"/>
+            <a:ext cx="1202252" cy="193899"/>
+          </a:xfrm>
+          <a:prstGeom prst="rect">
+            <a:avLst/>
+          </a:prstGeom>
+          <a:noFill/>
+        </p:spPr>
+        <p:txBody>
+          <a:bodyPr wrap="none" lIns="0" tIns="36576" rIns="0" bIns="0" rtlCol="0">
+            <a:spAutoFit/>
+          </a:bodyPr>
+          <a:lstStyle/>
+          <a:p>
+            <a:pPr>
+              <a:lnSpc>
+                <a:spcPct val="85000"/>
+              </a:lnSpc>
+              <a:spcAft>
+                <a:spcPts val="600"/>
+              </a:spcAft>
+              <a:buClr>
+                <a:schemeClr val="accent2"/>
+              </a:buClr>
+              <a:buSzPct val="70000"/>
+            </a:pPr>
+            <a:r>
+              <a:rPr kumimoji="1" lang="zh-CN" altLang="en-US" sz="1200" dirty="0">
+                <a:latin typeface="+mj-ea"/>
+                <a:ea typeface="+mj-ea"/>
+              </a:rPr>
+              <a:t>调用链</a:t>
+            </a:r>
+            <a:r>
+              <a:rPr kumimoji="1" lang="en-US" altLang="zh-CN" sz="1200" dirty="0">
+                <a:latin typeface="+mj-ea"/>
+                <a:ea typeface="+mj-ea"/>
+              </a:rPr>
+              <a:t>/</a:t>
+            </a:r>
+            <a:r>
+              <a:rPr kumimoji="1" lang="zh-CN" altLang="en-US" sz="1200" dirty="0">
+                <a:latin typeface="+mj-ea"/>
+                <a:ea typeface="+mj-ea"/>
+              </a:rPr>
+              <a:t>指标</a:t>
+            </a:r>
+            <a:r>
+              <a:rPr kumimoji="1" lang="en-US" altLang="zh-CN" sz="1200" dirty="0">
+                <a:latin typeface="+mj-ea"/>
+                <a:ea typeface="+mj-ea"/>
+              </a:rPr>
+              <a:t>/</a:t>
+            </a:r>
+            <a:r>
+              <a:rPr kumimoji="1" lang="zh-CN" altLang="en-US" sz="1200" dirty="0">
+                <a:latin typeface="+mj-ea"/>
+                <a:ea typeface="+mj-ea"/>
+              </a:rPr>
+              <a:t>日志</a:t>
+            </a:r>
+            <a:endParaRPr kumimoji="1" lang="en-US" altLang="zh-CN" sz="1200" dirty="0">
+              <a:latin typeface="+mj-ea"/>
+              <a:ea typeface="+mj-ea"/>
+            </a:endParaRPr>
+          </a:p>
+        </p:txBody>
+      </p:sp>
+      <p:sp>
+        <p:nvSpPr>
+          <p:cNvPr id="46" name="文本框 45">
+            <a:extLst>
+              <a:ext uri="{FF2B5EF4-FFF2-40B4-BE49-F238E27FC236}">
+                <a16:creationId xmlns:a16="http://schemas.microsoft.com/office/drawing/2014/main" id="{8B0D6A5B-A8F7-854D-A37F-551879EFA743}"/>
+              </a:ext>
+            </a:extLst>
+          </p:cNvPr>
+          <p:cNvSpPr txBox="1"/>
+          <p:nvPr/>
+        </p:nvSpPr>
+        <p:spPr>
+          <a:xfrm>
+            <a:off x="166226" y="202786"/>
+            <a:ext cx="4002362" cy="811248"/>
+          </a:xfrm>
+          <a:prstGeom prst="rect">
+            <a:avLst/>
+          </a:prstGeom>
+          <a:noFill/>
+        </p:spPr>
+        <p:txBody>
+          <a:bodyPr wrap="square" rtlCol="0">
+            <a:spAutoFit/>
+          </a:bodyPr>
+          <a:lstStyle/>
+          <a:p>
+            <a:pPr>
+              <a:lnSpc>
+                <a:spcPct val="120000"/>
+              </a:lnSpc>
+            </a:pPr>
+            <a:r>
+              <a:rPr lang="en-US" altLang="zh-CN" sz="2400" b="1" dirty="0">
+                <a:solidFill>
+                  <a:srgbClr val="04396B"/>
+                </a:solidFill>
+                <a:latin typeface="微软雅黑" panose="020B0503020204020204" pitchFamily="34" charset="-122"/>
+                <a:ea typeface="微软雅黑" panose="020B0503020204020204" pitchFamily="34" charset="-122"/>
+              </a:rPr>
+              <a:t>Ease</a:t>
+            </a:r>
+            <a:r>
+              <a:rPr lang="zh-CN" altLang="en-US" sz="2400" b="1" dirty="0">
+                <a:solidFill>
+                  <a:srgbClr val="04396B"/>
+                </a:solidFill>
+                <a:latin typeface="微软雅黑" panose="020B0503020204020204" pitchFamily="34" charset="-122"/>
+                <a:ea typeface="微软雅黑" panose="020B0503020204020204" pitchFamily="34" charset="-122"/>
+              </a:rPr>
+              <a:t> </a:t>
+            </a:r>
+            <a:r>
+              <a:rPr lang="en-US" altLang="zh-CN" sz="2400" b="1" dirty="0">
+                <a:solidFill>
+                  <a:srgbClr val="04396B"/>
+                </a:solidFill>
+                <a:latin typeface="微软雅黑" panose="020B0503020204020204" pitchFamily="34" charset="-122"/>
+                <a:ea typeface="微软雅黑" panose="020B0503020204020204" pitchFamily="34" charset="-122"/>
+              </a:rPr>
+              <a:t>Service</a:t>
+            </a:r>
+            <a:r>
+              <a:rPr lang="zh-CN" altLang="en-US" sz="2400" b="1" dirty="0">
+                <a:solidFill>
+                  <a:srgbClr val="04396B"/>
+                </a:solidFill>
+                <a:latin typeface="微软雅黑" panose="020B0503020204020204" pitchFamily="34" charset="-122"/>
+                <a:ea typeface="微软雅黑" panose="020B0503020204020204" pitchFamily="34" charset="-122"/>
+              </a:rPr>
+              <a:t> 工作原理</a:t>
+            </a:r>
+            <a:endParaRPr lang="en-US" altLang="zh-CN" sz="2400" b="1" dirty="0">
+              <a:solidFill>
+                <a:srgbClr val="04396B"/>
+              </a:solidFill>
+              <a:latin typeface="微软雅黑" panose="020B0503020204020204" pitchFamily="34" charset="-122"/>
+              <a:ea typeface="微软雅黑" panose="020B0503020204020204" pitchFamily="34" charset="-122"/>
+            </a:endParaRPr>
+          </a:p>
+          <a:p>
+            <a:pPr>
+              <a:lnSpc>
+                <a:spcPct val="120000"/>
+              </a:lnSpc>
+            </a:pPr>
+            <a:r>
+              <a:rPr lang="en-US" altLang="zh-CN" sz="1600" i="1" dirty="0">
+                <a:solidFill>
+                  <a:schemeClr val="tx1">
+                    <a:lumMod val="65000"/>
+                    <a:lumOff val="35000"/>
+                  </a:schemeClr>
+                </a:solidFill>
+                <a:latin typeface="Calibri Light" panose="020F0302020204030204" pitchFamily="34" charset="0"/>
+              </a:rPr>
+              <a:t>The</a:t>
+            </a:r>
+            <a:r>
+              <a:rPr lang="zh-CN" altLang="en-US" sz="1600" i="1" dirty="0">
+                <a:solidFill>
+                  <a:schemeClr val="tx1">
+                    <a:lumMod val="65000"/>
+                    <a:lumOff val="35000"/>
+                  </a:schemeClr>
+                </a:solidFill>
+                <a:latin typeface="Calibri Light" panose="020F0302020204030204" pitchFamily="34" charset="0"/>
+              </a:rPr>
+              <a:t> </a:t>
+            </a:r>
+            <a:r>
+              <a:rPr lang="en-US" altLang="zh-CN" sz="1600" i="1" dirty="0">
+                <a:solidFill>
+                  <a:schemeClr val="tx1">
+                    <a:lumMod val="65000"/>
+                    <a:lumOff val="35000"/>
+                  </a:schemeClr>
+                </a:solidFill>
+                <a:latin typeface="Calibri Light" panose="020F0302020204030204" pitchFamily="34" charset="0"/>
+              </a:rPr>
+              <a:t>mechanism</a:t>
+            </a:r>
+            <a:r>
+              <a:rPr lang="zh-CN" altLang="en-US" sz="1600" i="1" dirty="0">
+                <a:solidFill>
+                  <a:schemeClr val="tx1">
+                    <a:lumMod val="65000"/>
+                    <a:lumOff val="35000"/>
+                  </a:schemeClr>
+                </a:solidFill>
+                <a:latin typeface="Calibri Light" panose="020F0302020204030204" pitchFamily="34" charset="0"/>
+              </a:rPr>
+              <a:t> </a:t>
+            </a:r>
+            <a:r>
+              <a:rPr lang="en-US" altLang="zh-CN" sz="1600" i="1" dirty="0">
+                <a:solidFill>
+                  <a:schemeClr val="tx1">
+                    <a:lumMod val="65000"/>
+                    <a:lumOff val="35000"/>
+                  </a:schemeClr>
+                </a:solidFill>
+                <a:latin typeface="Calibri Light" panose="020F0302020204030204" pitchFamily="34" charset="0"/>
+              </a:rPr>
+              <a:t>of</a:t>
+            </a:r>
+            <a:r>
+              <a:rPr lang="zh-CN" altLang="en-US" sz="1600" i="1" dirty="0">
+                <a:solidFill>
+                  <a:schemeClr val="tx1">
+                    <a:lumMod val="65000"/>
+                    <a:lumOff val="35000"/>
+                  </a:schemeClr>
+                </a:solidFill>
+                <a:latin typeface="Calibri Light" panose="020F0302020204030204" pitchFamily="34" charset="0"/>
+              </a:rPr>
+              <a:t> </a:t>
+            </a:r>
+            <a:r>
+              <a:rPr lang="en-US" altLang="zh-CN" sz="1600" i="1" dirty="0">
+                <a:solidFill>
+                  <a:schemeClr val="tx1">
+                    <a:lumMod val="65000"/>
+                    <a:lumOff val="35000"/>
+                  </a:schemeClr>
+                </a:solidFill>
+                <a:latin typeface="Calibri Light" panose="020F0302020204030204" pitchFamily="34" charset="0"/>
+              </a:rPr>
+              <a:t>Ease</a:t>
+            </a:r>
+            <a:r>
+              <a:rPr lang="zh-CN" altLang="en-US" sz="1600" i="1" dirty="0">
+                <a:solidFill>
+                  <a:schemeClr val="tx1">
+                    <a:lumMod val="65000"/>
+                    <a:lumOff val="35000"/>
+                  </a:schemeClr>
+                </a:solidFill>
+                <a:latin typeface="Calibri Light" panose="020F0302020204030204" pitchFamily="34" charset="0"/>
+              </a:rPr>
+              <a:t> </a:t>
+            </a:r>
+            <a:r>
+              <a:rPr lang="en-US" altLang="zh-CN" sz="1600" i="1" dirty="0">
+                <a:solidFill>
+                  <a:schemeClr val="tx1">
+                    <a:lumMod val="65000"/>
+                    <a:lumOff val="35000"/>
+                  </a:schemeClr>
+                </a:solidFill>
+                <a:latin typeface="Calibri Light" panose="020F0302020204030204" pitchFamily="34" charset="0"/>
+              </a:rPr>
+              <a:t>Service</a:t>
+            </a:r>
+          </a:p>
+        </p:txBody>
+      </p:sp>
+      <p:sp>
+        <p:nvSpPr>
+          <p:cNvPr id="47" name="等腰三角形 5">
+            <a:extLst>
+              <a:ext uri="{FF2B5EF4-FFF2-40B4-BE49-F238E27FC236}">
+                <a16:creationId xmlns:a16="http://schemas.microsoft.com/office/drawing/2014/main" id="{19F40D9D-5FE9-4841-AD3A-223DA45CD0F4}"/>
+              </a:ext>
+            </a:extLst>
+          </p:cNvPr>
+          <p:cNvSpPr/>
+          <p:nvPr/>
+        </p:nvSpPr>
+        <p:spPr>
+          <a:xfrm rot="5400000">
+            <a:off x="3535010" y="409083"/>
+            <a:ext cx="215900" cy="115287"/>
+          </a:xfrm>
+          <a:prstGeom prst="triangle">
+            <a:avLst/>
+          </a:prstGeom>
+          <a:solidFill>
+            <a:schemeClr val="tx1">
+              <a:lumMod val="65000"/>
+              <a:lumOff val="35000"/>
+            </a:schemeClr>
+          </a:solidFill>
+          <a:ln>
+            <a:noFill/>
+          </a:ln>
+        </p:spPr>
+        <p:style>
+          <a:lnRef idx="2">
+            <a:schemeClr val="accent1">
+              <a:shade val="50000"/>
+            </a:schemeClr>
+          </a:lnRef>
+          <a:fillRef idx="1">
+            <a:schemeClr val="accent1"/>
+          </a:fillRef>
+          <a:effectRef idx="0">
+            <a:schemeClr val="accent1"/>
+          </a:effectRef>
+          <a:fontRef idx="minor">
+            <a:schemeClr val="lt1"/>
+          </a:fontRef>
+        </p:style>
+        <p:txBody>
+          <a:bodyPr rtlCol="0" anchor="ctr"/>
+          <a:lstStyle/>
+          <a:p>
+            <a:pPr algn="ctr"/>
+            <a:endParaRPr lang="zh-CN" altLang="en-US"/>
+          </a:p>
+        </p:txBody>
+      </p:sp>
+    </p:spTree>
+    <p:extLst>
+      <p:ext uri="{BB962C8B-B14F-4D97-AF65-F5344CB8AC3E}">
+        <p14:creationId xmlns:p14="http://schemas.microsoft.com/office/powerpoint/2010/main" val="188871156"/>
+      </p:ext>
+    </p:extLst>
+  </p:cSld>
+  <p:clrMapOvr>
+    <a:masterClrMapping/>
+  </p:clrMapOvr>
+</p:sld>
+</file>
+
+<file path=ppt/slides/slide3.xml><?xml version="1.0" encoding="utf-8"?>
+<p:sld xmlns:a="http://schemas.openxmlformats.org/drawingml/2006/main" xmlns:r="http://schemas.openxmlformats.org/officeDocument/2006/relationships" xmlns:p="http://schemas.openxmlformats.org/presentationml/2006/main">
+  <p:cSld>
+    <p:spTree>
+      <p:nvGrpSpPr>
+        <p:cNvPr id="1" name=""/>
+        <p:cNvGrpSpPr/>
+        <p:nvPr/>
+      </p:nvGrpSpPr>
+      <p:grpSpPr>
+        <a:xfrm>
+          <a:off x="0" y="0"/>
+          <a:ext cx="0" cy="0"/>
+          <a:chOff x="0" y="0"/>
+          <a:chExt cx="0" cy="0"/>
+        </a:xfrm>
+      </p:grpSpPr>
+      <p:sp>
+        <p:nvSpPr>
           <p:cNvPr id="120" name="矩形 253">
             <a:extLst>
               <a:ext uri="{FF2B5EF4-FFF2-40B4-BE49-F238E27FC236}">
@@ -11775,7 +14899,7 @@
 </p:sld>
 </file>
 
-<file path=ppt/slides/slide3.xml><?xml version="1.0" encoding="utf-8"?>
+<file path=ppt/slides/slide4.xml><?xml version="1.0" encoding="utf-8"?>
 <p:sld xmlns:a="http://schemas.openxmlformats.org/drawingml/2006/main" xmlns:r="http://schemas.openxmlformats.org/officeDocument/2006/relationships" xmlns:p="http://schemas.openxmlformats.org/presentationml/2006/main">
   <p:cSld>
     <p:spTree>
@@ -15571,7 +18695,7 @@
 </p:sld>
 </file>
 
-<file path=ppt/slides/slide4.xml><?xml version="1.0" encoding="utf-8"?>
+<file path=ppt/slides/slide5.xml><?xml version="1.0" encoding="utf-8"?>
 <p:sld xmlns:a="http://schemas.openxmlformats.org/drawingml/2006/main" xmlns:r="http://schemas.openxmlformats.org/officeDocument/2006/relationships" xmlns:p="http://schemas.openxmlformats.org/presentationml/2006/main">
   <p:cSld>
     <p:spTree>
@@ -17793,7 +20917,7 @@
 </p:sld>
 </file>
 
-<file path=ppt/slides/slide5.xml><?xml version="1.0" encoding="utf-8"?>
+<file path=ppt/slides/slide6.xml><?xml version="1.0" encoding="utf-8"?>
 <p:sld xmlns:a="http://schemas.openxmlformats.org/drawingml/2006/main" xmlns:r="http://schemas.openxmlformats.org/officeDocument/2006/relationships" xmlns:p="http://schemas.openxmlformats.org/presentationml/2006/main">
   <p:cSld>
     <p:spTree>
@@ -19492,7 +22616,7 @@
 </p:sld>
 </file>
 
-<file path=ppt/slides/slide6.xml><?xml version="1.0" encoding="utf-8"?>
+<file path=ppt/slides/slide7.xml><?xml version="1.0" encoding="utf-8"?>
 <p:sld xmlns:a="http://schemas.openxmlformats.org/drawingml/2006/main" xmlns:r="http://schemas.openxmlformats.org/officeDocument/2006/relationships" xmlns:p="http://schemas.openxmlformats.org/presentationml/2006/main">
   <p:cSld>
     <p:spTree>

</xml_diff>

<commit_message>
add the diagrams for cannary deployment & the whole site shadow
</commit_message>
<xml_diff>
--- a/docs/architecture.pptx
+++ b/docs/architecture.pptx
@@ -5,10 +5,10 @@
     <p:sldMasterId id="2147483648" r:id="rId1"/>
   </p:sldMasterIdLst>
   <p:notesMasterIdLst>
-    <p:notesMasterId r:id="rId14"/>
+    <p:notesMasterId r:id="rId15"/>
   </p:notesMasterIdLst>
   <p:handoutMasterIdLst>
-    <p:handoutMasterId r:id="rId15"/>
+    <p:handoutMasterId r:id="rId16"/>
   </p:handoutMasterIdLst>
   <p:sldIdLst>
     <p:sldId id="256" r:id="rId2"/>
@@ -21,8 +21,9 @@
     <p:sldId id="259" r:id="rId9"/>
     <p:sldId id="261" r:id="rId10"/>
     <p:sldId id="2451" r:id="rId11"/>
-    <p:sldId id="2447" r:id="rId12"/>
-    <p:sldId id="2448" r:id="rId13"/>
+    <p:sldId id="2452" r:id="rId12"/>
+    <p:sldId id="2447" r:id="rId13"/>
+    <p:sldId id="2448" r:id="rId14"/>
   </p:sldIdLst>
   <p:sldSz cx="12192000" cy="6858000"/>
   <p:notesSz cx="6858000" cy="9144000"/>
@@ -1056,6 +1057,90 @@
         </p:txBody>
       </p:sp>
     </p:spTree>
+  </p:cSld>
+  <p:clrMapOvr>
+    <a:masterClrMapping/>
+  </p:clrMapOvr>
+</p:notes>
+</file>
+
+<file path=ppt/notesSlides/notesSlide6.xml><?xml version="1.0" encoding="utf-8"?>
+<p:notes xmlns:a="http://schemas.openxmlformats.org/drawingml/2006/main" xmlns:r="http://schemas.openxmlformats.org/officeDocument/2006/relationships" xmlns:p="http://schemas.openxmlformats.org/presentationml/2006/main">
+  <p:cSld>
+    <p:spTree>
+      <p:nvGrpSpPr>
+        <p:cNvPr id="1" name=""/>
+        <p:cNvGrpSpPr/>
+        <p:nvPr/>
+      </p:nvGrpSpPr>
+      <p:grpSpPr>
+        <a:xfrm>
+          <a:off x="0" y="0"/>
+          <a:ext cx="0" cy="0"/>
+          <a:chOff x="0" y="0"/>
+          <a:chExt cx="0" cy="0"/>
+        </a:xfrm>
+      </p:grpSpPr>
+      <p:sp>
+        <p:nvSpPr>
+          <p:cNvPr id="2" name="幻灯片图像占位符 1"/>
+          <p:cNvSpPr>
+            <a:spLocks noGrp="1" noRot="1" noChangeAspect="1"/>
+          </p:cNvSpPr>
+          <p:nvPr>
+            <p:ph type="sldImg"/>
+          </p:nvPr>
+        </p:nvSpPr>
+        <p:spPr/>
+      </p:sp>
+      <p:sp>
+        <p:nvSpPr>
+          <p:cNvPr id="3" name="备注占位符 2"/>
+          <p:cNvSpPr>
+            <a:spLocks noGrp="1"/>
+          </p:cNvSpPr>
+          <p:nvPr>
+            <p:ph type="body" idx="1"/>
+          </p:nvPr>
+        </p:nvSpPr>
+        <p:spPr/>
+        <p:txBody>
+          <a:bodyPr/>
+          <a:lstStyle/>
+          <a:p>
+            <a:endParaRPr kumimoji="1" lang="zh-CN" altLang="en-US"/>
+          </a:p>
+        </p:txBody>
+      </p:sp>
+      <p:sp>
+        <p:nvSpPr>
+          <p:cNvPr id="4" name="灯片编号占位符 3"/>
+          <p:cNvSpPr>
+            <a:spLocks noGrp="1"/>
+          </p:cNvSpPr>
+          <p:nvPr>
+            <p:ph type="sldNum" sz="quarter" idx="5"/>
+          </p:nvPr>
+        </p:nvSpPr>
+        <p:spPr/>
+        <p:txBody>
+          <a:bodyPr/>
+          <a:lstStyle/>
+          <a:p>
+            <a:fld id="{6A28E5CD-C188-4EE7-A618-C84A2D3EB466}" type="slidenum">
+              <a:rPr lang="zh-CN" altLang="en-US" smtClean="0"/>
+              <a:t>11</a:t>
+            </a:fld>
+            <a:endParaRPr lang="zh-CN" altLang="en-US"/>
+          </a:p>
+        </p:txBody>
+      </p:sp>
+    </p:spTree>
+    <p:extLst>
+      <p:ext uri="{BB962C8B-B14F-4D97-AF65-F5344CB8AC3E}">
+        <p14:creationId xmlns:p14="http://schemas.microsoft.com/office/powerpoint/2010/main" val="4191986353"/>
+      </p:ext>
+    </p:extLst>
   </p:cSld>
   <p:clrMapOvr>
     <a:masterClrMapping/>
@@ -14059,6 +14144,3693 @@
       </p:grpSpPr>
       <p:sp>
         <p:nvSpPr>
+          <p:cNvPr id="2" name="圆角矩形 1">
+            <a:extLst>
+              <a:ext uri="{FF2B5EF4-FFF2-40B4-BE49-F238E27FC236}">
+                <a16:creationId xmlns:a16="http://schemas.microsoft.com/office/drawing/2014/main" id="{37152450-FEA4-4E45-B6A1-057543264D06}"/>
+              </a:ext>
+            </a:extLst>
+          </p:cNvPr>
+          <p:cNvSpPr/>
+          <p:nvPr/>
+        </p:nvSpPr>
+        <p:spPr>
+          <a:xfrm>
+            <a:off x="609528" y="2002027"/>
+            <a:ext cx="619676" cy="317395"/>
+          </a:xfrm>
+          <a:prstGeom prst="roundRect">
+            <a:avLst/>
+          </a:prstGeom>
+        </p:spPr>
+        <p:style>
+          <a:lnRef idx="2">
+            <a:schemeClr val="accent1">
+              <a:shade val="50000"/>
+            </a:schemeClr>
+          </a:lnRef>
+          <a:fillRef idx="1">
+            <a:schemeClr val="accent1"/>
+          </a:fillRef>
+          <a:effectRef idx="0">
+            <a:schemeClr val="accent1"/>
+          </a:effectRef>
+          <a:fontRef idx="minor">
+            <a:schemeClr val="lt1"/>
+          </a:fontRef>
+        </p:style>
+        <p:txBody>
+          <a:bodyPr rtlCol="0" anchor="ctr"/>
+          <a:lstStyle/>
+          <a:p>
+            <a:pPr algn="ctr"/>
+            <a:r>
+              <a:rPr kumimoji="1" lang="en-US" altLang="zh-CN" dirty="0"/>
+              <a:t>A</a:t>
+            </a:r>
+            <a:endParaRPr kumimoji="1" lang="zh-CN" altLang="en-US" dirty="0"/>
+          </a:p>
+        </p:txBody>
+      </p:sp>
+      <p:sp>
+        <p:nvSpPr>
+          <p:cNvPr id="5" name="圆角矩形 4">
+            <a:extLst>
+              <a:ext uri="{FF2B5EF4-FFF2-40B4-BE49-F238E27FC236}">
+                <a16:creationId xmlns:a16="http://schemas.microsoft.com/office/drawing/2014/main" id="{C3C95F03-1979-7542-83E4-B71DB30DE2B4}"/>
+              </a:ext>
+            </a:extLst>
+          </p:cNvPr>
+          <p:cNvSpPr/>
+          <p:nvPr/>
+        </p:nvSpPr>
+        <p:spPr>
+          <a:xfrm>
+            <a:off x="1327446" y="2002026"/>
+            <a:ext cx="619676" cy="317395"/>
+          </a:xfrm>
+          <a:prstGeom prst="roundRect">
+            <a:avLst/>
+          </a:prstGeom>
+          <a:solidFill>
+            <a:schemeClr val="bg1"/>
+          </a:solidFill>
+          <a:ln w="19050">
+            <a:solidFill>
+              <a:srgbClr val="00B050"/>
+            </a:solidFill>
+            <a:prstDash val="dash"/>
+          </a:ln>
+        </p:spPr>
+        <p:style>
+          <a:lnRef idx="2">
+            <a:schemeClr val="accent1">
+              <a:shade val="50000"/>
+            </a:schemeClr>
+          </a:lnRef>
+          <a:fillRef idx="1">
+            <a:schemeClr val="accent1"/>
+          </a:fillRef>
+          <a:effectRef idx="0">
+            <a:schemeClr val="accent1"/>
+          </a:effectRef>
+          <a:fontRef idx="minor">
+            <a:schemeClr val="lt1"/>
+          </a:fontRef>
+        </p:style>
+        <p:txBody>
+          <a:bodyPr rtlCol="0" anchor="ctr"/>
+          <a:lstStyle/>
+          <a:p>
+            <a:pPr algn="ctr"/>
+            <a:r>
+              <a:rPr kumimoji="1" lang="en-US" altLang="zh-CN" dirty="0">
+                <a:solidFill>
+                  <a:srgbClr val="00B050"/>
+                </a:solidFill>
+              </a:rPr>
+              <a:t>A</a:t>
+            </a:r>
+            <a:r>
+              <a:rPr kumimoji="1" lang="zh-CN" altLang="en-US" dirty="0">
+                <a:solidFill>
+                  <a:srgbClr val="00B050"/>
+                </a:solidFill>
+              </a:rPr>
+              <a:t>‘</a:t>
+            </a:r>
+          </a:p>
+        </p:txBody>
+      </p:sp>
+      <p:cxnSp>
+        <p:nvCxnSpPr>
+          <p:cNvPr id="9" name="直线箭头连接符 8">
+            <a:extLst>
+              <a:ext uri="{FF2B5EF4-FFF2-40B4-BE49-F238E27FC236}">
+                <a16:creationId xmlns:a16="http://schemas.microsoft.com/office/drawing/2014/main" id="{2BE76467-7EFA-A244-B624-E3A0E1895314}"/>
+              </a:ext>
+            </a:extLst>
+          </p:cNvPr>
+          <p:cNvCxnSpPr>
+            <a:cxnSpLocks/>
+            <a:endCxn id="5" idx="0"/>
+          </p:cNvCxnSpPr>
+          <p:nvPr/>
+        </p:nvCxnSpPr>
+        <p:spPr>
+          <a:xfrm>
+            <a:off x="1637284" y="1412579"/>
+            <a:ext cx="0" cy="589447"/>
+          </a:xfrm>
+          <a:prstGeom prst="straightConnector1">
+            <a:avLst/>
+          </a:prstGeom>
+          <a:ln w="19050">
+            <a:solidFill>
+              <a:srgbClr val="00B050"/>
+            </a:solidFill>
+            <a:prstDash val="lgDash"/>
+            <a:tailEnd type="triangle"/>
+          </a:ln>
+        </p:spPr>
+        <p:style>
+          <a:lnRef idx="1">
+            <a:schemeClr val="accent1"/>
+          </a:lnRef>
+          <a:fillRef idx="0">
+            <a:schemeClr val="accent1"/>
+          </a:fillRef>
+          <a:effectRef idx="0">
+            <a:schemeClr val="accent1"/>
+          </a:effectRef>
+          <a:fontRef idx="minor">
+            <a:schemeClr val="tx1"/>
+          </a:fontRef>
+        </p:style>
+      </p:cxnSp>
+      <p:cxnSp>
+        <p:nvCxnSpPr>
+          <p:cNvPr id="12" name="直线箭头连接符 11">
+            <a:extLst>
+              <a:ext uri="{FF2B5EF4-FFF2-40B4-BE49-F238E27FC236}">
+                <a16:creationId xmlns:a16="http://schemas.microsoft.com/office/drawing/2014/main" id="{DB45D671-76E8-A641-BFE3-7DB0E80B6628}"/>
+              </a:ext>
+            </a:extLst>
+          </p:cNvPr>
+          <p:cNvCxnSpPr>
+            <a:cxnSpLocks/>
+            <a:endCxn id="2" idx="0"/>
+          </p:cNvCxnSpPr>
+          <p:nvPr/>
+        </p:nvCxnSpPr>
+        <p:spPr>
+          <a:xfrm>
+            <a:off x="919366" y="1412579"/>
+            <a:ext cx="0" cy="589448"/>
+          </a:xfrm>
+          <a:prstGeom prst="straightConnector1">
+            <a:avLst/>
+          </a:prstGeom>
+          <a:ln>
+            <a:tailEnd type="triangle"/>
+          </a:ln>
+        </p:spPr>
+        <p:style>
+          <a:lnRef idx="1">
+            <a:schemeClr val="accent1"/>
+          </a:lnRef>
+          <a:fillRef idx="0">
+            <a:schemeClr val="accent1"/>
+          </a:fillRef>
+          <a:effectRef idx="0">
+            <a:schemeClr val="accent1"/>
+          </a:effectRef>
+          <a:fontRef idx="minor">
+            <a:schemeClr val="tx1"/>
+          </a:fontRef>
+        </p:style>
+      </p:cxnSp>
+      <p:sp>
+        <p:nvSpPr>
+          <p:cNvPr id="17" name="圆角矩形 16">
+            <a:extLst>
+              <a:ext uri="{FF2B5EF4-FFF2-40B4-BE49-F238E27FC236}">
+                <a16:creationId xmlns:a16="http://schemas.microsoft.com/office/drawing/2014/main" id="{E9CCF670-865A-1349-91A8-E5F3E512E19C}"/>
+              </a:ext>
+            </a:extLst>
+          </p:cNvPr>
+          <p:cNvSpPr/>
+          <p:nvPr/>
+        </p:nvSpPr>
+        <p:spPr>
+          <a:xfrm>
+            <a:off x="2205320" y="2002027"/>
+            <a:ext cx="619676" cy="317395"/>
+          </a:xfrm>
+          <a:prstGeom prst="roundRect">
+            <a:avLst/>
+          </a:prstGeom>
+        </p:spPr>
+        <p:style>
+          <a:lnRef idx="2">
+            <a:schemeClr val="accent1">
+              <a:shade val="50000"/>
+            </a:schemeClr>
+          </a:lnRef>
+          <a:fillRef idx="1">
+            <a:schemeClr val="accent1"/>
+          </a:fillRef>
+          <a:effectRef idx="0">
+            <a:schemeClr val="accent1"/>
+          </a:effectRef>
+          <a:fontRef idx="minor">
+            <a:schemeClr val="lt1"/>
+          </a:fontRef>
+        </p:style>
+        <p:txBody>
+          <a:bodyPr rtlCol="0" anchor="ctr"/>
+          <a:lstStyle/>
+          <a:p>
+            <a:pPr algn="ctr"/>
+            <a:r>
+              <a:rPr kumimoji="1" lang="en-US" altLang="zh-CN" dirty="0"/>
+              <a:t>B</a:t>
+            </a:r>
+            <a:endParaRPr kumimoji="1" lang="zh-CN" altLang="en-US" dirty="0"/>
+          </a:p>
+        </p:txBody>
+      </p:sp>
+      <p:sp>
+        <p:nvSpPr>
+          <p:cNvPr id="18" name="圆角矩形 17">
+            <a:extLst>
+              <a:ext uri="{FF2B5EF4-FFF2-40B4-BE49-F238E27FC236}">
+                <a16:creationId xmlns:a16="http://schemas.microsoft.com/office/drawing/2014/main" id="{0D33AAFD-214A-CE47-B0CC-A68F341131CC}"/>
+              </a:ext>
+            </a:extLst>
+          </p:cNvPr>
+          <p:cNvSpPr/>
+          <p:nvPr/>
+        </p:nvSpPr>
+        <p:spPr>
+          <a:xfrm>
+            <a:off x="2923238" y="2002026"/>
+            <a:ext cx="619676" cy="317395"/>
+          </a:xfrm>
+          <a:prstGeom prst="roundRect">
+            <a:avLst/>
+          </a:prstGeom>
+          <a:solidFill>
+            <a:schemeClr val="bg1"/>
+          </a:solidFill>
+          <a:ln w="19050">
+            <a:solidFill>
+              <a:srgbClr val="E95429"/>
+            </a:solidFill>
+            <a:prstDash val="dash"/>
+          </a:ln>
+        </p:spPr>
+        <p:style>
+          <a:lnRef idx="2">
+            <a:schemeClr val="accent1">
+              <a:shade val="50000"/>
+            </a:schemeClr>
+          </a:lnRef>
+          <a:fillRef idx="1">
+            <a:schemeClr val="accent1"/>
+          </a:fillRef>
+          <a:effectRef idx="0">
+            <a:schemeClr val="accent1"/>
+          </a:effectRef>
+          <a:fontRef idx="minor">
+            <a:schemeClr val="lt1"/>
+          </a:fontRef>
+        </p:style>
+        <p:txBody>
+          <a:bodyPr rtlCol="0" anchor="ctr"/>
+          <a:lstStyle/>
+          <a:p>
+            <a:pPr algn="ctr"/>
+            <a:r>
+              <a:rPr kumimoji="1" lang="en-US" altLang="zh-CN" dirty="0">
+                <a:solidFill>
+                  <a:srgbClr val="E95429"/>
+                </a:solidFill>
+              </a:rPr>
+              <a:t>B</a:t>
+            </a:r>
+            <a:r>
+              <a:rPr kumimoji="1" lang="zh-CN" altLang="en-US" dirty="0">
+                <a:solidFill>
+                  <a:srgbClr val="E95429"/>
+                </a:solidFill>
+              </a:rPr>
+              <a:t>‘</a:t>
+            </a:r>
+          </a:p>
+        </p:txBody>
+      </p:sp>
+      <p:cxnSp>
+        <p:nvCxnSpPr>
+          <p:cNvPr id="19" name="直线箭头连接符 18">
+            <a:extLst>
+              <a:ext uri="{FF2B5EF4-FFF2-40B4-BE49-F238E27FC236}">
+                <a16:creationId xmlns:a16="http://schemas.microsoft.com/office/drawing/2014/main" id="{DAE64835-31EA-1F4C-A387-19A3655A4F75}"/>
+              </a:ext>
+            </a:extLst>
+          </p:cNvPr>
+          <p:cNvCxnSpPr>
+            <a:cxnSpLocks/>
+            <a:endCxn id="18" idx="0"/>
+          </p:cNvCxnSpPr>
+          <p:nvPr/>
+        </p:nvCxnSpPr>
+        <p:spPr>
+          <a:xfrm>
+            <a:off x="3233076" y="1412579"/>
+            <a:ext cx="0" cy="589447"/>
+          </a:xfrm>
+          <a:prstGeom prst="straightConnector1">
+            <a:avLst/>
+          </a:prstGeom>
+          <a:ln w="19050">
+            <a:solidFill>
+              <a:srgbClr val="E95429"/>
+            </a:solidFill>
+            <a:prstDash val="lgDash"/>
+            <a:tailEnd type="triangle"/>
+          </a:ln>
+        </p:spPr>
+        <p:style>
+          <a:lnRef idx="1">
+            <a:schemeClr val="accent1"/>
+          </a:lnRef>
+          <a:fillRef idx="0">
+            <a:schemeClr val="accent1"/>
+          </a:fillRef>
+          <a:effectRef idx="0">
+            <a:schemeClr val="accent1"/>
+          </a:effectRef>
+          <a:fontRef idx="minor">
+            <a:schemeClr val="tx1"/>
+          </a:fontRef>
+        </p:style>
+      </p:cxnSp>
+      <p:cxnSp>
+        <p:nvCxnSpPr>
+          <p:cNvPr id="20" name="直线箭头连接符 19">
+            <a:extLst>
+              <a:ext uri="{FF2B5EF4-FFF2-40B4-BE49-F238E27FC236}">
+                <a16:creationId xmlns:a16="http://schemas.microsoft.com/office/drawing/2014/main" id="{0519129F-19B4-EE4B-8BCB-D4736CA09D4B}"/>
+              </a:ext>
+            </a:extLst>
+          </p:cNvPr>
+          <p:cNvCxnSpPr>
+            <a:cxnSpLocks/>
+            <a:endCxn id="17" idx="0"/>
+          </p:cNvCxnSpPr>
+          <p:nvPr/>
+        </p:nvCxnSpPr>
+        <p:spPr>
+          <a:xfrm>
+            <a:off x="2515158" y="1412579"/>
+            <a:ext cx="0" cy="589448"/>
+          </a:xfrm>
+          <a:prstGeom prst="straightConnector1">
+            <a:avLst/>
+          </a:prstGeom>
+          <a:ln>
+            <a:tailEnd type="triangle"/>
+          </a:ln>
+        </p:spPr>
+        <p:style>
+          <a:lnRef idx="1">
+            <a:schemeClr val="accent1"/>
+          </a:lnRef>
+          <a:fillRef idx="0">
+            <a:schemeClr val="accent1"/>
+          </a:fillRef>
+          <a:effectRef idx="0">
+            <a:schemeClr val="accent1"/>
+          </a:effectRef>
+          <a:fontRef idx="minor">
+            <a:schemeClr val="tx1"/>
+          </a:fontRef>
+        </p:style>
+      </p:cxnSp>
+      <p:sp>
+        <p:nvSpPr>
+          <p:cNvPr id="21" name="圆角矩形 20">
+            <a:extLst>
+              <a:ext uri="{FF2B5EF4-FFF2-40B4-BE49-F238E27FC236}">
+                <a16:creationId xmlns:a16="http://schemas.microsoft.com/office/drawing/2014/main" id="{77A378E4-F540-644B-882D-9376100E6F88}"/>
+              </a:ext>
+            </a:extLst>
+          </p:cNvPr>
+          <p:cNvSpPr/>
+          <p:nvPr/>
+        </p:nvSpPr>
+        <p:spPr>
+          <a:xfrm>
+            <a:off x="1309883" y="3245157"/>
+            <a:ext cx="619676" cy="317395"/>
+          </a:xfrm>
+          <a:prstGeom prst="roundRect">
+            <a:avLst/>
+          </a:prstGeom>
+        </p:spPr>
+        <p:style>
+          <a:lnRef idx="2">
+            <a:schemeClr val="accent1">
+              <a:shade val="50000"/>
+            </a:schemeClr>
+          </a:lnRef>
+          <a:fillRef idx="1">
+            <a:schemeClr val="accent1"/>
+          </a:fillRef>
+          <a:effectRef idx="0">
+            <a:schemeClr val="accent1"/>
+          </a:effectRef>
+          <a:fontRef idx="minor">
+            <a:schemeClr val="lt1"/>
+          </a:fontRef>
+        </p:style>
+        <p:txBody>
+          <a:bodyPr rtlCol="0" anchor="ctr"/>
+          <a:lstStyle/>
+          <a:p>
+            <a:pPr algn="ctr"/>
+            <a:r>
+              <a:rPr kumimoji="1" lang="en-US" altLang="zh-CN" dirty="0"/>
+              <a:t>Z</a:t>
+            </a:r>
+          </a:p>
+        </p:txBody>
+      </p:sp>
+      <p:cxnSp>
+        <p:nvCxnSpPr>
+          <p:cNvPr id="23" name="直线箭头连接符 22">
+            <a:extLst>
+              <a:ext uri="{FF2B5EF4-FFF2-40B4-BE49-F238E27FC236}">
+                <a16:creationId xmlns:a16="http://schemas.microsoft.com/office/drawing/2014/main" id="{B83A93EF-D610-2241-948B-49FC1E8C2F1D}"/>
+              </a:ext>
+            </a:extLst>
+          </p:cNvPr>
+          <p:cNvCxnSpPr>
+            <a:cxnSpLocks/>
+            <a:stCxn id="5" idx="2"/>
+            <a:endCxn id="22" idx="0"/>
+          </p:cNvCxnSpPr>
+          <p:nvPr/>
+        </p:nvCxnSpPr>
+        <p:spPr>
+          <a:xfrm>
+            <a:off x="1637284" y="2319421"/>
+            <a:ext cx="700355" cy="925735"/>
+          </a:xfrm>
+          <a:prstGeom prst="straightConnector1">
+            <a:avLst/>
+          </a:prstGeom>
+          <a:ln w="19050">
+            <a:solidFill>
+              <a:srgbClr val="00B050"/>
+            </a:solidFill>
+            <a:prstDash val="lgDash"/>
+            <a:tailEnd type="triangle"/>
+          </a:ln>
+        </p:spPr>
+        <p:style>
+          <a:lnRef idx="1">
+            <a:schemeClr val="accent1"/>
+          </a:lnRef>
+          <a:fillRef idx="0">
+            <a:schemeClr val="accent1"/>
+          </a:fillRef>
+          <a:effectRef idx="0">
+            <a:schemeClr val="accent1"/>
+          </a:effectRef>
+          <a:fontRef idx="minor">
+            <a:schemeClr val="tx1"/>
+          </a:fontRef>
+        </p:style>
+      </p:cxnSp>
+      <p:cxnSp>
+        <p:nvCxnSpPr>
+          <p:cNvPr id="24" name="直线箭头连接符 23">
+            <a:extLst>
+              <a:ext uri="{FF2B5EF4-FFF2-40B4-BE49-F238E27FC236}">
+                <a16:creationId xmlns:a16="http://schemas.microsoft.com/office/drawing/2014/main" id="{29B49EC9-F99E-B542-B131-EB7BFD6B4017}"/>
+              </a:ext>
+            </a:extLst>
+          </p:cNvPr>
+          <p:cNvCxnSpPr>
+            <a:cxnSpLocks/>
+            <a:stCxn id="2" idx="2"/>
+            <a:endCxn id="21" idx="0"/>
+          </p:cNvCxnSpPr>
+          <p:nvPr/>
+        </p:nvCxnSpPr>
+        <p:spPr>
+          <a:xfrm>
+            <a:off x="919366" y="2319422"/>
+            <a:ext cx="700355" cy="925735"/>
+          </a:xfrm>
+          <a:prstGeom prst="straightConnector1">
+            <a:avLst/>
+          </a:prstGeom>
+          <a:ln>
+            <a:tailEnd type="triangle"/>
+          </a:ln>
+        </p:spPr>
+        <p:style>
+          <a:lnRef idx="1">
+            <a:schemeClr val="accent1"/>
+          </a:lnRef>
+          <a:fillRef idx="0">
+            <a:schemeClr val="accent1"/>
+          </a:fillRef>
+          <a:effectRef idx="0">
+            <a:schemeClr val="accent1"/>
+          </a:effectRef>
+          <a:fontRef idx="minor">
+            <a:schemeClr val="tx1"/>
+          </a:fontRef>
+        </p:style>
+      </p:cxnSp>
+      <p:sp>
+        <p:nvSpPr>
+          <p:cNvPr id="25" name="文本框 24">
+            <a:extLst>
+              <a:ext uri="{FF2B5EF4-FFF2-40B4-BE49-F238E27FC236}">
+                <a16:creationId xmlns:a16="http://schemas.microsoft.com/office/drawing/2014/main" id="{348E2F2E-43E5-3A4B-BFA4-B26A5AA667BF}"/>
+              </a:ext>
+            </a:extLst>
+          </p:cNvPr>
+          <p:cNvSpPr txBox="1"/>
+          <p:nvPr/>
+        </p:nvSpPr>
+        <p:spPr>
+          <a:xfrm>
+            <a:off x="1281257" y="1135579"/>
+            <a:ext cx="712054" cy="276999"/>
+          </a:xfrm>
+          <a:prstGeom prst="rect">
+            <a:avLst/>
+          </a:prstGeom>
+          <a:noFill/>
+        </p:spPr>
+        <p:txBody>
+          <a:bodyPr wrap="none" rtlCol="0">
+            <a:spAutoFit/>
+          </a:bodyPr>
+          <a:lstStyle/>
+          <a:p>
+            <a:r>
+              <a:rPr kumimoji="1" lang="en-US" altLang="zh-CN" sz="1200" dirty="0">
+                <a:solidFill>
+                  <a:srgbClr val="00B050"/>
+                </a:solidFill>
+              </a:rPr>
+              <a:t>Android</a:t>
+            </a:r>
+            <a:endParaRPr kumimoji="1" lang="zh-CN" altLang="en-US" sz="1200" dirty="0">
+              <a:solidFill>
+                <a:srgbClr val="00B050"/>
+              </a:solidFill>
+            </a:endParaRPr>
+          </a:p>
+        </p:txBody>
+      </p:sp>
+      <p:sp>
+        <p:nvSpPr>
+          <p:cNvPr id="26" name="文本框 25">
+            <a:extLst>
+              <a:ext uri="{FF2B5EF4-FFF2-40B4-BE49-F238E27FC236}">
+                <a16:creationId xmlns:a16="http://schemas.microsoft.com/office/drawing/2014/main" id="{EAD0BB35-A9B5-7C4A-B7CB-9FD79F03AD25}"/>
+              </a:ext>
+            </a:extLst>
+          </p:cNvPr>
+          <p:cNvSpPr txBox="1"/>
+          <p:nvPr/>
+        </p:nvSpPr>
+        <p:spPr>
+          <a:xfrm>
+            <a:off x="2877049" y="1110434"/>
+            <a:ext cx="660758" cy="276999"/>
+          </a:xfrm>
+          <a:prstGeom prst="rect">
+            <a:avLst/>
+          </a:prstGeom>
+          <a:noFill/>
+        </p:spPr>
+        <p:txBody>
+          <a:bodyPr wrap="none" rtlCol="0">
+            <a:spAutoFit/>
+          </a:bodyPr>
+          <a:lstStyle/>
+          <a:p>
+            <a:r>
+              <a:rPr kumimoji="1" lang="en-US" altLang="zh-CN" sz="1200" dirty="0">
+                <a:solidFill>
+                  <a:srgbClr val="E95429"/>
+                </a:solidFill>
+              </a:rPr>
+              <a:t>iPhone</a:t>
+            </a:r>
+            <a:endParaRPr kumimoji="1" lang="zh-CN" altLang="en-US" sz="1200" dirty="0">
+              <a:solidFill>
+                <a:srgbClr val="E95429"/>
+              </a:solidFill>
+            </a:endParaRPr>
+          </a:p>
+        </p:txBody>
+      </p:sp>
+      <p:cxnSp>
+        <p:nvCxnSpPr>
+          <p:cNvPr id="28" name="直线箭头连接符 27">
+            <a:extLst>
+              <a:ext uri="{FF2B5EF4-FFF2-40B4-BE49-F238E27FC236}">
+                <a16:creationId xmlns:a16="http://schemas.microsoft.com/office/drawing/2014/main" id="{51A0A646-8A94-5A4E-BE68-7C562C1828A0}"/>
+              </a:ext>
+            </a:extLst>
+          </p:cNvPr>
+          <p:cNvCxnSpPr>
+            <a:cxnSpLocks/>
+            <a:stCxn id="18" idx="2"/>
+            <a:endCxn id="22" idx="0"/>
+          </p:cNvCxnSpPr>
+          <p:nvPr/>
+        </p:nvCxnSpPr>
+        <p:spPr>
+          <a:xfrm flipH="1">
+            <a:off x="2337639" y="2319421"/>
+            <a:ext cx="895437" cy="925735"/>
+          </a:xfrm>
+          <a:prstGeom prst="straightConnector1">
+            <a:avLst/>
+          </a:prstGeom>
+          <a:ln w="19050">
+            <a:solidFill>
+              <a:srgbClr val="E95429"/>
+            </a:solidFill>
+            <a:prstDash val="lgDash"/>
+            <a:tailEnd type="triangle"/>
+          </a:ln>
+        </p:spPr>
+        <p:style>
+          <a:lnRef idx="1">
+            <a:schemeClr val="accent1"/>
+          </a:lnRef>
+          <a:fillRef idx="0">
+            <a:schemeClr val="accent1"/>
+          </a:fillRef>
+          <a:effectRef idx="0">
+            <a:schemeClr val="accent1"/>
+          </a:effectRef>
+          <a:fontRef idx="minor">
+            <a:schemeClr val="tx1"/>
+          </a:fontRef>
+        </p:style>
+      </p:cxnSp>
+      <p:cxnSp>
+        <p:nvCxnSpPr>
+          <p:cNvPr id="32" name="直线箭头连接符 31">
+            <a:extLst>
+              <a:ext uri="{FF2B5EF4-FFF2-40B4-BE49-F238E27FC236}">
+                <a16:creationId xmlns:a16="http://schemas.microsoft.com/office/drawing/2014/main" id="{D8E606AE-BD89-774E-BD73-6C022B0FF006}"/>
+              </a:ext>
+            </a:extLst>
+          </p:cNvPr>
+          <p:cNvCxnSpPr>
+            <a:cxnSpLocks/>
+            <a:stCxn id="17" idx="2"/>
+            <a:endCxn id="21" idx="0"/>
+          </p:cNvCxnSpPr>
+          <p:nvPr/>
+        </p:nvCxnSpPr>
+        <p:spPr>
+          <a:xfrm flipH="1">
+            <a:off x="1619721" y="2319422"/>
+            <a:ext cx="895437" cy="925735"/>
+          </a:xfrm>
+          <a:prstGeom prst="straightConnector1">
+            <a:avLst/>
+          </a:prstGeom>
+          <a:ln>
+            <a:tailEnd type="triangle"/>
+          </a:ln>
+        </p:spPr>
+        <p:style>
+          <a:lnRef idx="1">
+            <a:schemeClr val="accent1"/>
+          </a:lnRef>
+          <a:fillRef idx="0">
+            <a:schemeClr val="accent1"/>
+          </a:fillRef>
+          <a:effectRef idx="0">
+            <a:schemeClr val="accent1"/>
+          </a:effectRef>
+          <a:fontRef idx="minor">
+            <a:schemeClr val="tx1"/>
+          </a:fontRef>
+        </p:style>
+      </p:cxnSp>
+      <p:sp>
+        <p:nvSpPr>
+          <p:cNvPr id="40" name="圆角矩形 39">
+            <a:extLst>
+              <a:ext uri="{FF2B5EF4-FFF2-40B4-BE49-F238E27FC236}">
+                <a16:creationId xmlns:a16="http://schemas.microsoft.com/office/drawing/2014/main" id="{AA02DEA5-1476-C447-BF1E-95C37D90D56D}"/>
+              </a:ext>
+            </a:extLst>
+          </p:cNvPr>
+          <p:cNvSpPr/>
+          <p:nvPr/>
+        </p:nvSpPr>
+        <p:spPr>
+          <a:xfrm>
+            <a:off x="4297358" y="2027172"/>
+            <a:ext cx="619676" cy="317395"/>
+          </a:xfrm>
+          <a:prstGeom prst="roundRect">
+            <a:avLst/>
+          </a:prstGeom>
+        </p:spPr>
+        <p:style>
+          <a:lnRef idx="2">
+            <a:schemeClr val="accent1">
+              <a:shade val="50000"/>
+            </a:schemeClr>
+          </a:lnRef>
+          <a:fillRef idx="1">
+            <a:schemeClr val="accent1"/>
+          </a:fillRef>
+          <a:effectRef idx="0">
+            <a:schemeClr val="accent1"/>
+          </a:effectRef>
+          <a:fontRef idx="minor">
+            <a:schemeClr val="lt1"/>
+          </a:fontRef>
+        </p:style>
+        <p:txBody>
+          <a:bodyPr rtlCol="0" anchor="ctr"/>
+          <a:lstStyle/>
+          <a:p>
+            <a:pPr algn="ctr"/>
+            <a:r>
+              <a:rPr kumimoji="1" lang="en-US" altLang="zh-CN" dirty="0"/>
+              <a:t>A</a:t>
+            </a:r>
+            <a:endParaRPr kumimoji="1" lang="zh-CN" altLang="en-US" dirty="0"/>
+          </a:p>
+        </p:txBody>
+      </p:sp>
+      <p:sp>
+        <p:nvSpPr>
+          <p:cNvPr id="41" name="圆角矩形 40">
+            <a:extLst>
+              <a:ext uri="{FF2B5EF4-FFF2-40B4-BE49-F238E27FC236}">
+                <a16:creationId xmlns:a16="http://schemas.microsoft.com/office/drawing/2014/main" id="{039DEAFB-C5AD-EA4A-BC6F-FDDD140A7EAC}"/>
+              </a:ext>
+            </a:extLst>
+          </p:cNvPr>
+          <p:cNvSpPr/>
+          <p:nvPr/>
+        </p:nvSpPr>
+        <p:spPr>
+          <a:xfrm>
+            <a:off x="5015276" y="2027171"/>
+            <a:ext cx="619676" cy="317395"/>
+          </a:xfrm>
+          <a:prstGeom prst="roundRect">
+            <a:avLst/>
+          </a:prstGeom>
+          <a:solidFill>
+            <a:schemeClr val="bg1"/>
+          </a:solidFill>
+          <a:ln w="19050">
+            <a:solidFill>
+              <a:srgbClr val="00B050"/>
+            </a:solidFill>
+            <a:prstDash val="dash"/>
+          </a:ln>
+        </p:spPr>
+        <p:style>
+          <a:lnRef idx="2">
+            <a:schemeClr val="accent1">
+              <a:shade val="50000"/>
+            </a:schemeClr>
+          </a:lnRef>
+          <a:fillRef idx="1">
+            <a:schemeClr val="accent1"/>
+          </a:fillRef>
+          <a:effectRef idx="0">
+            <a:schemeClr val="accent1"/>
+          </a:effectRef>
+          <a:fontRef idx="minor">
+            <a:schemeClr val="lt1"/>
+          </a:fontRef>
+        </p:style>
+        <p:txBody>
+          <a:bodyPr rtlCol="0" anchor="ctr"/>
+          <a:lstStyle/>
+          <a:p>
+            <a:pPr algn="ctr"/>
+            <a:r>
+              <a:rPr kumimoji="1" lang="en-US" altLang="zh-CN" dirty="0">
+                <a:solidFill>
+                  <a:srgbClr val="00B050"/>
+                </a:solidFill>
+              </a:rPr>
+              <a:t>A</a:t>
+            </a:r>
+            <a:r>
+              <a:rPr kumimoji="1" lang="zh-CN" altLang="en-US" dirty="0">
+                <a:solidFill>
+                  <a:srgbClr val="00B050"/>
+                </a:solidFill>
+              </a:rPr>
+              <a:t>‘</a:t>
+            </a:r>
+          </a:p>
+        </p:txBody>
+      </p:sp>
+      <p:cxnSp>
+        <p:nvCxnSpPr>
+          <p:cNvPr id="42" name="直线箭头连接符 41">
+            <a:extLst>
+              <a:ext uri="{FF2B5EF4-FFF2-40B4-BE49-F238E27FC236}">
+                <a16:creationId xmlns:a16="http://schemas.microsoft.com/office/drawing/2014/main" id="{76560CFA-2A41-9B46-815E-D41C69B32798}"/>
+              </a:ext>
+            </a:extLst>
+          </p:cNvPr>
+          <p:cNvCxnSpPr>
+            <a:cxnSpLocks/>
+            <a:endCxn id="41" idx="0"/>
+          </p:cNvCxnSpPr>
+          <p:nvPr/>
+        </p:nvCxnSpPr>
+        <p:spPr>
+          <a:xfrm>
+            <a:off x="5325114" y="1437724"/>
+            <a:ext cx="0" cy="589447"/>
+          </a:xfrm>
+          <a:prstGeom prst="straightConnector1">
+            <a:avLst/>
+          </a:prstGeom>
+          <a:ln w="19050">
+            <a:solidFill>
+              <a:srgbClr val="00B050"/>
+            </a:solidFill>
+            <a:prstDash val="lgDash"/>
+            <a:tailEnd type="triangle"/>
+          </a:ln>
+        </p:spPr>
+        <p:style>
+          <a:lnRef idx="1">
+            <a:schemeClr val="accent1"/>
+          </a:lnRef>
+          <a:fillRef idx="0">
+            <a:schemeClr val="accent1"/>
+          </a:fillRef>
+          <a:effectRef idx="0">
+            <a:schemeClr val="accent1"/>
+          </a:effectRef>
+          <a:fontRef idx="minor">
+            <a:schemeClr val="tx1"/>
+          </a:fontRef>
+        </p:style>
+      </p:cxnSp>
+      <p:cxnSp>
+        <p:nvCxnSpPr>
+          <p:cNvPr id="43" name="直线箭头连接符 42">
+            <a:extLst>
+              <a:ext uri="{FF2B5EF4-FFF2-40B4-BE49-F238E27FC236}">
+                <a16:creationId xmlns:a16="http://schemas.microsoft.com/office/drawing/2014/main" id="{906B8031-C3FD-EC4B-94CE-4BC06FB0CCAA}"/>
+              </a:ext>
+            </a:extLst>
+          </p:cNvPr>
+          <p:cNvCxnSpPr>
+            <a:cxnSpLocks/>
+            <a:endCxn id="40" idx="0"/>
+          </p:cNvCxnSpPr>
+          <p:nvPr/>
+        </p:nvCxnSpPr>
+        <p:spPr>
+          <a:xfrm>
+            <a:off x="4607196" y="1437724"/>
+            <a:ext cx="0" cy="589448"/>
+          </a:xfrm>
+          <a:prstGeom prst="straightConnector1">
+            <a:avLst/>
+          </a:prstGeom>
+          <a:ln>
+            <a:tailEnd type="triangle"/>
+          </a:ln>
+        </p:spPr>
+        <p:style>
+          <a:lnRef idx="1">
+            <a:schemeClr val="accent1"/>
+          </a:lnRef>
+          <a:fillRef idx="0">
+            <a:schemeClr val="accent1"/>
+          </a:fillRef>
+          <a:effectRef idx="0">
+            <a:schemeClr val="accent1"/>
+          </a:effectRef>
+          <a:fontRef idx="minor">
+            <a:schemeClr val="tx1"/>
+          </a:fontRef>
+        </p:style>
+      </p:cxnSp>
+      <p:sp>
+        <p:nvSpPr>
+          <p:cNvPr id="44" name="圆角矩形 43">
+            <a:extLst>
+              <a:ext uri="{FF2B5EF4-FFF2-40B4-BE49-F238E27FC236}">
+                <a16:creationId xmlns:a16="http://schemas.microsoft.com/office/drawing/2014/main" id="{A3115A26-4B03-5B41-AF59-4D3FE7BE98F0}"/>
+              </a:ext>
+            </a:extLst>
+          </p:cNvPr>
+          <p:cNvSpPr/>
+          <p:nvPr/>
+        </p:nvSpPr>
+        <p:spPr>
+          <a:xfrm>
+            <a:off x="6024340" y="2002027"/>
+            <a:ext cx="619676" cy="317395"/>
+          </a:xfrm>
+          <a:prstGeom prst="roundRect">
+            <a:avLst/>
+          </a:prstGeom>
+        </p:spPr>
+        <p:style>
+          <a:lnRef idx="2">
+            <a:schemeClr val="accent1">
+              <a:shade val="50000"/>
+            </a:schemeClr>
+          </a:lnRef>
+          <a:fillRef idx="1">
+            <a:schemeClr val="accent1"/>
+          </a:fillRef>
+          <a:effectRef idx="0">
+            <a:schemeClr val="accent1"/>
+          </a:effectRef>
+          <a:fontRef idx="minor">
+            <a:schemeClr val="lt1"/>
+          </a:fontRef>
+        </p:style>
+        <p:txBody>
+          <a:bodyPr rtlCol="0" anchor="ctr"/>
+          <a:lstStyle/>
+          <a:p>
+            <a:pPr algn="ctr"/>
+            <a:r>
+              <a:rPr kumimoji="1" lang="en-US" altLang="zh-CN" dirty="0"/>
+              <a:t>B</a:t>
+            </a:r>
+            <a:endParaRPr kumimoji="1" lang="zh-CN" altLang="en-US" dirty="0"/>
+          </a:p>
+        </p:txBody>
+      </p:sp>
+      <p:sp>
+        <p:nvSpPr>
+          <p:cNvPr id="45" name="圆角矩形 44">
+            <a:extLst>
+              <a:ext uri="{FF2B5EF4-FFF2-40B4-BE49-F238E27FC236}">
+                <a16:creationId xmlns:a16="http://schemas.microsoft.com/office/drawing/2014/main" id="{BFA753F8-2793-0C4D-B712-52DE6F8FDCD3}"/>
+              </a:ext>
+            </a:extLst>
+          </p:cNvPr>
+          <p:cNvSpPr/>
+          <p:nvPr/>
+        </p:nvSpPr>
+        <p:spPr>
+          <a:xfrm>
+            <a:off x="6742258" y="2002026"/>
+            <a:ext cx="619676" cy="317395"/>
+          </a:xfrm>
+          <a:prstGeom prst="roundRect">
+            <a:avLst/>
+          </a:prstGeom>
+          <a:solidFill>
+            <a:schemeClr val="bg1"/>
+          </a:solidFill>
+          <a:ln w="19050">
+            <a:solidFill>
+              <a:srgbClr val="C00000"/>
+            </a:solidFill>
+            <a:prstDash val="dash"/>
+          </a:ln>
+        </p:spPr>
+        <p:style>
+          <a:lnRef idx="2">
+            <a:schemeClr val="accent1">
+              <a:shade val="50000"/>
+            </a:schemeClr>
+          </a:lnRef>
+          <a:fillRef idx="1">
+            <a:schemeClr val="accent1"/>
+          </a:fillRef>
+          <a:effectRef idx="0">
+            <a:schemeClr val="accent1"/>
+          </a:effectRef>
+          <a:fontRef idx="minor">
+            <a:schemeClr val="lt1"/>
+          </a:fontRef>
+        </p:style>
+        <p:txBody>
+          <a:bodyPr rtlCol="0" anchor="ctr"/>
+          <a:lstStyle/>
+          <a:p>
+            <a:pPr algn="ctr"/>
+            <a:r>
+              <a:rPr kumimoji="1" lang="en-US" altLang="zh-CN" dirty="0">
+                <a:solidFill>
+                  <a:srgbClr val="E95429"/>
+                </a:solidFill>
+              </a:rPr>
+              <a:t>B</a:t>
+            </a:r>
+            <a:r>
+              <a:rPr kumimoji="1" lang="zh-CN" altLang="en-US" dirty="0">
+                <a:solidFill>
+                  <a:srgbClr val="E95429"/>
+                </a:solidFill>
+              </a:rPr>
+              <a:t>‘</a:t>
+            </a:r>
+          </a:p>
+        </p:txBody>
+      </p:sp>
+      <p:cxnSp>
+        <p:nvCxnSpPr>
+          <p:cNvPr id="46" name="直线箭头连接符 45">
+            <a:extLst>
+              <a:ext uri="{FF2B5EF4-FFF2-40B4-BE49-F238E27FC236}">
+                <a16:creationId xmlns:a16="http://schemas.microsoft.com/office/drawing/2014/main" id="{7BDF857F-7A16-E84C-ABB7-B3F1BCC2D753}"/>
+              </a:ext>
+            </a:extLst>
+          </p:cNvPr>
+          <p:cNvCxnSpPr>
+            <a:cxnSpLocks/>
+            <a:endCxn id="45" idx="0"/>
+          </p:cNvCxnSpPr>
+          <p:nvPr/>
+        </p:nvCxnSpPr>
+        <p:spPr>
+          <a:xfrm>
+            <a:off x="7052096" y="1412579"/>
+            <a:ext cx="0" cy="589447"/>
+          </a:xfrm>
+          <a:prstGeom prst="straightConnector1">
+            <a:avLst/>
+          </a:prstGeom>
+          <a:ln w="19050">
+            <a:solidFill>
+              <a:srgbClr val="E95429"/>
+            </a:solidFill>
+            <a:prstDash val="lgDash"/>
+            <a:tailEnd type="triangle"/>
+          </a:ln>
+        </p:spPr>
+        <p:style>
+          <a:lnRef idx="1">
+            <a:schemeClr val="accent1"/>
+          </a:lnRef>
+          <a:fillRef idx="0">
+            <a:schemeClr val="accent1"/>
+          </a:fillRef>
+          <a:effectRef idx="0">
+            <a:schemeClr val="accent1"/>
+          </a:effectRef>
+          <a:fontRef idx="minor">
+            <a:schemeClr val="tx1"/>
+          </a:fontRef>
+        </p:style>
+      </p:cxnSp>
+      <p:cxnSp>
+        <p:nvCxnSpPr>
+          <p:cNvPr id="47" name="直线箭头连接符 46">
+            <a:extLst>
+              <a:ext uri="{FF2B5EF4-FFF2-40B4-BE49-F238E27FC236}">
+                <a16:creationId xmlns:a16="http://schemas.microsoft.com/office/drawing/2014/main" id="{888E7042-D9D2-F34C-99D5-2F93959DCDD7}"/>
+              </a:ext>
+            </a:extLst>
+          </p:cNvPr>
+          <p:cNvCxnSpPr>
+            <a:cxnSpLocks/>
+            <a:endCxn id="44" idx="0"/>
+          </p:cNvCxnSpPr>
+          <p:nvPr/>
+        </p:nvCxnSpPr>
+        <p:spPr>
+          <a:xfrm>
+            <a:off x="6334178" y="1412579"/>
+            <a:ext cx="0" cy="589448"/>
+          </a:xfrm>
+          <a:prstGeom prst="straightConnector1">
+            <a:avLst/>
+          </a:prstGeom>
+          <a:ln>
+            <a:tailEnd type="triangle"/>
+          </a:ln>
+        </p:spPr>
+        <p:style>
+          <a:lnRef idx="1">
+            <a:schemeClr val="accent1"/>
+          </a:lnRef>
+          <a:fillRef idx="0">
+            <a:schemeClr val="accent1"/>
+          </a:fillRef>
+          <a:effectRef idx="0">
+            <a:schemeClr val="accent1"/>
+          </a:effectRef>
+          <a:fontRef idx="minor">
+            <a:schemeClr val="tx1"/>
+          </a:fontRef>
+        </p:style>
+      </p:cxnSp>
+      <p:sp>
+        <p:nvSpPr>
+          <p:cNvPr id="48" name="圆角矩形 47">
+            <a:extLst>
+              <a:ext uri="{FF2B5EF4-FFF2-40B4-BE49-F238E27FC236}">
+                <a16:creationId xmlns:a16="http://schemas.microsoft.com/office/drawing/2014/main" id="{7210C293-9C30-2243-B065-4173382BE21F}"/>
+              </a:ext>
+            </a:extLst>
+          </p:cNvPr>
+          <p:cNvSpPr/>
+          <p:nvPr/>
+        </p:nvSpPr>
+        <p:spPr>
+          <a:xfrm>
+            <a:off x="5170194" y="3271161"/>
+            <a:ext cx="619676" cy="317395"/>
+          </a:xfrm>
+          <a:prstGeom prst="roundRect">
+            <a:avLst/>
+          </a:prstGeom>
+        </p:spPr>
+        <p:style>
+          <a:lnRef idx="2">
+            <a:schemeClr val="accent1">
+              <a:shade val="50000"/>
+            </a:schemeClr>
+          </a:lnRef>
+          <a:fillRef idx="1">
+            <a:schemeClr val="accent1"/>
+          </a:fillRef>
+          <a:effectRef idx="0">
+            <a:schemeClr val="accent1"/>
+          </a:effectRef>
+          <a:fontRef idx="minor">
+            <a:schemeClr val="lt1"/>
+          </a:fontRef>
+        </p:style>
+        <p:txBody>
+          <a:bodyPr rtlCol="0" anchor="ctr"/>
+          <a:lstStyle/>
+          <a:p>
+            <a:pPr algn="ctr"/>
+            <a:r>
+              <a:rPr kumimoji="1" lang="en-US" altLang="zh-CN" dirty="0"/>
+              <a:t>Z</a:t>
+            </a:r>
+          </a:p>
+        </p:txBody>
+      </p:sp>
+      <p:sp>
+        <p:nvSpPr>
+          <p:cNvPr id="49" name="圆角矩形 48">
+            <a:extLst>
+              <a:ext uri="{FF2B5EF4-FFF2-40B4-BE49-F238E27FC236}">
+                <a16:creationId xmlns:a16="http://schemas.microsoft.com/office/drawing/2014/main" id="{CB95B973-C6F0-A047-AE4D-29D825C7EE1E}"/>
+              </a:ext>
+            </a:extLst>
+          </p:cNvPr>
+          <p:cNvSpPr/>
+          <p:nvPr/>
+        </p:nvSpPr>
+        <p:spPr>
+          <a:xfrm>
+            <a:off x="5888112" y="3271160"/>
+            <a:ext cx="619676" cy="317395"/>
+          </a:xfrm>
+          <a:prstGeom prst="roundRect">
+            <a:avLst/>
+          </a:prstGeom>
+          <a:solidFill>
+            <a:schemeClr val="bg1"/>
+          </a:solidFill>
+          <a:ln w="19050">
+            <a:solidFill>
+              <a:srgbClr val="E95429"/>
+            </a:solidFill>
+            <a:prstDash val="dash"/>
+          </a:ln>
+        </p:spPr>
+        <p:style>
+          <a:lnRef idx="2">
+            <a:schemeClr val="accent1">
+              <a:shade val="50000"/>
+            </a:schemeClr>
+          </a:lnRef>
+          <a:fillRef idx="1">
+            <a:schemeClr val="accent1"/>
+          </a:fillRef>
+          <a:effectRef idx="0">
+            <a:schemeClr val="accent1"/>
+          </a:effectRef>
+          <a:fontRef idx="minor">
+            <a:schemeClr val="lt1"/>
+          </a:fontRef>
+        </p:style>
+        <p:txBody>
+          <a:bodyPr rtlCol="0" anchor="ctr"/>
+          <a:lstStyle/>
+          <a:p>
+            <a:pPr algn="ctr"/>
+            <a:r>
+              <a:rPr kumimoji="1" lang="en-US" altLang="zh-CN" dirty="0">
+                <a:solidFill>
+                  <a:srgbClr val="E95429"/>
+                </a:solidFill>
+              </a:rPr>
+              <a:t>Z</a:t>
+            </a:r>
+            <a:r>
+              <a:rPr kumimoji="1" lang="zh-CN" altLang="en-US" dirty="0">
+                <a:solidFill>
+                  <a:srgbClr val="E95429"/>
+                </a:solidFill>
+              </a:rPr>
+              <a:t>‘</a:t>
+            </a:r>
+          </a:p>
+        </p:txBody>
+      </p:sp>
+      <p:cxnSp>
+        <p:nvCxnSpPr>
+          <p:cNvPr id="50" name="直线箭头连接符 49">
+            <a:extLst>
+              <a:ext uri="{FF2B5EF4-FFF2-40B4-BE49-F238E27FC236}">
+                <a16:creationId xmlns:a16="http://schemas.microsoft.com/office/drawing/2014/main" id="{5038389B-A33F-1B43-9F21-FD6BF1430EB6}"/>
+              </a:ext>
+            </a:extLst>
+          </p:cNvPr>
+          <p:cNvCxnSpPr>
+            <a:cxnSpLocks/>
+            <a:stCxn id="41" idx="2"/>
+            <a:endCxn id="48" idx="0"/>
+          </p:cNvCxnSpPr>
+          <p:nvPr/>
+        </p:nvCxnSpPr>
+        <p:spPr>
+          <a:xfrm>
+            <a:off x="5325114" y="2344566"/>
+            <a:ext cx="154918" cy="926595"/>
+          </a:xfrm>
+          <a:prstGeom prst="straightConnector1">
+            <a:avLst/>
+          </a:prstGeom>
+          <a:ln w="19050">
+            <a:solidFill>
+              <a:srgbClr val="00B050"/>
+            </a:solidFill>
+            <a:prstDash val="lgDash"/>
+            <a:tailEnd type="triangle"/>
+          </a:ln>
+        </p:spPr>
+        <p:style>
+          <a:lnRef idx="1">
+            <a:schemeClr val="accent1"/>
+          </a:lnRef>
+          <a:fillRef idx="0">
+            <a:schemeClr val="accent1"/>
+          </a:fillRef>
+          <a:effectRef idx="0">
+            <a:schemeClr val="accent1"/>
+          </a:effectRef>
+          <a:fontRef idx="minor">
+            <a:schemeClr val="tx1"/>
+          </a:fontRef>
+        </p:style>
+      </p:cxnSp>
+      <p:cxnSp>
+        <p:nvCxnSpPr>
+          <p:cNvPr id="51" name="直线箭头连接符 50">
+            <a:extLst>
+              <a:ext uri="{FF2B5EF4-FFF2-40B4-BE49-F238E27FC236}">
+                <a16:creationId xmlns:a16="http://schemas.microsoft.com/office/drawing/2014/main" id="{9B730FCC-BE36-3543-AFAC-4C93AE54F33B}"/>
+              </a:ext>
+            </a:extLst>
+          </p:cNvPr>
+          <p:cNvCxnSpPr>
+            <a:cxnSpLocks/>
+            <a:stCxn id="40" idx="2"/>
+            <a:endCxn id="48" idx="0"/>
+          </p:cNvCxnSpPr>
+          <p:nvPr/>
+        </p:nvCxnSpPr>
+        <p:spPr>
+          <a:xfrm>
+            <a:off x="4607196" y="2344567"/>
+            <a:ext cx="872836" cy="926594"/>
+          </a:xfrm>
+          <a:prstGeom prst="straightConnector1">
+            <a:avLst/>
+          </a:prstGeom>
+          <a:ln>
+            <a:tailEnd type="triangle"/>
+          </a:ln>
+        </p:spPr>
+        <p:style>
+          <a:lnRef idx="1">
+            <a:schemeClr val="accent1"/>
+          </a:lnRef>
+          <a:fillRef idx="0">
+            <a:schemeClr val="accent1"/>
+          </a:fillRef>
+          <a:effectRef idx="0">
+            <a:schemeClr val="accent1"/>
+          </a:effectRef>
+          <a:fontRef idx="minor">
+            <a:schemeClr val="tx1"/>
+          </a:fontRef>
+        </p:style>
+      </p:cxnSp>
+      <p:sp>
+        <p:nvSpPr>
+          <p:cNvPr id="52" name="文本框 51">
+            <a:extLst>
+              <a:ext uri="{FF2B5EF4-FFF2-40B4-BE49-F238E27FC236}">
+                <a16:creationId xmlns:a16="http://schemas.microsoft.com/office/drawing/2014/main" id="{F8588247-14FE-D94C-9B6D-3AA5DB8DFBF9}"/>
+              </a:ext>
+            </a:extLst>
+          </p:cNvPr>
+          <p:cNvSpPr txBox="1"/>
+          <p:nvPr/>
+        </p:nvSpPr>
+        <p:spPr>
+          <a:xfrm>
+            <a:off x="4969087" y="1160724"/>
+            <a:ext cx="712054" cy="276999"/>
+          </a:xfrm>
+          <a:prstGeom prst="rect">
+            <a:avLst/>
+          </a:prstGeom>
+          <a:noFill/>
+        </p:spPr>
+        <p:txBody>
+          <a:bodyPr wrap="none" rtlCol="0">
+            <a:spAutoFit/>
+          </a:bodyPr>
+          <a:lstStyle/>
+          <a:p>
+            <a:r>
+              <a:rPr kumimoji="1" lang="en-US" altLang="zh-CN" sz="1200" dirty="0">
+                <a:solidFill>
+                  <a:srgbClr val="00B050"/>
+                </a:solidFill>
+              </a:rPr>
+              <a:t>Android</a:t>
+            </a:r>
+            <a:endParaRPr kumimoji="1" lang="zh-CN" altLang="en-US" sz="1200" dirty="0">
+              <a:solidFill>
+                <a:srgbClr val="00B050"/>
+              </a:solidFill>
+            </a:endParaRPr>
+          </a:p>
+        </p:txBody>
+      </p:sp>
+      <p:sp>
+        <p:nvSpPr>
+          <p:cNvPr id="53" name="文本框 52">
+            <a:extLst>
+              <a:ext uri="{FF2B5EF4-FFF2-40B4-BE49-F238E27FC236}">
+                <a16:creationId xmlns:a16="http://schemas.microsoft.com/office/drawing/2014/main" id="{11565807-9382-424B-AA28-FB9E8AA43857}"/>
+              </a:ext>
+            </a:extLst>
+          </p:cNvPr>
+          <p:cNvSpPr txBox="1"/>
+          <p:nvPr/>
+        </p:nvSpPr>
+        <p:spPr>
+          <a:xfrm>
+            <a:off x="6696069" y="1110434"/>
+            <a:ext cx="660758" cy="276999"/>
+          </a:xfrm>
+          <a:prstGeom prst="rect">
+            <a:avLst/>
+          </a:prstGeom>
+          <a:noFill/>
+        </p:spPr>
+        <p:txBody>
+          <a:bodyPr wrap="none" rtlCol="0">
+            <a:spAutoFit/>
+          </a:bodyPr>
+          <a:lstStyle/>
+          <a:p>
+            <a:r>
+              <a:rPr kumimoji="1" lang="en-US" altLang="zh-CN" sz="1200" dirty="0">
+                <a:solidFill>
+                  <a:srgbClr val="E95429"/>
+                </a:solidFill>
+              </a:rPr>
+              <a:t>iPhone</a:t>
+            </a:r>
+            <a:endParaRPr kumimoji="1" lang="zh-CN" altLang="en-US" sz="1200" dirty="0">
+              <a:solidFill>
+                <a:srgbClr val="E95429"/>
+              </a:solidFill>
+            </a:endParaRPr>
+          </a:p>
+        </p:txBody>
+      </p:sp>
+      <p:cxnSp>
+        <p:nvCxnSpPr>
+          <p:cNvPr id="54" name="直线箭头连接符 53">
+            <a:extLst>
+              <a:ext uri="{FF2B5EF4-FFF2-40B4-BE49-F238E27FC236}">
+                <a16:creationId xmlns:a16="http://schemas.microsoft.com/office/drawing/2014/main" id="{9F037E15-02C1-A34B-8342-763F1FCBC112}"/>
+              </a:ext>
+            </a:extLst>
+          </p:cNvPr>
+          <p:cNvCxnSpPr>
+            <a:cxnSpLocks/>
+            <a:stCxn id="45" idx="2"/>
+            <a:endCxn id="49" idx="0"/>
+          </p:cNvCxnSpPr>
+          <p:nvPr/>
+        </p:nvCxnSpPr>
+        <p:spPr>
+          <a:xfrm flipH="1">
+            <a:off x="6197950" y="2319421"/>
+            <a:ext cx="854146" cy="951739"/>
+          </a:xfrm>
+          <a:prstGeom prst="straightConnector1">
+            <a:avLst/>
+          </a:prstGeom>
+          <a:ln w="19050">
+            <a:solidFill>
+              <a:srgbClr val="E95429"/>
+            </a:solidFill>
+            <a:prstDash val="lgDash"/>
+            <a:tailEnd type="triangle"/>
+          </a:ln>
+        </p:spPr>
+        <p:style>
+          <a:lnRef idx="1">
+            <a:schemeClr val="accent1"/>
+          </a:lnRef>
+          <a:fillRef idx="0">
+            <a:schemeClr val="accent1"/>
+          </a:fillRef>
+          <a:effectRef idx="0">
+            <a:schemeClr val="accent1"/>
+          </a:effectRef>
+          <a:fontRef idx="minor">
+            <a:schemeClr val="tx1"/>
+          </a:fontRef>
+        </p:style>
+      </p:cxnSp>
+      <p:cxnSp>
+        <p:nvCxnSpPr>
+          <p:cNvPr id="55" name="直线箭头连接符 54">
+            <a:extLst>
+              <a:ext uri="{FF2B5EF4-FFF2-40B4-BE49-F238E27FC236}">
+                <a16:creationId xmlns:a16="http://schemas.microsoft.com/office/drawing/2014/main" id="{CF7CB435-49C4-474C-BB21-AB62094CC0C6}"/>
+              </a:ext>
+            </a:extLst>
+          </p:cNvPr>
+          <p:cNvCxnSpPr>
+            <a:cxnSpLocks/>
+            <a:stCxn id="44" idx="2"/>
+            <a:endCxn id="48" idx="0"/>
+          </p:cNvCxnSpPr>
+          <p:nvPr/>
+        </p:nvCxnSpPr>
+        <p:spPr>
+          <a:xfrm flipH="1">
+            <a:off x="5480032" y="2319422"/>
+            <a:ext cx="854146" cy="951739"/>
+          </a:xfrm>
+          <a:prstGeom prst="straightConnector1">
+            <a:avLst/>
+          </a:prstGeom>
+          <a:ln>
+            <a:tailEnd type="triangle"/>
+          </a:ln>
+        </p:spPr>
+        <p:style>
+          <a:lnRef idx="1">
+            <a:schemeClr val="accent1"/>
+          </a:lnRef>
+          <a:fillRef idx="0">
+            <a:schemeClr val="accent1"/>
+          </a:fillRef>
+          <a:effectRef idx="0">
+            <a:schemeClr val="accent1"/>
+          </a:effectRef>
+          <a:fontRef idx="minor">
+            <a:schemeClr val="tx1"/>
+          </a:fontRef>
+        </p:style>
+      </p:cxnSp>
+      <p:sp>
+        <p:nvSpPr>
+          <p:cNvPr id="57" name="圆角矩形 56">
+            <a:extLst>
+              <a:ext uri="{FF2B5EF4-FFF2-40B4-BE49-F238E27FC236}">
+                <a16:creationId xmlns:a16="http://schemas.microsoft.com/office/drawing/2014/main" id="{99680CC9-F23D-5C49-AFAA-FD4203FC5DB5}"/>
+              </a:ext>
+            </a:extLst>
+          </p:cNvPr>
+          <p:cNvSpPr/>
+          <p:nvPr/>
+        </p:nvSpPr>
+        <p:spPr>
+          <a:xfrm>
+            <a:off x="8259750" y="2021502"/>
+            <a:ext cx="619676" cy="317395"/>
+          </a:xfrm>
+          <a:prstGeom prst="roundRect">
+            <a:avLst/>
+          </a:prstGeom>
+        </p:spPr>
+        <p:style>
+          <a:lnRef idx="2">
+            <a:schemeClr val="accent1">
+              <a:shade val="50000"/>
+            </a:schemeClr>
+          </a:lnRef>
+          <a:fillRef idx="1">
+            <a:schemeClr val="accent1"/>
+          </a:fillRef>
+          <a:effectRef idx="0">
+            <a:schemeClr val="accent1"/>
+          </a:effectRef>
+          <a:fontRef idx="minor">
+            <a:schemeClr val="lt1"/>
+          </a:fontRef>
+        </p:style>
+        <p:txBody>
+          <a:bodyPr rtlCol="0" anchor="ctr"/>
+          <a:lstStyle/>
+          <a:p>
+            <a:pPr algn="ctr"/>
+            <a:r>
+              <a:rPr kumimoji="1" lang="en-US" altLang="zh-CN" dirty="0"/>
+              <a:t>A</a:t>
+            </a:r>
+            <a:endParaRPr kumimoji="1" lang="zh-CN" altLang="en-US" dirty="0"/>
+          </a:p>
+        </p:txBody>
+      </p:sp>
+      <p:sp>
+        <p:nvSpPr>
+          <p:cNvPr id="58" name="圆角矩形 57">
+            <a:extLst>
+              <a:ext uri="{FF2B5EF4-FFF2-40B4-BE49-F238E27FC236}">
+                <a16:creationId xmlns:a16="http://schemas.microsoft.com/office/drawing/2014/main" id="{C43852FA-705D-154E-9DC1-29E027736838}"/>
+              </a:ext>
+            </a:extLst>
+          </p:cNvPr>
+          <p:cNvSpPr/>
+          <p:nvPr/>
+        </p:nvSpPr>
+        <p:spPr>
+          <a:xfrm>
+            <a:off x="8977668" y="2021501"/>
+            <a:ext cx="619676" cy="317395"/>
+          </a:xfrm>
+          <a:prstGeom prst="roundRect">
+            <a:avLst/>
+          </a:prstGeom>
+          <a:solidFill>
+            <a:schemeClr val="bg1"/>
+          </a:solidFill>
+          <a:ln w="19050">
+            <a:solidFill>
+              <a:srgbClr val="00B050"/>
+            </a:solidFill>
+            <a:prstDash val="dash"/>
+          </a:ln>
+        </p:spPr>
+        <p:style>
+          <a:lnRef idx="2">
+            <a:schemeClr val="accent1">
+              <a:shade val="50000"/>
+            </a:schemeClr>
+          </a:lnRef>
+          <a:fillRef idx="1">
+            <a:schemeClr val="accent1"/>
+          </a:fillRef>
+          <a:effectRef idx="0">
+            <a:schemeClr val="accent1"/>
+          </a:effectRef>
+          <a:fontRef idx="minor">
+            <a:schemeClr val="lt1"/>
+          </a:fontRef>
+        </p:style>
+        <p:txBody>
+          <a:bodyPr rtlCol="0" anchor="ctr"/>
+          <a:lstStyle/>
+          <a:p>
+            <a:pPr algn="ctr"/>
+            <a:r>
+              <a:rPr kumimoji="1" lang="en-US" altLang="zh-CN" dirty="0">
+                <a:solidFill>
+                  <a:srgbClr val="00B050"/>
+                </a:solidFill>
+              </a:rPr>
+              <a:t>A</a:t>
+            </a:r>
+            <a:r>
+              <a:rPr kumimoji="1" lang="zh-CN" altLang="en-US" dirty="0">
+                <a:solidFill>
+                  <a:srgbClr val="00B050"/>
+                </a:solidFill>
+              </a:rPr>
+              <a:t>‘</a:t>
+            </a:r>
+          </a:p>
+        </p:txBody>
+      </p:sp>
+      <p:cxnSp>
+        <p:nvCxnSpPr>
+          <p:cNvPr id="59" name="直线箭头连接符 58">
+            <a:extLst>
+              <a:ext uri="{FF2B5EF4-FFF2-40B4-BE49-F238E27FC236}">
+                <a16:creationId xmlns:a16="http://schemas.microsoft.com/office/drawing/2014/main" id="{A19A4447-FA84-864D-BB02-3937DD325F71}"/>
+              </a:ext>
+            </a:extLst>
+          </p:cNvPr>
+          <p:cNvCxnSpPr>
+            <a:cxnSpLocks/>
+            <a:endCxn id="58" idx="0"/>
+          </p:cNvCxnSpPr>
+          <p:nvPr/>
+        </p:nvCxnSpPr>
+        <p:spPr>
+          <a:xfrm>
+            <a:off x="9287506" y="1432054"/>
+            <a:ext cx="0" cy="589447"/>
+          </a:xfrm>
+          <a:prstGeom prst="straightConnector1">
+            <a:avLst/>
+          </a:prstGeom>
+          <a:ln w="19050">
+            <a:solidFill>
+              <a:srgbClr val="00B050"/>
+            </a:solidFill>
+            <a:prstDash val="lgDash"/>
+            <a:tailEnd type="triangle"/>
+          </a:ln>
+        </p:spPr>
+        <p:style>
+          <a:lnRef idx="1">
+            <a:schemeClr val="accent1"/>
+          </a:lnRef>
+          <a:fillRef idx="0">
+            <a:schemeClr val="accent1"/>
+          </a:fillRef>
+          <a:effectRef idx="0">
+            <a:schemeClr val="accent1"/>
+          </a:effectRef>
+          <a:fontRef idx="minor">
+            <a:schemeClr val="tx1"/>
+          </a:fontRef>
+        </p:style>
+      </p:cxnSp>
+      <p:cxnSp>
+        <p:nvCxnSpPr>
+          <p:cNvPr id="60" name="直线箭头连接符 59">
+            <a:extLst>
+              <a:ext uri="{FF2B5EF4-FFF2-40B4-BE49-F238E27FC236}">
+                <a16:creationId xmlns:a16="http://schemas.microsoft.com/office/drawing/2014/main" id="{41B117FE-E00A-6146-A05E-D22395AD03D0}"/>
+              </a:ext>
+            </a:extLst>
+          </p:cNvPr>
+          <p:cNvCxnSpPr>
+            <a:cxnSpLocks/>
+            <a:endCxn id="57" idx="0"/>
+          </p:cNvCxnSpPr>
+          <p:nvPr/>
+        </p:nvCxnSpPr>
+        <p:spPr>
+          <a:xfrm>
+            <a:off x="8569588" y="1432054"/>
+            <a:ext cx="0" cy="589448"/>
+          </a:xfrm>
+          <a:prstGeom prst="straightConnector1">
+            <a:avLst/>
+          </a:prstGeom>
+          <a:ln>
+            <a:tailEnd type="triangle"/>
+          </a:ln>
+        </p:spPr>
+        <p:style>
+          <a:lnRef idx="1">
+            <a:schemeClr val="accent1"/>
+          </a:lnRef>
+          <a:fillRef idx="0">
+            <a:schemeClr val="accent1"/>
+          </a:fillRef>
+          <a:effectRef idx="0">
+            <a:schemeClr val="accent1"/>
+          </a:effectRef>
+          <a:fontRef idx="minor">
+            <a:schemeClr val="tx1"/>
+          </a:fontRef>
+        </p:style>
+      </p:cxnSp>
+      <p:sp>
+        <p:nvSpPr>
+          <p:cNvPr id="61" name="圆角矩形 60">
+            <a:extLst>
+              <a:ext uri="{FF2B5EF4-FFF2-40B4-BE49-F238E27FC236}">
+                <a16:creationId xmlns:a16="http://schemas.microsoft.com/office/drawing/2014/main" id="{0F8E2F55-711E-D642-9FCD-7AC5F896242E}"/>
+              </a:ext>
+            </a:extLst>
+          </p:cNvPr>
+          <p:cNvSpPr/>
+          <p:nvPr/>
+        </p:nvSpPr>
+        <p:spPr>
+          <a:xfrm>
+            <a:off x="9999560" y="2021502"/>
+            <a:ext cx="619676" cy="317395"/>
+          </a:xfrm>
+          <a:prstGeom prst="roundRect">
+            <a:avLst/>
+          </a:prstGeom>
+        </p:spPr>
+        <p:style>
+          <a:lnRef idx="2">
+            <a:schemeClr val="accent1">
+              <a:shade val="50000"/>
+            </a:schemeClr>
+          </a:lnRef>
+          <a:fillRef idx="1">
+            <a:schemeClr val="accent1"/>
+          </a:fillRef>
+          <a:effectRef idx="0">
+            <a:schemeClr val="accent1"/>
+          </a:effectRef>
+          <a:fontRef idx="minor">
+            <a:schemeClr val="lt1"/>
+          </a:fontRef>
+        </p:style>
+        <p:txBody>
+          <a:bodyPr rtlCol="0" anchor="ctr"/>
+          <a:lstStyle/>
+          <a:p>
+            <a:pPr algn="ctr"/>
+            <a:r>
+              <a:rPr kumimoji="1" lang="en-US" altLang="zh-CN" dirty="0"/>
+              <a:t>B</a:t>
+            </a:r>
+            <a:endParaRPr kumimoji="1" lang="zh-CN" altLang="en-US" dirty="0"/>
+          </a:p>
+        </p:txBody>
+      </p:sp>
+      <p:sp>
+        <p:nvSpPr>
+          <p:cNvPr id="62" name="圆角矩形 61">
+            <a:extLst>
+              <a:ext uri="{FF2B5EF4-FFF2-40B4-BE49-F238E27FC236}">
+                <a16:creationId xmlns:a16="http://schemas.microsoft.com/office/drawing/2014/main" id="{DBEB0C93-9E58-DC49-9955-5D6CDAA0A10D}"/>
+              </a:ext>
+            </a:extLst>
+          </p:cNvPr>
+          <p:cNvSpPr/>
+          <p:nvPr/>
+        </p:nvSpPr>
+        <p:spPr>
+          <a:xfrm>
+            <a:off x="10717478" y="2021501"/>
+            <a:ext cx="619676" cy="317395"/>
+          </a:xfrm>
+          <a:prstGeom prst="roundRect">
+            <a:avLst/>
+          </a:prstGeom>
+          <a:solidFill>
+            <a:schemeClr val="bg1"/>
+          </a:solidFill>
+          <a:ln w="19050">
+            <a:solidFill>
+              <a:srgbClr val="C00000"/>
+            </a:solidFill>
+            <a:prstDash val="dash"/>
+          </a:ln>
+        </p:spPr>
+        <p:style>
+          <a:lnRef idx="2">
+            <a:schemeClr val="accent1">
+              <a:shade val="50000"/>
+            </a:schemeClr>
+          </a:lnRef>
+          <a:fillRef idx="1">
+            <a:schemeClr val="accent1"/>
+          </a:fillRef>
+          <a:effectRef idx="0">
+            <a:schemeClr val="accent1"/>
+          </a:effectRef>
+          <a:fontRef idx="minor">
+            <a:schemeClr val="lt1"/>
+          </a:fontRef>
+        </p:style>
+        <p:txBody>
+          <a:bodyPr rtlCol="0" anchor="ctr"/>
+          <a:lstStyle/>
+          <a:p>
+            <a:pPr algn="ctr"/>
+            <a:r>
+              <a:rPr kumimoji="1" lang="en-US" altLang="zh-CN" dirty="0">
+                <a:solidFill>
+                  <a:srgbClr val="E95429"/>
+                </a:solidFill>
+              </a:rPr>
+              <a:t>B</a:t>
+            </a:r>
+            <a:r>
+              <a:rPr kumimoji="1" lang="zh-CN" altLang="en-US" dirty="0">
+                <a:solidFill>
+                  <a:srgbClr val="E95429"/>
+                </a:solidFill>
+              </a:rPr>
+              <a:t>‘</a:t>
+            </a:r>
+          </a:p>
+        </p:txBody>
+      </p:sp>
+      <p:cxnSp>
+        <p:nvCxnSpPr>
+          <p:cNvPr id="63" name="直线箭头连接符 62">
+            <a:extLst>
+              <a:ext uri="{FF2B5EF4-FFF2-40B4-BE49-F238E27FC236}">
+                <a16:creationId xmlns:a16="http://schemas.microsoft.com/office/drawing/2014/main" id="{AA980589-3ED8-A148-AC82-5E93FA77FFB9}"/>
+              </a:ext>
+            </a:extLst>
+          </p:cNvPr>
+          <p:cNvCxnSpPr>
+            <a:cxnSpLocks/>
+            <a:endCxn id="62" idx="0"/>
+          </p:cNvCxnSpPr>
+          <p:nvPr/>
+        </p:nvCxnSpPr>
+        <p:spPr>
+          <a:xfrm>
+            <a:off x="11027316" y="1432054"/>
+            <a:ext cx="0" cy="589447"/>
+          </a:xfrm>
+          <a:prstGeom prst="straightConnector1">
+            <a:avLst/>
+          </a:prstGeom>
+          <a:ln w="19050">
+            <a:solidFill>
+              <a:srgbClr val="E95429"/>
+            </a:solidFill>
+            <a:prstDash val="lgDash"/>
+            <a:tailEnd type="triangle"/>
+          </a:ln>
+        </p:spPr>
+        <p:style>
+          <a:lnRef idx="1">
+            <a:schemeClr val="accent1"/>
+          </a:lnRef>
+          <a:fillRef idx="0">
+            <a:schemeClr val="accent1"/>
+          </a:fillRef>
+          <a:effectRef idx="0">
+            <a:schemeClr val="accent1"/>
+          </a:effectRef>
+          <a:fontRef idx="minor">
+            <a:schemeClr val="tx1"/>
+          </a:fontRef>
+        </p:style>
+      </p:cxnSp>
+      <p:cxnSp>
+        <p:nvCxnSpPr>
+          <p:cNvPr id="64" name="直线箭头连接符 63">
+            <a:extLst>
+              <a:ext uri="{FF2B5EF4-FFF2-40B4-BE49-F238E27FC236}">
+                <a16:creationId xmlns:a16="http://schemas.microsoft.com/office/drawing/2014/main" id="{6EF7377E-15F7-E545-B9B2-BD0ADA73EF9B}"/>
+              </a:ext>
+            </a:extLst>
+          </p:cNvPr>
+          <p:cNvCxnSpPr>
+            <a:cxnSpLocks/>
+            <a:endCxn id="61" idx="0"/>
+          </p:cNvCxnSpPr>
+          <p:nvPr/>
+        </p:nvCxnSpPr>
+        <p:spPr>
+          <a:xfrm>
+            <a:off x="10309398" y="1432054"/>
+            <a:ext cx="0" cy="589448"/>
+          </a:xfrm>
+          <a:prstGeom prst="straightConnector1">
+            <a:avLst/>
+          </a:prstGeom>
+          <a:ln>
+            <a:tailEnd type="triangle"/>
+          </a:ln>
+        </p:spPr>
+        <p:style>
+          <a:lnRef idx="1">
+            <a:schemeClr val="accent1"/>
+          </a:lnRef>
+          <a:fillRef idx="0">
+            <a:schemeClr val="accent1"/>
+          </a:fillRef>
+          <a:effectRef idx="0">
+            <a:schemeClr val="accent1"/>
+          </a:effectRef>
+          <a:fontRef idx="minor">
+            <a:schemeClr val="tx1"/>
+          </a:fontRef>
+        </p:style>
+      </p:cxnSp>
+      <p:sp>
+        <p:nvSpPr>
+          <p:cNvPr id="65" name="圆角矩形 64">
+            <a:extLst>
+              <a:ext uri="{FF2B5EF4-FFF2-40B4-BE49-F238E27FC236}">
+                <a16:creationId xmlns:a16="http://schemas.microsoft.com/office/drawing/2014/main" id="{B7441779-D4CC-5743-8D40-277C0BD7DF38}"/>
+              </a:ext>
+            </a:extLst>
+          </p:cNvPr>
+          <p:cNvSpPr/>
+          <p:nvPr/>
+        </p:nvSpPr>
+        <p:spPr>
+          <a:xfrm>
+            <a:off x="9020430" y="3270303"/>
+            <a:ext cx="619676" cy="317395"/>
+          </a:xfrm>
+          <a:prstGeom prst="roundRect">
+            <a:avLst/>
+          </a:prstGeom>
+        </p:spPr>
+        <p:style>
+          <a:lnRef idx="2">
+            <a:schemeClr val="accent1">
+              <a:shade val="50000"/>
+            </a:schemeClr>
+          </a:lnRef>
+          <a:fillRef idx="1">
+            <a:schemeClr val="accent1"/>
+          </a:fillRef>
+          <a:effectRef idx="0">
+            <a:schemeClr val="accent1"/>
+          </a:effectRef>
+          <a:fontRef idx="minor">
+            <a:schemeClr val="lt1"/>
+          </a:fontRef>
+        </p:style>
+        <p:txBody>
+          <a:bodyPr rtlCol="0" anchor="ctr"/>
+          <a:lstStyle/>
+          <a:p>
+            <a:pPr algn="ctr"/>
+            <a:r>
+              <a:rPr kumimoji="1" lang="en-US" altLang="zh-CN" dirty="0"/>
+              <a:t>Z</a:t>
+            </a:r>
+          </a:p>
+        </p:txBody>
+      </p:sp>
+      <p:sp>
+        <p:nvSpPr>
+          <p:cNvPr id="66" name="圆角矩形 65">
+            <a:extLst>
+              <a:ext uri="{FF2B5EF4-FFF2-40B4-BE49-F238E27FC236}">
+                <a16:creationId xmlns:a16="http://schemas.microsoft.com/office/drawing/2014/main" id="{D0E9E1F6-ABC6-6745-A366-2C5DD74BD3A4}"/>
+              </a:ext>
+            </a:extLst>
+          </p:cNvPr>
+          <p:cNvSpPr/>
+          <p:nvPr/>
+        </p:nvSpPr>
+        <p:spPr>
+          <a:xfrm>
+            <a:off x="9738348" y="3270302"/>
+            <a:ext cx="619676" cy="317395"/>
+          </a:xfrm>
+          <a:prstGeom prst="roundRect">
+            <a:avLst/>
+          </a:prstGeom>
+          <a:solidFill>
+            <a:schemeClr val="bg1"/>
+          </a:solidFill>
+          <a:ln w="19050">
+            <a:solidFill>
+              <a:srgbClr val="00B050"/>
+            </a:solidFill>
+            <a:prstDash val="dash"/>
+          </a:ln>
+        </p:spPr>
+        <p:style>
+          <a:lnRef idx="2">
+            <a:schemeClr val="accent1">
+              <a:shade val="50000"/>
+            </a:schemeClr>
+          </a:lnRef>
+          <a:fillRef idx="1">
+            <a:schemeClr val="accent1"/>
+          </a:fillRef>
+          <a:effectRef idx="0">
+            <a:schemeClr val="accent1"/>
+          </a:effectRef>
+          <a:fontRef idx="minor">
+            <a:schemeClr val="lt1"/>
+          </a:fontRef>
+        </p:style>
+        <p:txBody>
+          <a:bodyPr rtlCol="0" anchor="ctr"/>
+          <a:lstStyle/>
+          <a:p>
+            <a:pPr algn="ctr"/>
+            <a:r>
+              <a:rPr kumimoji="1" lang="en-US" altLang="zh-CN" dirty="0">
+                <a:solidFill>
+                  <a:srgbClr val="00B050"/>
+                </a:solidFill>
+              </a:rPr>
+              <a:t>Z</a:t>
+            </a:r>
+            <a:r>
+              <a:rPr kumimoji="1" lang="zh-CN" altLang="en-US" dirty="0">
+                <a:solidFill>
+                  <a:srgbClr val="00B050"/>
+                </a:solidFill>
+              </a:rPr>
+              <a:t>‘</a:t>
+            </a:r>
+          </a:p>
+        </p:txBody>
+      </p:sp>
+      <p:cxnSp>
+        <p:nvCxnSpPr>
+          <p:cNvPr id="67" name="直线箭头连接符 66">
+            <a:extLst>
+              <a:ext uri="{FF2B5EF4-FFF2-40B4-BE49-F238E27FC236}">
+                <a16:creationId xmlns:a16="http://schemas.microsoft.com/office/drawing/2014/main" id="{C5312886-0EFE-B848-BC5A-C74AEB6129D0}"/>
+              </a:ext>
+            </a:extLst>
+          </p:cNvPr>
+          <p:cNvCxnSpPr>
+            <a:cxnSpLocks/>
+            <a:stCxn id="58" idx="2"/>
+            <a:endCxn id="66" idx="0"/>
+          </p:cNvCxnSpPr>
+          <p:nvPr/>
+        </p:nvCxnSpPr>
+        <p:spPr>
+          <a:xfrm>
+            <a:off x="9287506" y="2338896"/>
+            <a:ext cx="760680" cy="931406"/>
+          </a:xfrm>
+          <a:prstGeom prst="straightConnector1">
+            <a:avLst/>
+          </a:prstGeom>
+          <a:ln w="19050">
+            <a:solidFill>
+              <a:srgbClr val="00B050"/>
+            </a:solidFill>
+            <a:prstDash val="lgDash"/>
+            <a:tailEnd type="triangle"/>
+          </a:ln>
+        </p:spPr>
+        <p:style>
+          <a:lnRef idx="1">
+            <a:schemeClr val="accent1"/>
+          </a:lnRef>
+          <a:fillRef idx="0">
+            <a:schemeClr val="accent1"/>
+          </a:fillRef>
+          <a:effectRef idx="0">
+            <a:schemeClr val="accent1"/>
+          </a:effectRef>
+          <a:fontRef idx="minor">
+            <a:schemeClr val="tx1"/>
+          </a:fontRef>
+        </p:style>
+      </p:cxnSp>
+      <p:cxnSp>
+        <p:nvCxnSpPr>
+          <p:cNvPr id="68" name="直线箭头连接符 67">
+            <a:extLst>
+              <a:ext uri="{FF2B5EF4-FFF2-40B4-BE49-F238E27FC236}">
+                <a16:creationId xmlns:a16="http://schemas.microsoft.com/office/drawing/2014/main" id="{CABBE1B4-6CD9-C245-861A-ABDF668D48A0}"/>
+              </a:ext>
+            </a:extLst>
+          </p:cNvPr>
+          <p:cNvCxnSpPr>
+            <a:cxnSpLocks/>
+            <a:stCxn id="57" idx="2"/>
+            <a:endCxn id="65" idx="0"/>
+          </p:cNvCxnSpPr>
+          <p:nvPr/>
+        </p:nvCxnSpPr>
+        <p:spPr>
+          <a:xfrm>
+            <a:off x="8569588" y="2338897"/>
+            <a:ext cx="760680" cy="931406"/>
+          </a:xfrm>
+          <a:prstGeom prst="straightConnector1">
+            <a:avLst/>
+          </a:prstGeom>
+          <a:ln>
+            <a:tailEnd type="triangle"/>
+          </a:ln>
+        </p:spPr>
+        <p:style>
+          <a:lnRef idx="1">
+            <a:schemeClr val="accent1"/>
+          </a:lnRef>
+          <a:fillRef idx="0">
+            <a:schemeClr val="accent1"/>
+          </a:fillRef>
+          <a:effectRef idx="0">
+            <a:schemeClr val="accent1"/>
+          </a:effectRef>
+          <a:fontRef idx="minor">
+            <a:schemeClr val="tx1"/>
+          </a:fontRef>
+        </p:style>
+      </p:cxnSp>
+      <p:sp>
+        <p:nvSpPr>
+          <p:cNvPr id="69" name="文本框 68">
+            <a:extLst>
+              <a:ext uri="{FF2B5EF4-FFF2-40B4-BE49-F238E27FC236}">
+                <a16:creationId xmlns:a16="http://schemas.microsoft.com/office/drawing/2014/main" id="{9D63338E-7174-F44E-8BED-417FA012E31C}"/>
+              </a:ext>
+            </a:extLst>
+          </p:cNvPr>
+          <p:cNvSpPr txBox="1"/>
+          <p:nvPr/>
+        </p:nvSpPr>
+        <p:spPr>
+          <a:xfrm>
+            <a:off x="8931479" y="1155054"/>
+            <a:ext cx="712054" cy="276999"/>
+          </a:xfrm>
+          <a:prstGeom prst="rect">
+            <a:avLst/>
+          </a:prstGeom>
+          <a:noFill/>
+        </p:spPr>
+        <p:txBody>
+          <a:bodyPr wrap="none" rtlCol="0">
+            <a:spAutoFit/>
+          </a:bodyPr>
+          <a:lstStyle/>
+          <a:p>
+            <a:r>
+              <a:rPr kumimoji="1" lang="en-US" altLang="zh-CN" sz="1200" dirty="0">
+                <a:solidFill>
+                  <a:srgbClr val="00B050"/>
+                </a:solidFill>
+              </a:rPr>
+              <a:t>Android</a:t>
+            </a:r>
+            <a:endParaRPr kumimoji="1" lang="zh-CN" altLang="en-US" sz="1200" dirty="0">
+              <a:solidFill>
+                <a:srgbClr val="00B050"/>
+              </a:solidFill>
+            </a:endParaRPr>
+          </a:p>
+        </p:txBody>
+      </p:sp>
+      <p:sp>
+        <p:nvSpPr>
+          <p:cNvPr id="70" name="文本框 69">
+            <a:extLst>
+              <a:ext uri="{FF2B5EF4-FFF2-40B4-BE49-F238E27FC236}">
+                <a16:creationId xmlns:a16="http://schemas.microsoft.com/office/drawing/2014/main" id="{60CD46F9-F505-3D49-B9E4-8B6F62D496B9}"/>
+              </a:ext>
+            </a:extLst>
+          </p:cNvPr>
+          <p:cNvSpPr txBox="1"/>
+          <p:nvPr/>
+        </p:nvSpPr>
+        <p:spPr>
+          <a:xfrm>
+            <a:off x="10671289" y="1129909"/>
+            <a:ext cx="660758" cy="276999"/>
+          </a:xfrm>
+          <a:prstGeom prst="rect">
+            <a:avLst/>
+          </a:prstGeom>
+          <a:noFill/>
+        </p:spPr>
+        <p:txBody>
+          <a:bodyPr wrap="none" rtlCol="0">
+            <a:spAutoFit/>
+          </a:bodyPr>
+          <a:lstStyle/>
+          <a:p>
+            <a:r>
+              <a:rPr kumimoji="1" lang="en-US" altLang="zh-CN" sz="1200" dirty="0">
+                <a:solidFill>
+                  <a:srgbClr val="E95429"/>
+                </a:solidFill>
+              </a:rPr>
+              <a:t>iPhone</a:t>
+            </a:r>
+            <a:endParaRPr kumimoji="1" lang="zh-CN" altLang="en-US" sz="1200" dirty="0">
+              <a:solidFill>
+                <a:srgbClr val="E95429"/>
+              </a:solidFill>
+            </a:endParaRPr>
+          </a:p>
+        </p:txBody>
+      </p:sp>
+      <p:cxnSp>
+        <p:nvCxnSpPr>
+          <p:cNvPr id="71" name="直线箭头连接符 70">
+            <a:extLst>
+              <a:ext uri="{FF2B5EF4-FFF2-40B4-BE49-F238E27FC236}">
+                <a16:creationId xmlns:a16="http://schemas.microsoft.com/office/drawing/2014/main" id="{F4064746-A0B2-9E43-BD26-5EE796E0DF05}"/>
+              </a:ext>
+            </a:extLst>
+          </p:cNvPr>
+          <p:cNvCxnSpPr>
+            <a:cxnSpLocks/>
+            <a:stCxn id="62" idx="2"/>
+            <a:endCxn id="73" idx="0"/>
+          </p:cNvCxnSpPr>
+          <p:nvPr/>
+        </p:nvCxnSpPr>
+        <p:spPr>
+          <a:xfrm flipH="1">
+            <a:off x="10766104" y="2338896"/>
+            <a:ext cx="261212" cy="931406"/>
+          </a:xfrm>
+          <a:prstGeom prst="straightConnector1">
+            <a:avLst/>
+          </a:prstGeom>
+          <a:ln w="19050">
+            <a:solidFill>
+              <a:srgbClr val="E95429"/>
+            </a:solidFill>
+            <a:prstDash val="lgDash"/>
+            <a:tailEnd type="triangle"/>
+          </a:ln>
+        </p:spPr>
+        <p:style>
+          <a:lnRef idx="1">
+            <a:schemeClr val="accent1"/>
+          </a:lnRef>
+          <a:fillRef idx="0">
+            <a:schemeClr val="accent1"/>
+          </a:fillRef>
+          <a:effectRef idx="0">
+            <a:schemeClr val="accent1"/>
+          </a:effectRef>
+          <a:fontRef idx="minor">
+            <a:schemeClr val="tx1"/>
+          </a:fontRef>
+        </p:style>
+      </p:cxnSp>
+      <p:cxnSp>
+        <p:nvCxnSpPr>
+          <p:cNvPr id="72" name="直线箭头连接符 71">
+            <a:extLst>
+              <a:ext uri="{FF2B5EF4-FFF2-40B4-BE49-F238E27FC236}">
+                <a16:creationId xmlns:a16="http://schemas.microsoft.com/office/drawing/2014/main" id="{2420B47B-3C43-F641-AF6E-D87D26EC008B}"/>
+              </a:ext>
+            </a:extLst>
+          </p:cNvPr>
+          <p:cNvCxnSpPr>
+            <a:cxnSpLocks/>
+            <a:stCxn id="61" idx="2"/>
+            <a:endCxn id="65" idx="0"/>
+          </p:cNvCxnSpPr>
+          <p:nvPr/>
+        </p:nvCxnSpPr>
+        <p:spPr>
+          <a:xfrm flipH="1">
+            <a:off x="9330268" y="2338897"/>
+            <a:ext cx="979130" cy="931406"/>
+          </a:xfrm>
+          <a:prstGeom prst="straightConnector1">
+            <a:avLst/>
+          </a:prstGeom>
+          <a:ln>
+            <a:tailEnd type="triangle"/>
+          </a:ln>
+        </p:spPr>
+        <p:style>
+          <a:lnRef idx="1">
+            <a:schemeClr val="accent1"/>
+          </a:lnRef>
+          <a:fillRef idx="0">
+            <a:schemeClr val="accent1"/>
+          </a:fillRef>
+          <a:effectRef idx="0">
+            <a:schemeClr val="accent1"/>
+          </a:effectRef>
+          <a:fontRef idx="minor">
+            <a:schemeClr val="tx1"/>
+          </a:fontRef>
+        </p:style>
+      </p:cxnSp>
+      <p:sp>
+        <p:nvSpPr>
+          <p:cNvPr id="73" name="圆角矩形 72">
+            <a:extLst>
+              <a:ext uri="{FF2B5EF4-FFF2-40B4-BE49-F238E27FC236}">
+                <a16:creationId xmlns:a16="http://schemas.microsoft.com/office/drawing/2014/main" id="{F89CF641-06AE-9E4C-B1B6-73F023F60DF0}"/>
+              </a:ext>
+            </a:extLst>
+          </p:cNvPr>
+          <p:cNvSpPr/>
+          <p:nvPr/>
+        </p:nvSpPr>
+        <p:spPr>
+          <a:xfrm>
+            <a:off x="10456266" y="3270302"/>
+            <a:ext cx="619676" cy="317395"/>
+          </a:xfrm>
+          <a:prstGeom prst="roundRect">
+            <a:avLst/>
+          </a:prstGeom>
+          <a:solidFill>
+            <a:schemeClr val="bg1"/>
+          </a:solidFill>
+          <a:ln w="19050">
+            <a:solidFill>
+              <a:srgbClr val="E95429"/>
+            </a:solidFill>
+            <a:prstDash val="dash"/>
+          </a:ln>
+        </p:spPr>
+        <p:style>
+          <a:lnRef idx="2">
+            <a:schemeClr val="accent1">
+              <a:shade val="50000"/>
+            </a:schemeClr>
+          </a:lnRef>
+          <a:fillRef idx="1">
+            <a:schemeClr val="accent1"/>
+          </a:fillRef>
+          <a:effectRef idx="0">
+            <a:schemeClr val="accent1"/>
+          </a:effectRef>
+          <a:fontRef idx="minor">
+            <a:schemeClr val="lt1"/>
+          </a:fontRef>
+        </p:style>
+        <p:txBody>
+          <a:bodyPr rtlCol="0" anchor="ctr"/>
+          <a:lstStyle/>
+          <a:p>
+            <a:pPr algn="ctr"/>
+            <a:r>
+              <a:rPr kumimoji="1" lang="en-US" altLang="zh-CN" dirty="0">
+                <a:solidFill>
+                  <a:srgbClr val="E95429"/>
+                </a:solidFill>
+              </a:rPr>
+              <a:t>Z</a:t>
+            </a:r>
+            <a:r>
+              <a:rPr kumimoji="1" lang="zh-CN" altLang="en-US" dirty="0">
+                <a:solidFill>
+                  <a:srgbClr val="E95429"/>
+                </a:solidFill>
+              </a:rPr>
+              <a:t>‘‘</a:t>
+            </a:r>
+          </a:p>
+        </p:txBody>
+      </p:sp>
+      <p:grpSp>
+        <p:nvGrpSpPr>
+          <p:cNvPr id="96" name="组合 95">
+            <a:extLst>
+              <a:ext uri="{FF2B5EF4-FFF2-40B4-BE49-F238E27FC236}">
+                <a16:creationId xmlns:a16="http://schemas.microsoft.com/office/drawing/2014/main" id="{CEE05655-FECF-3347-AA7D-D69E8F233A3D}"/>
+              </a:ext>
+            </a:extLst>
+          </p:cNvPr>
+          <p:cNvGrpSpPr/>
+          <p:nvPr/>
+        </p:nvGrpSpPr>
+        <p:grpSpPr>
+          <a:xfrm>
+            <a:off x="2026531" y="3244416"/>
+            <a:ext cx="622216" cy="318135"/>
+            <a:chOff x="1947122" y="4060390"/>
+            <a:chExt cx="622216" cy="318135"/>
+          </a:xfrm>
+        </p:grpSpPr>
+        <p:sp>
+          <p:nvSpPr>
+            <p:cNvPr id="94" name="任意形状 93">
+              <a:extLst>
+                <a:ext uri="{FF2B5EF4-FFF2-40B4-BE49-F238E27FC236}">
+                  <a16:creationId xmlns:a16="http://schemas.microsoft.com/office/drawing/2014/main" id="{D5A99B74-9C40-6240-B139-586D9C0E1ECE}"/>
+                </a:ext>
+              </a:extLst>
+            </p:cNvPr>
+            <p:cNvSpPr/>
+            <p:nvPr/>
+          </p:nvSpPr>
+          <p:spPr>
+            <a:xfrm>
+              <a:off x="1947122" y="4060390"/>
+              <a:ext cx="309838" cy="318135"/>
+            </a:xfrm>
+            <a:custGeom>
+              <a:avLst/>
+              <a:gdLst>
+                <a:gd name="connsiteX0" fmla="*/ 52900 w 309838"/>
+                <a:gd name="connsiteY0" fmla="*/ 0 h 317395"/>
+                <a:gd name="connsiteX1" fmla="*/ 309838 w 309838"/>
+                <a:gd name="connsiteY1" fmla="*/ 0 h 317395"/>
+                <a:gd name="connsiteX2" fmla="*/ 309838 w 309838"/>
+                <a:gd name="connsiteY2" fmla="*/ 317395 h 317395"/>
+                <a:gd name="connsiteX3" fmla="*/ 52900 w 309838"/>
+                <a:gd name="connsiteY3" fmla="*/ 317395 h 317395"/>
+                <a:gd name="connsiteX4" fmla="*/ 0 w 309838"/>
+                <a:gd name="connsiteY4" fmla="*/ 264495 h 317395"/>
+                <a:gd name="connsiteX5" fmla="*/ 0 w 309838"/>
+                <a:gd name="connsiteY5" fmla="*/ 52900 h 317395"/>
+                <a:gd name="connsiteX6" fmla="*/ 52900 w 309838"/>
+                <a:gd name="connsiteY6" fmla="*/ 0 h 317395"/>
+                <a:gd name="connsiteX0" fmla="*/ 309838 w 401278"/>
+                <a:gd name="connsiteY0" fmla="*/ 317395 h 408835"/>
+                <a:gd name="connsiteX1" fmla="*/ 52900 w 401278"/>
+                <a:gd name="connsiteY1" fmla="*/ 317395 h 408835"/>
+                <a:gd name="connsiteX2" fmla="*/ 0 w 401278"/>
+                <a:gd name="connsiteY2" fmla="*/ 264495 h 408835"/>
+                <a:gd name="connsiteX3" fmla="*/ 0 w 401278"/>
+                <a:gd name="connsiteY3" fmla="*/ 52900 h 408835"/>
+                <a:gd name="connsiteX4" fmla="*/ 52900 w 401278"/>
+                <a:gd name="connsiteY4" fmla="*/ 0 h 408835"/>
+                <a:gd name="connsiteX5" fmla="*/ 309838 w 401278"/>
+                <a:gd name="connsiteY5" fmla="*/ 0 h 408835"/>
+                <a:gd name="connsiteX6" fmla="*/ 401278 w 401278"/>
+                <a:gd name="connsiteY6" fmla="*/ 408835 h 408835"/>
+                <a:gd name="connsiteX0" fmla="*/ 309838 w 401278"/>
+                <a:gd name="connsiteY0" fmla="*/ 317395 h 408835"/>
+                <a:gd name="connsiteX1" fmla="*/ 52900 w 401278"/>
+                <a:gd name="connsiteY1" fmla="*/ 317395 h 408835"/>
+                <a:gd name="connsiteX2" fmla="*/ 0 w 401278"/>
+                <a:gd name="connsiteY2" fmla="*/ 264495 h 408835"/>
+                <a:gd name="connsiteX3" fmla="*/ 0 w 401278"/>
+                <a:gd name="connsiteY3" fmla="*/ 52900 h 408835"/>
+                <a:gd name="connsiteX4" fmla="*/ 52900 w 401278"/>
+                <a:gd name="connsiteY4" fmla="*/ 0 h 408835"/>
+                <a:gd name="connsiteX5" fmla="*/ 309838 w 401278"/>
+                <a:gd name="connsiteY5" fmla="*/ 0 h 408835"/>
+                <a:gd name="connsiteX6" fmla="*/ 401278 w 401278"/>
+                <a:gd name="connsiteY6" fmla="*/ 408835 h 408835"/>
+                <a:gd name="connsiteX0" fmla="*/ 309838 w 309838"/>
+                <a:gd name="connsiteY0" fmla="*/ 317395 h 317395"/>
+                <a:gd name="connsiteX1" fmla="*/ 52900 w 309838"/>
+                <a:gd name="connsiteY1" fmla="*/ 317395 h 317395"/>
+                <a:gd name="connsiteX2" fmla="*/ 0 w 309838"/>
+                <a:gd name="connsiteY2" fmla="*/ 264495 h 317395"/>
+                <a:gd name="connsiteX3" fmla="*/ 0 w 309838"/>
+                <a:gd name="connsiteY3" fmla="*/ 52900 h 317395"/>
+                <a:gd name="connsiteX4" fmla="*/ 52900 w 309838"/>
+                <a:gd name="connsiteY4" fmla="*/ 0 h 317395"/>
+                <a:gd name="connsiteX5" fmla="*/ 309838 w 309838"/>
+                <a:gd name="connsiteY5" fmla="*/ 0 h 317395"/>
+                <a:gd name="connsiteX6" fmla="*/ 309203 w 309838"/>
+                <a:gd name="connsiteY6" fmla="*/ 2435 h 317395"/>
+                <a:gd name="connsiteX0" fmla="*/ 309838 w 321903"/>
+                <a:gd name="connsiteY0" fmla="*/ 317395 h 317395"/>
+                <a:gd name="connsiteX1" fmla="*/ 52900 w 321903"/>
+                <a:gd name="connsiteY1" fmla="*/ 317395 h 317395"/>
+                <a:gd name="connsiteX2" fmla="*/ 0 w 321903"/>
+                <a:gd name="connsiteY2" fmla="*/ 264495 h 317395"/>
+                <a:gd name="connsiteX3" fmla="*/ 0 w 321903"/>
+                <a:gd name="connsiteY3" fmla="*/ 52900 h 317395"/>
+                <a:gd name="connsiteX4" fmla="*/ 52900 w 321903"/>
+                <a:gd name="connsiteY4" fmla="*/ 0 h 317395"/>
+                <a:gd name="connsiteX5" fmla="*/ 309838 w 321903"/>
+                <a:gd name="connsiteY5" fmla="*/ 0 h 317395"/>
+                <a:gd name="connsiteX6" fmla="*/ 321903 w 321903"/>
+                <a:gd name="connsiteY6" fmla="*/ 129435 h 317395"/>
+                <a:gd name="connsiteX0" fmla="*/ 309838 w 321903"/>
+                <a:gd name="connsiteY0" fmla="*/ 317395 h 317395"/>
+                <a:gd name="connsiteX1" fmla="*/ 52900 w 321903"/>
+                <a:gd name="connsiteY1" fmla="*/ 317395 h 317395"/>
+                <a:gd name="connsiteX2" fmla="*/ 0 w 321903"/>
+                <a:gd name="connsiteY2" fmla="*/ 264495 h 317395"/>
+                <a:gd name="connsiteX3" fmla="*/ 0 w 321903"/>
+                <a:gd name="connsiteY3" fmla="*/ 52900 h 317395"/>
+                <a:gd name="connsiteX4" fmla="*/ 52900 w 321903"/>
+                <a:gd name="connsiteY4" fmla="*/ 0 h 317395"/>
+                <a:gd name="connsiteX5" fmla="*/ 309838 w 321903"/>
+                <a:gd name="connsiteY5" fmla="*/ 0 h 317395"/>
+                <a:gd name="connsiteX6" fmla="*/ 321903 w 321903"/>
+                <a:gd name="connsiteY6" fmla="*/ 129435 h 317395"/>
+                <a:gd name="connsiteX0" fmla="*/ 309838 w 309838"/>
+                <a:gd name="connsiteY0" fmla="*/ 318135 h 318135"/>
+                <a:gd name="connsiteX1" fmla="*/ 52900 w 309838"/>
+                <a:gd name="connsiteY1" fmla="*/ 318135 h 318135"/>
+                <a:gd name="connsiteX2" fmla="*/ 0 w 309838"/>
+                <a:gd name="connsiteY2" fmla="*/ 265235 h 318135"/>
+                <a:gd name="connsiteX3" fmla="*/ 0 w 309838"/>
+                <a:gd name="connsiteY3" fmla="*/ 53640 h 318135"/>
+                <a:gd name="connsiteX4" fmla="*/ 52900 w 309838"/>
+                <a:gd name="connsiteY4" fmla="*/ 740 h 318135"/>
+                <a:gd name="connsiteX5" fmla="*/ 309838 w 309838"/>
+                <a:gd name="connsiteY5" fmla="*/ 740 h 318135"/>
+                <a:gd name="connsiteX6" fmla="*/ 302853 w 309838"/>
+                <a:gd name="connsiteY6" fmla="*/ 0 h 318135"/>
+              </a:gdLst>
+              <a:ahLst/>
+              <a:cxnLst>
+                <a:cxn ang="0">
+                  <a:pos x="connsiteX0" y="connsiteY0"/>
+                </a:cxn>
+                <a:cxn ang="0">
+                  <a:pos x="connsiteX1" y="connsiteY1"/>
+                </a:cxn>
+                <a:cxn ang="0">
+                  <a:pos x="connsiteX2" y="connsiteY2"/>
+                </a:cxn>
+                <a:cxn ang="0">
+                  <a:pos x="connsiteX3" y="connsiteY3"/>
+                </a:cxn>
+                <a:cxn ang="0">
+                  <a:pos x="connsiteX4" y="connsiteY4"/>
+                </a:cxn>
+                <a:cxn ang="0">
+                  <a:pos x="connsiteX5" y="connsiteY5"/>
+                </a:cxn>
+                <a:cxn ang="0">
+                  <a:pos x="connsiteX6" y="connsiteY6"/>
+                </a:cxn>
+              </a:cxnLst>
+              <a:rect l="l" t="t" r="r" b="b"/>
+              <a:pathLst>
+                <a:path w="309838" h="318135">
+                  <a:moveTo>
+                    <a:pt x="309838" y="318135"/>
+                  </a:moveTo>
+                  <a:lnTo>
+                    <a:pt x="52900" y="318135"/>
+                  </a:lnTo>
+                  <a:cubicBezTo>
+                    <a:pt x="23684" y="318135"/>
+                    <a:pt x="0" y="294451"/>
+                    <a:pt x="0" y="265235"/>
+                  </a:cubicBezTo>
+                  <a:lnTo>
+                    <a:pt x="0" y="53640"/>
+                  </a:lnTo>
+                  <a:cubicBezTo>
+                    <a:pt x="0" y="24424"/>
+                    <a:pt x="23684" y="740"/>
+                    <a:pt x="52900" y="740"/>
+                  </a:cubicBezTo>
+                  <a:lnTo>
+                    <a:pt x="309838" y="740"/>
+                  </a:lnTo>
+                  <a:lnTo>
+                    <a:pt x="302853" y="0"/>
+                  </a:lnTo>
+                </a:path>
+              </a:pathLst>
+            </a:custGeom>
+            <a:solidFill>
+              <a:schemeClr val="bg1"/>
+            </a:solidFill>
+            <a:ln w="19050">
+              <a:solidFill>
+                <a:srgbClr val="00B050"/>
+              </a:solidFill>
+              <a:prstDash val="dash"/>
+            </a:ln>
+          </p:spPr>
+          <p:style>
+            <a:lnRef idx="2">
+              <a:schemeClr val="accent1">
+                <a:shade val="50000"/>
+              </a:schemeClr>
+            </a:lnRef>
+            <a:fillRef idx="1">
+              <a:schemeClr val="accent1"/>
+            </a:fillRef>
+            <a:effectRef idx="0">
+              <a:schemeClr val="accent1"/>
+            </a:effectRef>
+            <a:fontRef idx="minor">
+              <a:schemeClr val="lt1"/>
+            </a:fontRef>
+          </p:style>
+          <p:txBody>
+            <a:bodyPr wrap="square" rtlCol="0" anchor="ctr">
+              <a:noAutofit/>
+            </a:bodyPr>
+            <a:lstStyle/>
+            <a:p>
+              <a:pPr algn="ctr"/>
+              <a:endParaRPr kumimoji="1" lang="zh-CN" altLang="en-US" dirty="0">
+                <a:solidFill>
+                  <a:srgbClr val="003278"/>
+                </a:solidFill>
+              </a:endParaRPr>
+            </a:p>
+          </p:txBody>
+        </p:sp>
+        <p:sp>
+          <p:nvSpPr>
+            <p:cNvPr id="95" name="任意形状 94">
+              <a:extLst>
+                <a:ext uri="{FF2B5EF4-FFF2-40B4-BE49-F238E27FC236}">
+                  <a16:creationId xmlns:a16="http://schemas.microsoft.com/office/drawing/2014/main" id="{55E3BB3F-566D-C949-B6B8-91838D003614}"/>
+                </a:ext>
+              </a:extLst>
+            </p:cNvPr>
+            <p:cNvSpPr/>
+            <p:nvPr/>
+          </p:nvSpPr>
+          <p:spPr>
+            <a:xfrm rot="10800000">
+              <a:off x="2256960" y="4060759"/>
+              <a:ext cx="312378" cy="317395"/>
+            </a:xfrm>
+            <a:custGeom>
+              <a:avLst/>
+              <a:gdLst>
+                <a:gd name="connsiteX0" fmla="*/ 52900 w 309838"/>
+                <a:gd name="connsiteY0" fmla="*/ 0 h 317395"/>
+                <a:gd name="connsiteX1" fmla="*/ 309838 w 309838"/>
+                <a:gd name="connsiteY1" fmla="*/ 0 h 317395"/>
+                <a:gd name="connsiteX2" fmla="*/ 309838 w 309838"/>
+                <a:gd name="connsiteY2" fmla="*/ 317395 h 317395"/>
+                <a:gd name="connsiteX3" fmla="*/ 52900 w 309838"/>
+                <a:gd name="connsiteY3" fmla="*/ 317395 h 317395"/>
+                <a:gd name="connsiteX4" fmla="*/ 0 w 309838"/>
+                <a:gd name="connsiteY4" fmla="*/ 264495 h 317395"/>
+                <a:gd name="connsiteX5" fmla="*/ 0 w 309838"/>
+                <a:gd name="connsiteY5" fmla="*/ 52900 h 317395"/>
+                <a:gd name="connsiteX6" fmla="*/ 52900 w 309838"/>
+                <a:gd name="connsiteY6" fmla="*/ 0 h 317395"/>
+                <a:gd name="connsiteX0" fmla="*/ 309838 w 401278"/>
+                <a:gd name="connsiteY0" fmla="*/ 317395 h 408835"/>
+                <a:gd name="connsiteX1" fmla="*/ 52900 w 401278"/>
+                <a:gd name="connsiteY1" fmla="*/ 317395 h 408835"/>
+                <a:gd name="connsiteX2" fmla="*/ 0 w 401278"/>
+                <a:gd name="connsiteY2" fmla="*/ 264495 h 408835"/>
+                <a:gd name="connsiteX3" fmla="*/ 0 w 401278"/>
+                <a:gd name="connsiteY3" fmla="*/ 52900 h 408835"/>
+                <a:gd name="connsiteX4" fmla="*/ 52900 w 401278"/>
+                <a:gd name="connsiteY4" fmla="*/ 0 h 408835"/>
+                <a:gd name="connsiteX5" fmla="*/ 309838 w 401278"/>
+                <a:gd name="connsiteY5" fmla="*/ 0 h 408835"/>
+                <a:gd name="connsiteX6" fmla="*/ 401278 w 401278"/>
+                <a:gd name="connsiteY6" fmla="*/ 408835 h 408835"/>
+                <a:gd name="connsiteX0" fmla="*/ 309838 w 309838"/>
+                <a:gd name="connsiteY0" fmla="*/ 321310 h 321310"/>
+                <a:gd name="connsiteX1" fmla="*/ 52900 w 309838"/>
+                <a:gd name="connsiteY1" fmla="*/ 321310 h 321310"/>
+                <a:gd name="connsiteX2" fmla="*/ 0 w 309838"/>
+                <a:gd name="connsiteY2" fmla="*/ 268410 h 321310"/>
+                <a:gd name="connsiteX3" fmla="*/ 0 w 309838"/>
+                <a:gd name="connsiteY3" fmla="*/ 56815 h 321310"/>
+                <a:gd name="connsiteX4" fmla="*/ 52900 w 309838"/>
+                <a:gd name="connsiteY4" fmla="*/ 3915 h 321310"/>
+                <a:gd name="connsiteX5" fmla="*/ 309838 w 309838"/>
+                <a:gd name="connsiteY5" fmla="*/ 3915 h 321310"/>
+                <a:gd name="connsiteX6" fmla="*/ 306028 w 309838"/>
+                <a:gd name="connsiteY6" fmla="*/ 0 h 321310"/>
+                <a:gd name="connsiteX0" fmla="*/ 309838 w 388578"/>
+                <a:gd name="connsiteY0" fmla="*/ 317395 h 481860"/>
+                <a:gd name="connsiteX1" fmla="*/ 52900 w 388578"/>
+                <a:gd name="connsiteY1" fmla="*/ 317395 h 481860"/>
+                <a:gd name="connsiteX2" fmla="*/ 0 w 388578"/>
+                <a:gd name="connsiteY2" fmla="*/ 264495 h 481860"/>
+                <a:gd name="connsiteX3" fmla="*/ 0 w 388578"/>
+                <a:gd name="connsiteY3" fmla="*/ 52900 h 481860"/>
+                <a:gd name="connsiteX4" fmla="*/ 52900 w 388578"/>
+                <a:gd name="connsiteY4" fmla="*/ 0 h 481860"/>
+                <a:gd name="connsiteX5" fmla="*/ 309838 w 388578"/>
+                <a:gd name="connsiteY5" fmla="*/ 0 h 481860"/>
+                <a:gd name="connsiteX6" fmla="*/ 388578 w 388578"/>
+                <a:gd name="connsiteY6" fmla="*/ 481860 h 481860"/>
+                <a:gd name="connsiteX0" fmla="*/ 309838 w 388578"/>
+                <a:gd name="connsiteY0" fmla="*/ 317395 h 481860"/>
+                <a:gd name="connsiteX1" fmla="*/ 52900 w 388578"/>
+                <a:gd name="connsiteY1" fmla="*/ 317395 h 481860"/>
+                <a:gd name="connsiteX2" fmla="*/ 0 w 388578"/>
+                <a:gd name="connsiteY2" fmla="*/ 264495 h 481860"/>
+                <a:gd name="connsiteX3" fmla="*/ 0 w 388578"/>
+                <a:gd name="connsiteY3" fmla="*/ 52900 h 481860"/>
+                <a:gd name="connsiteX4" fmla="*/ 52900 w 388578"/>
+                <a:gd name="connsiteY4" fmla="*/ 0 h 481860"/>
+                <a:gd name="connsiteX5" fmla="*/ 309838 w 388578"/>
+                <a:gd name="connsiteY5" fmla="*/ 0 h 481860"/>
+                <a:gd name="connsiteX6" fmla="*/ 388578 w 388578"/>
+                <a:gd name="connsiteY6" fmla="*/ 481860 h 481860"/>
+                <a:gd name="connsiteX0" fmla="*/ 309838 w 312378"/>
+                <a:gd name="connsiteY0" fmla="*/ 317395 h 317395"/>
+                <a:gd name="connsiteX1" fmla="*/ 52900 w 312378"/>
+                <a:gd name="connsiteY1" fmla="*/ 317395 h 317395"/>
+                <a:gd name="connsiteX2" fmla="*/ 0 w 312378"/>
+                <a:gd name="connsiteY2" fmla="*/ 264495 h 317395"/>
+                <a:gd name="connsiteX3" fmla="*/ 0 w 312378"/>
+                <a:gd name="connsiteY3" fmla="*/ 52900 h 317395"/>
+                <a:gd name="connsiteX4" fmla="*/ 52900 w 312378"/>
+                <a:gd name="connsiteY4" fmla="*/ 0 h 317395"/>
+                <a:gd name="connsiteX5" fmla="*/ 309838 w 312378"/>
+                <a:gd name="connsiteY5" fmla="*/ 0 h 317395"/>
+                <a:gd name="connsiteX6" fmla="*/ 312378 w 312378"/>
+                <a:gd name="connsiteY6" fmla="*/ 2435 h 317395"/>
+              </a:gdLst>
+              <a:ahLst/>
+              <a:cxnLst>
+                <a:cxn ang="0">
+                  <a:pos x="connsiteX0" y="connsiteY0"/>
+                </a:cxn>
+                <a:cxn ang="0">
+                  <a:pos x="connsiteX1" y="connsiteY1"/>
+                </a:cxn>
+                <a:cxn ang="0">
+                  <a:pos x="connsiteX2" y="connsiteY2"/>
+                </a:cxn>
+                <a:cxn ang="0">
+                  <a:pos x="connsiteX3" y="connsiteY3"/>
+                </a:cxn>
+                <a:cxn ang="0">
+                  <a:pos x="connsiteX4" y="connsiteY4"/>
+                </a:cxn>
+                <a:cxn ang="0">
+                  <a:pos x="connsiteX5" y="connsiteY5"/>
+                </a:cxn>
+                <a:cxn ang="0">
+                  <a:pos x="connsiteX6" y="connsiteY6"/>
+                </a:cxn>
+              </a:cxnLst>
+              <a:rect l="l" t="t" r="r" b="b"/>
+              <a:pathLst>
+                <a:path w="312378" h="317395">
+                  <a:moveTo>
+                    <a:pt x="309838" y="317395"/>
+                  </a:moveTo>
+                  <a:lnTo>
+                    <a:pt x="52900" y="317395"/>
+                  </a:lnTo>
+                  <a:cubicBezTo>
+                    <a:pt x="23684" y="317395"/>
+                    <a:pt x="0" y="293711"/>
+                    <a:pt x="0" y="264495"/>
+                  </a:cubicBezTo>
+                  <a:lnTo>
+                    <a:pt x="0" y="52900"/>
+                  </a:lnTo>
+                  <a:cubicBezTo>
+                    <a:pt x="0" y="23684"/>
+                    <a:pt x="23684" y="0"/>
+                    <a:pt x="52900" y="0"/>
+                  </a:cubicBezTo>
+                  <a:lnTo>
+                    <a:pt x="309838" y="0"/>
+                  </a:lnTo>
+                  <a:lnTo>
+                    <a:pt x="312378" y="2435"/>
+                  </a:lnTo>
+                </a:path>
+              </a:pathLst>
+            </a:custGeom>
+            <a:solidFill>
+              <a:schemeClr val="bg1"/>
+            </a:solidFill>
+            <a:ln w="19050">
+              <a:solidFill>
+                <a:srgbClr val="E95429"/>
+              </a:solidFill>
+              <a:prstDash val="dash"/>
+            </a:ln>
+          </p:spPr>
+          <p:style>
+            <a:lnRef idx="2">
+              <a:schemeClr val="accent1">
+                <a:shade val="50000"/>
+              </a:schemeClr>
+            </a:lnRef>
+            <a:fillRef idx="1">
+              <a:schemeClr val="accent1"/>
+            </a:fillRef>
+            <a:effectRef idx="0">
+              <a:schemeClr val="accent1"/>
+            </a:effectRef>
+            <a:fontRef idx="minor">
+              <a:schemeClr val="lt1"/>
+            </a:fontRef>
+          </p:style>
+          <p:txBody>
+            <a:bodyPr wrap="square" rtlCol="0" anchor="ctr">
+              <a:noAutofit/>
+            </a:bodyPr>
+            <a:lstStyle/>
+            <a:p>
+              <a:pPr algn="ctr"/>
+              <a:endParaRPr kumimoji="1" lang="zh-CN" altLang="en-US" dirty="0">
+                <a:solidFill>
+                  <a:srgbClr val="003278"/>
+                </a:solidFill>
+              </a:endParaRPr>
+            </a:p>
+          </p:txBody>
+        </p:sp>
+      </p:grpSp>
+      <p:sp>
+        <p:nvSpPr>
+          <p:cNvPr id="22" name="圆角矩形 21">
+            <a:extLst>
+              <a:ext uri="{FF2B5EF4-FFF2-40B4-BE49-F238E27FC236}">
+                <a16:creationId xmlns:a16="http://schemas.microsoft.com/office/drawing/2014/main" id="{54D9BA51-9C1B-2F49-9FF6-870986D0E2C0}"/>
+              </a:ext>
+            </a:extLst>
+          </p:cNvPr>
+          <p:cNvSpPr/>
+          <p:nvPr/>
+        </p:nvSpPr>
+        <p:spPr>
+          <a:xfrm>
+            <a:off x="2027801" y="3245156"/>
+            <a:ext cx="619676" cy="317395"/>
+          </a:xfrm>
+          <a:prstGeom prst="roundRect">
+            <a:avLst/>
+          </a:prstGeom>
+          <a:noFill/>
+          <a:ln w="19050">
+            <a:noFill/>
+            <a:prstDash val="dash"/>
+          </a:ln>
+        </p:spPr>
+        <p:style>
+          <a:lnRef idx="2">
+            <a:schemeClr val="accent1">
+              <a:shade val="50000"/>
+            </a:schemeClr>
+          </a:lnRef>
+          <a:fillRef idx="1">
+            <a:schemeClr val="accent1"/>
+          </a:fillRef>
+          <a:effectRef idx="0">
+            <a:schemeClr val="accent1"/>
+          </a:effectRef>
+          <a:fontRef idx="minor">
+            <a:schemeClr val="lt1"/>
+          </a:fontRef>
+        </p:style>
+        <p:txBody>
+          <a:bodyPr rtlCol="0" anchor="ctr"/>
+          <a:lstStyle/>
+          <a:p>
+            <a:pPr algn="ctr"/>
+            <a:r>
+              <a:rPr kumimoji="1" lang="en-US" altLang="zh-CN" dirty="0">
+                <a:solidFill>
+                  <a:schemeClr val="accent4"/>
+                </a:solidFill>
+              </a:rPr>
+              <a:t>Z</a:t>
+            </a:r>
+            <a:r>
+              <a:rPr kumimoji="1" lang="zh-CN" altLang="en-US" dirty="0">
+                <a:solidFill>
+                  <a:schemeClr val="accent4"/>
+                </a:solidFill>
+              </a:rPr>
+              <a:t>‘</a:t>
+            </a:r>
+          </a:p>
+        </p:txBody>
+      </p:sp>
+      <p:sp>
+        <p:nvSpPr>
+          <p:cNvPr id="97" name="文本框 96">
+            <a:extLst>
+              <a:ext uri="{FF2B5EF4-FFF2-40B4-BE49-F238E27FC236}">
+                <a16:creationId xmlns:a16="http://schemas.microsoft.com/office/drawing/2014/main" id="{3B566CD9-A41F-1847-981F-2A2A4D396106}"/>
+              </a:ext>
+            </a:extLst>
+          </p:cNvPr>
+          <p:cNvSpPr txBox="1"/>
+          <p:nvPr/>
+        </p:nvSpPr>
+        <p:spPr>
+          <a:xfrm>
+            <a:off x="681789" y="4005170"/>
+            <a:ext cx="3186193" cy="1477328"/>
+          </a:xfrm>
+          <a:prstGeom prst="rect">
+            <a:avLst/>
+          </a:prstGeom>
+          <a:noFill/>
+        </p:spPr>
+        <p:txBody>
+          <a:bodyPr wrap="none" rtlCol="0">
+            <a:spAutoFit/>
+          </a:bodyPr>
+          <a:lstStyle/>
+          <a:p>
+            <a:r>
+              <a:rPr kumimoji="1" lang="en-US" altLang="zh-CN" dirty="0"/>
+              <a:t>Two</a:t>
+            </a:r>
+            <a:r>
+              <a:rPr kumimoji="1" lang="zh-CN" altLang="en-US" dirty="0"/>
+              <a:t> </a:t>
+            </a:r>
+            <a:r>
+              <a:rPr kumimoji="1" lang="en-US" altLang="zh-CN" dirty="0"/>
+              <a:t>canary</a:t>
+            </a:r>
+            <a:r>
+              <a:rPr kumimoji="1" lang="zh-CN" altLang="en-US" dirty="0"/>
+              <a:t> </a:t>
+            </a:r>
+            <a:r>
+              <a:rPr kumimoji="1" lang="en-US" altLang="zh-CN" dirty="0"/>
+              <a:t>deployment</a:t>
+            </a:r>
+          </a:p>
+          <a:p>
+            <a:pPr marL="285750" indent="-285750">
+              <a:buFontTx/>
+              <a:buChar char="-"/>
+            </a:pPr>
+            <a:r>
+              <a:rPr kumimoji="1" lang="en-US" altLang="zh-CN" dirty="0"/>
+              <a:t>A</a:t>
+            </a:r>
+            <a:r>
+              <a:rPr kumimoji="1" lang="zh-CN" altLang="en-US" dirty="0"/>
+              <a:t>‘ </a:t>
+            </a:r>
+            <a:r>
+              <a:rPr kumimoji="1" lang="en-US" altLang="zh-CN" dirty="0"/>
+              <a:t>and</a:t>
+            </a:r>
+            <a:r>
+              <a:rPr kumimoji="1" lang="zh-CN" altLang="en-US" dirty="0"/>
+              <a:t>  </a:t>
+            </a:r>
+            <a:r>
+              <a:rPr kumimoji="1" lang="en-US" altLang="zh-CN" dirty="0"/>
+              <a:t>Z</a:t>
+            </a:r>
+            <a:r>
+              <a:rPr kumimoji="1" lang="zh-CN" altLang="en-US" dirty="0"/>
+              <a:t>’ </a:t>
+            </a:r>
+            <a:endParaRPr kumimoji="1" lang="en-US" altLang="zh-CN" dirty="0"/>
+          </a:p>
+          <a:p>
+            <a:pPr marL="285750" indent="-285750">
+              <a:buFontTx/>
+              <a:buChar char="-"/>
+            </a:pPr>
+            <a:r>
+              <a:rPr kumimoji="1" lang="en-US" altLang="zh-CN" dirty="0"/>
+              <a:t>B</a:t>
+            </a:r>
+            <a:r>
+              <a:rPr kumimoji="1" lang="zh-CN" altLang="en-US" dirty="0"/>
+              <a:t>‘ </a:t>
+            </a:r>
+            <a:r>
+              <a:rPr kumimoji="1" lang="en-US" altLang="zh-CN" dirty="0"/>
+              <a:t>and</a:t>
+            </a:r>
+            <a:r>
+              <a:rPr kumimoji="1" lang="zh-CN" altLang="en-US" dirty="0"/>
+              <a:t>  </a:t>
+            </a:r>
+            <a:r>
+              <a:rPr kumimoji="1" lang="en-US" altLang="zh-CN" dirty="0"/>
+              <a:t>Z</a:t>
+            </a:r>
+            <a:r>
+              <a:rPr kumimoji="1" lang="zh-CN" altLang="en-US" dirty="0"/>
+              <a:t>’</a:t>
+            </a:r>
+            <a:endParaRPr kumimoji="1" lang="en-US" altLang="zh-CN" dirty="0"/>
+          </a:p>
+          <a:p>
+            <a:pPr marL="285750" indent="-285750">
+              <a:buFontTx/>
+              <a:buChar char="-"/>
+            </a:pPr>
+            <a:endParaRPr kumimoji="1" lang="en-US" altLang="zh-CN" dirty="0"/>
+          </a:p>
+          <a:p>
+            <a:r>
+              <a:rPr kumimoji="1" lang="en-US" altLang="zh-CN" dirty="0"/>
+              <a:t>Z</a:t>
+            </a:r>
+            <a:r>
+              <a:rPr kumimoji="1" lang="zh-CN" altLang="en-US" dirty="0"/>
+              <a:t>‘ </a:t>
+            </a:r>
+            <a:r>
+              <a:rPr kumimoji="1" lang="en-US" altLang="zh-CN" dirty="0"/>
+              <a:t>got</a:t>
+            </a:r>
+            <a:r>
+              <a:rPr kumimoji="1" lang="zh-CN" altLang="en-US" dirty="0"/>
+              <a:t> </a:t>
+            </a:r>
+            <a:r>
+              <a:rPr kumimoji="1" lang="en-US" altLang="zh-CN" dirty="0"/>
+              <a:t>all</a:t>
+            </a:r>
+            <a:r>
+              <a:rPr kumimoji="1" lang="zh-CN" altLang="en-US" dirty="0"/>
+              <a:t> </a:t>
+            </a:r>
+            <a:r>
+              <a:rPr kumimoji="1" lang="en-US" altLang="zh-CN" dirty="0"/>
+              <a:t>traffic</a:t>
+            </a:r>
+            <a:r>
+              <a:rPr kumimoji="1" lang="zh-CN" altLang="en-US" dirty="0"/>
+              <a:t> </a:t>
+            </a:r>
+            <a:r>
+              <a:rPr kumimoji="1" lang="en-US" altLang="zh-CN" dirty="0"/>
+              <a:t>from</a:t>
+            </a:r>
+            <a:r>
+              <a:rPr kumimoji="1" lang="zh-CN" altLang="en-US" dirty="0"/>
+              <a:t> </a:t>
+            </a:r>
+            <a:r>
+              <a:rPr kumimoji="1" lang="en-US" altLang="zh-CN" dirty="0"/>
+              <a:t>A</a:t>
+            </a:r>
+            <a:r>
+              <a:rPr kumimoji="1" lang="zh-CN" altLang="en-US" dirty="0"/>
+              <a:t>’ </a:t>
+            </a:r>
+            <a:r>
+              <a:rPr kumimoji="1" lang="en-US" altLang="zh-CN" dirty="0"/>
+              <a:t>and</a:t>
+            </a:r>
+            <a:r>
+              <a:rPr kumimoji="1" lang="zh-CN" altLang="en-US" dirty="0"/>
+              <a:t> </a:t>
+            </a:r>
+            <a:r>
+              <a:rPr kumimoji="1" lang="en-US" altLang="zh-CN" dirty="0"/>
+              <a:t>B</a:t>
+            </a:r>
+            <a:r>
+              <a:rPr kumimoji="1" lang="zh-CN" altLang="en-US" dirty="0"/>
+              <a:t>‘</a:t>
+            </a:r>
+          </a:p>
+        </p:txBody>
+      </p:sp>
+      <p:sp>
+        <p:nvSpPr>
+          <p:cNvPr id="98" name="文本框 97">
+            <a:extLst>
+              <a:ext uri="{FF2B5EF4-FFF2-40B4-BE49-F238E27FC236}">
+                <a16:creationId xmlns:a16="http://schemas.microsoft.com/office/drawing/2014/main" id="{26E5A8CE-5A6E-A74B-8ED5-36C8B4A99D3A}"/>
+              </a:ext>
+            </a:extLst>
+          </p:cNvPr>
+          <p:cNvSpPr txBox="1"/>
+          <p:nvPr/>
+        </p:nvSpPr>
+        <p:spPr>
+          <a:xfrm>
+            <a:off x="4502903" y="4005170"/>
+            <a:ext cx="2671565" cy="1477328"/>
+          </a:xfrm>
+          <a:prstGeom prst="rect">
+            <a:avLst/>
+          </a:prstGeom>
+          <a:noFill/>
+        </p:spPr>
+        <p:txBody>
+          <a:bodyPr wrap="none" rtlCol="0">
+            <a:spAutoFit/>
+          </a:bodyPr>
+          <a:lstStyle/>
+          <a:p>
+            <a:r>
+              <a:rPr kumimoji="1" lang="en-US" altLang="zh-CN" dirty="0"/>
+              <a:t>Two</a:t>
+            </a:r>
+            <a:r>
+              <a:rPr kumimoji="1" lang="zh-CN" altLang="en-US" dirty="0"/>
+              <a:t> </a:t>
+            </a:r>
+            <a:r>
+              <a:rPr kumimoji="1" lang="en-US" altLang="zh-CN" dirty="0"/>
+              <a:t>canary</a:t>
+            </a:r>
+            <a:r>
+              <a:rPr kumimoji="1" lang="zh-CN" altLang="en-US" dirty="0"/>
+              <a:t> </a:t>
+            </a:r>
+            <a:r>
+              <a:rPr kumimoji="1" lang="en-US" altLang="zh-CN" dirty="0"/>
+              <a:t>deployment</a:t>
+            </a:r>
+          </a:p>
+          <a:p>
+            <a:pPr marL="285750" indent="-285750">
+              <a:buFontTx/>
+              <a:buChar char="-"/>
+            </a:pPr>
+            <a:r>
+              <a:rPr kumimoji="1" lang="en-US" altLang="zh-CN" dirty="0"/>
+              <a:t>A</a:t>
+            </a:r>
+            <a:r>
+              <a:rPr kumimoji="1" lang="zh-CN" altLang="en-US" dirty="0"/>
+              <a:t>‘ </a:t>
+            </a:r>
+            <a:endParaRPr kumimoji="1" lang="en-US" altLang="zh-CN" dirty="0"/>
+          </a:p>
+          <a:p>
+            <a:pPr marL="285750" indent="-285750">
+              <a:buFontTx/>
+              <a:buChar char="-"/>
+            </a:pPr>
+            <a:r>
+              <a:rPr kumimoji="1" lang="en-US" altLang="zh-CN" dirty="0"/>
+              <a:t>B</a:t>
+            </a:r>
+            <a:r>
+              <a:rPr kumimoji="1" lang="zh-CN" altLang="en-US" dirty="0"/>
+              <a:t>‘ </a:t>
+            </a:r>
+            <a:r>
+              <a:rPr kumimoji="1" lang="en-US" altLang="zh-CN" dirty="0"/>
+              <a:t>and</a:t>
+            </a:r>
+            <a:r>
+              <a:rPr kumimoji="1" lang="zh-CN" altLang="en-US" dirty="0"/>
+              <a:t>  </a:t>
+            </a:r>
+            <a:r>
+              <a:rPr kumimoji="1" lang="en-US" altLang="zh-CN" dirty="0"/>
+              <a:t>Z</a:t>
+            </a:r>
+            <a:r>
+              <a:rPr kumimoji="1" lang="zh-CN" altLang="en-US" dirty="0"/>
+              <a:t>’</a:t>
+            </a:r>
+            <a:endParaRPr kumimoji="1" lang="en-US" altLang="zh-CN" dirty="0"/>
+          </a:p>
+          <a:p>
+            <a:pPr marL="285750" indent="-285750">
+              <a:buFontTx/>
+              <a:buChar char="-"/>
+            </a:pPr>
+            <a:endParaRPr kumimoji="1" lang="en-US" altLang="zh-CN" dirty="0"/>
+          </a:p>
+          <a:p>
+            <a:r>
+              <a:rPr kumimoji="1" lang="en-US" altLang="zh-CN" dirty="0"/>
+              <a:t>Z</a:t>
+            </a:r>
+            <a:r>
+              <a:rPr kumimoji="1" lang="zh-CN" altLang="en-US" dirty="0"/>
+              <a:t>‘ </a:t>
+            </a:r>
+            <a:r>
+              <a:rPr kumimoji="1" lang="en-US" altLang="zh-CN" dirty="0"/>
+              <a:t>only</a:t>
+            </a:r>
+            <a:r>
+              <a:rPr kumimoji="1" lang="zh-CN" altLang="en-US" dirty="0"/>
+              <a:t> </a:t>
+            </a:r>
+            <a:r>
+              <a:rPr kumimoji="1" lang="en-US" altLang="zh-CN" dirty="0"/>
+              <a:t>get</a:t>
+            </a:r>
+            <a:r>
+              <a:rPr kumimoji="1" lang="zh-CN" altLang="en-US" dirty="0"/>
+              <a:t> </a:t>
+            </a:r>
+            <a:r>
+              <a:rPr kumimoji="1" lang="en-US" altLang="zh-CN" dirty="0"/>
+              <a:t>traffic</a:t>
+            </a:r>
+            <a:r>
+              <a:rPr kumimoji="1" lang="zh-CN" altLang="en-US" dirty="0"/>
+              <a:t> </a:t>
+            </a:r>
+            <a:r>
+              <a:rPr kumimoji="1" lang="en-US" altLang="zh-CN" dirty="0"/>
+              <a:t>from</a:t>
+            </a:r>
+            <a:r>
+              <a:rPr kumimoji="1" lang="zh-CN" altLang="en-US" dirty="0"/>
+              <a:t> </a:t>
+            </a:r>
+            <a:r>
+              <a:rPr kumimoji="1" lang="en-US" altLang="zh-CN" dirty="0"/>
+              <a:t>B</a:t>
+            </a:r>
+            <a:r>
+              <a:rPr kumimoji="1" lang="zh-CN" altLang="en-US" dirty="0"/>
+              <a:t>‘</a:t>
+            </a:r>
+          </a:p>
+        </p:txBody>
+      </p:sp>
+      <p:sp>
+        <p:nvSpPr>
+          <p:cNvPr id="99" name="文本框 98">
+            <a:extLst>
+              <a:ext uri="{FF2B5EF4-FFF2-40B4-BE49-F238E27FC236}">
+                <a16:creationId xmlns:a16="http://schemas.microsoft.com/office/drawing/2014/main" id="{14F72A36-5286-784C-A5F6-6B3B755BB742}"/>
+              </a:ext>
+            </a:extLst>
+          </p:cNvPr>
+          <p:cNvSpPr txBox="1"/>
+          <p:nvPr/>
+        </p:nvSpPr>
+        <p:spPr>
+          <a:xfrm>
+            <a:off x="8611215" y="4005170"/>
+            <a:ext cx="2711704" cy="1754326"/>
+          </a:xfrm>
+          <a:prstGeom prst="rect">
+            <a:avLst/>
+          </a:prstGeom>
+          <a:noFill/>
+        </p:spPr>
+        <p:txBody>
+          <a:bodyPr wrap="none" rtlCol="0">
+            <a:spAutoFit/>
+          </a:bodyPr>
+          <a:lstStyle/>
+          <a:p>
+            <a:r>
+              <a:rPr kumimoji="1" lang="en-US" altLang="zh-CN" dirty="0"/>
+              <a:t>Two</a:t>
+            </a:r>
+            <a:r>
+              <a:rPr kumimoji="1" lang="zh-CN" altLang="en-US" dirty="0"/>
+              <a:t> </a:t>
+            </a:r>
+            <a:r>
+              <a:rPr kumimoji="1" lang="en-US" altLang="zh-CN" dirty="0"/>
+              <a:t>canary</a:t>
+            </a:r>
+            <a:r>
+              <a:rPr kumimoji="1" lang="zh-CN" altLang="en-US" dirty="0"/>
+              <a:t> </a:t>
+            </a:r>
+            <a:r>
+              <a:rPr kumimoji="1" lang="en-US" altLang="zh-CN" dirty="0"/>
+              <a:t>deployment</a:t>
+            </a:r>
+          </a:p>
+          <a:p>
+            <a:pPr marL="285750" indent="-285750">
+              <a:buFontTx/>
+              <a:buChar char="-"/>
+            </a:pPr>
+            <a:r>
+              <a:rPr kumimoji="1" lang="en-US" altLang="zh-CN" dirty="0"/>
+              <a:t>A</a:t>
+            </a:r>
+            <a:r>
+              <a:rPr kumimoji="1" lang="zh-CN" altLang="en-US" dirty="0"/>
+              <a:t>‘ </a:t>
+            </a:r>
+            <a:r>
+              <a:rPr kumimoji="1" lang="en-US" altLang="zh-CN" dirty="0"/>
+              <a:t>and</a:t>
+            </a:r>
+            <a:r>
+              <a:rPr kumimoji="1" lang="zh-CN" altLang="en-US" dirty="0"/>
+              <a:t> </a:t>
+            </a:r>
+            <a:r>
+              <a:rPr kumimoji="1" lang="en-US" altLang="zh-CN" dirty="0"/>
+              <a:t>Z</a:t>
+            </a:r>
+            <a:r>
+              <a:rPr kumimoji="1" lang="zh-CN" altLang="en-US" dirty="0"/>
+              <a:t>’</a:t>
+            </a:r>
+            <a:endParaRPr kumimoji="1" lang="en-US" altLang="zh-CN" dirty="0"/>
+          </a:p>
+          <a:p>
+            <a:pPr marL="285750" indent="-285750">
+              <a:buFontTx/>
+              <a:buChar char="-"/>
+            </a:pPr>
+            <a:r>
+              <a:rPr kumimoji="1" lang="en-US" altLang="zh-CN" dirty="0"/>
+              <a:t>B</a:t>
+            </a:r>
+            <a:r>
+              <a:rPr kumimoji="1" lang="zh-CN" altLang="en-US" dirty="0"/>
+              <a:t>‘ </a:t>
+            </a:r>
+            <a:r>
+              <a:rPr kumimoji="1" lang="en-US" altLang="zh-CN" dirty="0"/>
+              <a:t>and</a:t>
+            </a:r>
+            <a:r>
+              <a:rPr kumimoji="1" lang="zh-CN" altLang="en-US" dirty="0"/>
+              <a:t>  </a:t>
+            </a:r>
+            <a:r>
+              <a:rPr kumimoji="1" lang="en-US" altLang="zh-CN" dirty="0"/>
+              <a:t>Z</a:t>
+            </a:r>
+            <a:r>
+              <a:rPr kumimoji="1" lang="zh-CN" altLang="en-US" dirty="0"/>
+              <a:t>’‘</a:t>
+            </a:r>
+            <a:endParaRPr kumimoji="1" lang="en-US" altLang="zh-CN" dirty="0"/>
+          </a:p>
+          <a:p>
+            <a:pPr marL="285750" indent="-285750">
+              <a:buFontTx/>
+              <a:buChar char="-"/>
+            </a:pPr>
+            <a:endParaRPr kumimoji="1" lang="en-US" altLang="zh-CN" dirty="0"/>
+          </a:p>
+          <a:p>
+            <a:r>
+              <a:rPr kumimoji="1" lang="en-US" altLang="zh-CN" dirty="0"/>
+              <a:t>Z</a:t>
+            </a:r>
+            <a:r>
+              <a:rPr kumimoji="1" lang="zh-CN" altLang="en-US" dirty="0"/>
+              <a:t>‘ </a:t>
+            </a:r>
+            <a:r>
+              <a:rPr kumimoji="1" lang="en-US" altLang="zh-CN" dirty="0"/>
+              <a:t>only</a:t>
+            </a:r>
+            <a:r>
+              <a:rPr kumimoji="1" lang="zh-CN" altLang="en-US" dirty="0"/>
+              <a:t> </a:t>
+            </a:r>
+            <a:r>
+              <a:rPr kumimoji="1" lang="en-US" altLang="zh-CN" dirty="0"/>
+              <a:t>get</a:t>
+            </a:r>
+            <a:r>
+              <a:rPr kumimoji="1" lang="zh-CN" altLang="en-US" dirty="0"/>
+              <a:t> </a:t>
+            </a:r>
+            <a:r>
+              <a:rPr kumimoji="1" lang="en-US" altLang="zh-CN" dirty="0"/>
+              <a:t>traffic</a:t>
+            </a:r>
+            <a:r>
+              <a:rPr kumimoji="1" lang="zh-CN" altLang="en-US" dirty="0"/>
+              <a:t> </a:t>
+            </a:r>
+            <a:r>
+              <a:rPr kumimoji="1" lang="en-US" altLang="zh-CN" dirty="0"/>
+              <a:t>from</a:t>
+            </a:r>
+            <a:r>
+              <a:rPr kumimoji="1" lang="zh-CN" altLang="en-US" dirty="0"/>
+              <a:t> </a:t>
+            </a:r>
+            <a:r>
+              <a:rPr kumimoji="1" lang="en-US" altLang="zh-CN" dirty="0"/>
+              <a:t>A</a:t>
+            </a:r>
+            <a:r>
+              <a:rPr kumimoji="1" lang="zh-CN" altLang="en-US" dirty="0"/>
+              <a:t>‘</a:t>
+            </a:r>
+            <a:endParaRPr kumimoji="1" lang="en-US" altLang="zh-CN" dirty="0"/>
+          </a:p>
+          <a:p>
+            <a:r>
+              <a:rPr kumimoji="1" lang="en-US" altLang="zh-CN" dirty="0"/>
+              <a:t>Z</a:t>
+            </a:r>
+            <a:r>
+              <a:rPr kumimoji="1" lang="zh-CN" altLang="en-US" dirty="0"/>
+              <a:t>‘’ </a:t>
+            </a:r>
+            <a:r>
+              <a:rPr kumimoji="1" lang="en-US" altLang="zh-CN" dirty="0"/>
+              <a:t>only</a:t>
+            </a:r>
+            <a:r>
+              <a:rPr kumimoji="1" lang="zh-CN" altLang="en-US" dirty="0"/>
+              <a:t> </a:t>
+            </a:r>
+            <a:r>
+              <a:rPr kumimoji="1" lang="en-US" altLang="zh-CN" dirty="0"/>
+              <a:t>get</a:t>
+            </a:r>
+            <a:r>
+              <a:rPr kumimoji="1" lang="zh-CN" altLang="en-US" dirty="0"/>
+              <a:t> </a:t>
+            </a:r>
+            <a:r>
+              <a:rPr kumimoji="1" lang="en-US" altLang="zh-CN" dirty="0"/>
+              <a:t>traffic</a:t>
+            </a:r>
+            <a:r>
+              <a:rPr kumimoji="1" lang="zh-CN" altLang="en-US" dirty="0"/>
+              <a:t> </a:t>
+            </a:r>
+            <a:r>
+              <a:rPr kumimoji="1" lang="en-US" altLang="zh-CN" dirty="0"/>
+              <a:t>from</a:t>
+            </a:r>
+            <a:r>
+              <a:rPr kumimoji="1" lang="zh-CN" altLang="en-US" dirty="0"/>
+              <a:t> </a:t>
+            </a:r>
+            <a:r>
+              <a:rPr kumimoji="1" lang="en-US" altLang="zh-CN" dirty="0"/>
+              <a:t>B</a:t>
+            </a:r>
+            <a:r>
+              <a:rPr kumimoji="1" lang="zh-CN" altLang="en-US" dirty="0"/>
+              <a:t>‘</a:t>
+            </a:r>
+          </a:p>
+        </p:txBody>
+      </p:sp>
+      <p:pic>
+        <p:nvPicPr>
+          <p:cNvPr id="100" name="图片 99">
+            <a:extLst>
+              <a:ext uri="{FF2B5EF4-FFF2-40B4-BE49-F238E27FC236}">
+                <a16:creationId xmlns:a16="http://schemas.microsoft.com/office/drawing/2014/main" id="{5B392227-6E4C-7141-9842-05D7DE5B0456}"/>
+              </a:ext>
+            </a:extLst>
+          </p:cNvPr>
+          <p:cNvPicPr>
+            <a:picLocks noChangeAspect="1"/>
+          </p:cNvPicPr>
+          <p:nvPr/>
+        </p:nvPicPr>
+        <p:blipFill>
+          <a:blip r:embed="rId3"/>
+          <a:stretch>
+            <a:fillRect/>
+          </a:stretch>
+        </p:blipFill>
+        <p:spPr>
+          <a:xfrm>
+            <a:off x="1526867" y="5681758"/>
+            <a:ext cx="692004" cy="619705"/>
+          </a:xfrm>
+          <a:prstGeom prst="rect">
+            <a:avLst/>
+          </a:prstGeom>
+        </p:spPr>
+      </p:pic>
+      <p:pic>
+        <p:nvPicPr>
+          <p:cNvPr id="101" name="图片 100">
+            <a:extLst>
+              <a:ext uri="{FF2B5EF4-FFF2-40B4-BE49-F238E27FC236}">
+                <a16:creationId xmlns:a16="http://schemas.microsoft.com/office/drawing/2014/main" id="{C5D7B9EB-5C9F-8C43-BFB9-FA16B41CBAA6}"/>
+              </a:ext>
+            </a:extLst>
+          </p:cNvPr>
+          <p:cNvPicPr>
+            <a:picLocks noChangeAspect="1"/>
+          </p:cNvPicPr>
+          <p:nvPr/>
+        </p:nvPicPr>
+        <p:blipFill>
+          <a:blip r:embed="rId4"/>
+          <a:stretch>
+            <a:fillRect/>
+          </a:stretch>
+        </p:blipFill>
+        <p:spPr>
+          <a:xfrm>
+            <a:off x="5418429" y="5681758"/>
+            <a:ext cx="692003" cy="692003"/>
+          </a:xfrm>
+          <a:prstGeom prst="rect">
+            <a:avLst/>
+          </a:prstGeom>
+        </p:spPr>
+      </p:pic>
+      <p:pic>
+        <p:nvPicPr>
+          <p:cNvPr id="102" name="图片 101">
+            <a:extLst>
+              <a:ext uri="{FF2B5EF4-FFF2-40B4-BE49-F238E27FC236}">
+                <a16:creationId xmlns:a16="http://schemas.microsoft.com/office/drawing/2014/main" id="{51AA5ED6-AE72-1B4A-995A-E82ACAD16835}"/>
+              </a:ext>
+            </a:extLst>
+          </p:cNvPr>
+          <p:cNvPicPr>
+            <a:picLocks noChangeAspect="1"/>
+          </p:cNvPicPr>
+          <p:nvPr/>
+        </p:nvPicPr>
+        <p:blipFill>
+          <a:blip r:embed="rId4"/>
+          <a:stretch>
+            <a:fillRect/>
+          </a:stretch>
+        </p:blipFill>
+        <p:spPr>
+          <a:xfrm>
+            <a:off x="9640106" y="5681758"/>
+            <a:ext cx="692003" cy="692003"/>
+          </a:xfrm>
+          <a:prstGeom prst="rect">
+            <a:avLst/>
+          </a:prstGeom>
+        </p:spPr>
+      </p:pic>
+      <p:cxnSp>
+        <p:nvCxnSpPr>
+          <p:cNvPr id="104" name="直线连接符 103">
+            <a:extLst>
+              <a:ext uri="{FF2B5EF4-FFF2-40B4-BE49-F238E27FC236}">
+                <a16:creationId xmlns:a16="http://schemas.microsoft.com/office/drawing/2014/main" id="{D14D4E0F-B6BE-CC4B-AD4D-8BEF0C79A597}"/>
+              </a:ext>
+            </a:extLst>
+          </p:cNvPr>
+          <p:cNvCxnSpPr>
+            <a:cxnSpLocks/>
+          </p:cNvCxnSpPr>
+          <p:nvPr/>
+        </p:nvCxnSpPr>
+        <p:spPr>
+          <a:xfrm>
+            <a:off x="4028404" y="882316"/>
+            <a:ext cx="0" cy="5506963"/>
+          </a:xfrm>
+          <a:prstGeom prst="line">
+            <a:avLst/>
+          </a:prstGeom>
+          <a:ln>
+            <a:solidFill>
+              <a:schemeClr val="tx1">
+                <a:lumMod val="50000"/>
+                <a:lumOff val="50000"/>
+              </a:schemeClr>
+            </a:solidFill>
+            <a:prstDash val="dash"/>
+          </a:ln>
+        </p:spPr>
+        <p:style>
+          <a:lnRef idx="1">
+            <a:schemeClr val="accent1"/>
+          </a:lnRef>
+          <a:fillRef idx="0">
+            <a:schemeClr val="accent1"/>
+          </a:fillRef>
+          <a:effectRef idx="0">
+            <a:schemeClr val="accent1"/>
+          </a:effectRef>
+          <a:fontRef idx="minor">
+            <a:schemeClr val="tx1"/>
+          </a:fontRef>
+        </p:style>
+      </p:cxnSp>
+      <p:cxnSp>
+        <p:nvCxnSpPr>
+          <p:cNvPr id="105" name="直线连接符 104">
+            <a:extLst>
+              <a:ext uri="{FF2B5EF4-FFF2-40B4-BE49-F238E27FC236}">
+                <a16:creationId xmlns:a16="http://schemas.microsoft.com/office/drawing/2014/main" id="{3E7757FD-07AB-E74A-9BC0-9836D66EE0C9}"/>
+              </a:ext>
+            </a:extLst>
+          </p:cNvPr>
+          <p:cNvCxnSpPr>
+            <a:cxnSpLocks/>
+          </p:cNvCxnSpPr>
+          <p:nvPr/>
+        </p:nvCxnSpPr>
+        <p:spPr>
+          <a:xfrm>
+            <a:off x="7910594" y="882316"/>
+            <a:ext cx="0" cy="5569704"/>
+          </a:xfrm>
+          <a:prstGeom prst="line">
+            <a:avLst/>
+          </a:prstGeom>
+          <a:ln>
+            <a:solidFill>
+              <a:schemeClr val="tx1">
+                <a:lumMod val="50000"/>
+                <a:lumOff val="50000"/>
+              </a:schemeClr>
+            </a:solidFill>
+            <a:prstDash val="dash"/>
+          </a:ln>
+        </p:spPr>
+        <p:style>
+          <a:lnRef idx="1">
+            <a:schemeClr val="accent1"/>
+          </a:lnRef>
+          <a:fillRef idx="0">
+            <a:schemeClr val="accent1"/>
+          </a:fillRef>
+          <a:effectRef idx="0">
+            <a:schemeClr val="accent1"/>
+          </a:effectRef>
+          <a:fontRef idx="minor">
+            <a:schemeClr val="tx1"/>
+          </a:fontRef>
+        </p:style>
+      </p:cxnSp>
+    </p:spTree>
+    <p:extLst>
+      <p:ext uri="{BB962C8B-B14F-4D97-AF65-F5344CB8AC3E}">
+        <p14:creationId xmlns:p14="http://schemas.microsoft.com/office/powerpoint/2010/main" val="3615260589"/>
+      </p:ext>
+    </p:extLst>
+  </p:cSld>
+  <p:clrMapOvr>
+    <a:masterClrMapping/>
+  </p:clrMapOvr>
+</p:sld>
+</file>
+
+<file path=ppt/slides/slide12.xml><?xml version="1.0" encoding="utf-8"?>
+<p:sld xmlns:a="http://schemas.openxmlformats.org/drawingml/2006/main" xmlns:r="http://schemas.openxmlformats.org/officeDocument/2006/relationships" xmlns:p="http://schemas.openxmlformats.org/presentationml/2006/main">
+  <p:cSld>
+    <p:spTree>
+      <p:nvGrpSpPr>
+        <p:cNvPr id="1" name=""/>
+        <p:cNvGrpSpPr/>
+        <p:nvPr/>
+      </p:nvGrpSpPr>
+      <p:grpSpPr>
+        <a:xfrm>
+          <a:off x="0" y="0"/>
+          <a:ext cx="0" cy="0"/>
+          <a:chOff x="0" y="0"/>
+          <a:chExt cx="0" cy="0"/>
+        </a:xfrm>
+      </p:grpSpPr>
+      <p:sp>
+        <p:nvSpPr>
           <p:cNvPr id="220" name="圆角矩形 219"/>
           <p:cNvSpPr/>
           <p:nvPr/>
@@ -14568,7 +18340,7 @@
 </p:sld>
 </file>
 
-<file path=ppt/slides/slide12.xml><?xml version="1.0" encoding="utf-8"?>
+<file path=ppt/slides/slide13.xml><?xml version="1.0" encoding="utf-8"?>
 <p:sld xmlns:a="http://schemas.openxmlformats.org/drawingml/2006/main" xmlns:r="http://schemas.openxmlformats.org/officeDocument/2006/relationships" xmlns:p="http://schemas.openxmlformats.org/presentationml/2006/main">
   <p:cSld>
     <p:spTree>

</xml_diff>